<commit_message>
update: add slides PDF
</commit_message>
<xml_diff>
--- a/presentation/gophercon-2021-lightning.pptx
+++ b/presentation/gophercon-2021-lightning.pptx
@@ -4,6 +4,9 @@
   <p:sldMasterIdLst>
     <p:sldMasterId id="2147483728" r:id="rId1"/>
   </p:sldMasterIdLst>
+  <p:notesMasterIdLst>
+    <p:notesMasterId r:id="rId20"/>
+  </p:notesMasterIdLst>
   <p:sldIdLst>
     <p:sldId id="256" r:id="rId2"/>
     <p:sldId id="264" r:id="rId3"/>
@@ -16,12 +19,13 @@
     <p:sldId id="258" r:id="rId10"/>
     <p:sldId id="270" r:id="rId11"/>
     <p:sldId id="260" r:id="rId12"/>
-    <p:sldId id="259" r:id="rId13"/>
-    <p:sldId id="262" r:id="rId14"/>
-    <p:sldId id="271" r:id="rId15"/>
-    <p:sldId id="272" r:id="rId16"/>
-    <p:sldId id="267" r:id="rId17"/>
-    <p:sldId id="273" r:id="rId18"/>
+    <p:sldId id="274" r:id="rId13"/>
+    <p:sldId id="259" r:id="rId14"/>
+    <p:sldId id="267" r:id="rId15"/>
+    <p:sldId id="262" r:id="rId16"/>
+    <p:sldId id="271" r:id="rId17"/>
+    <p:sldId id="275" r:id="rId18"/>
+    <p:sldId id="273" r:id="rId19"/>
   </p:sldIdLst>
   <p:sldSz cx="12192000" cy="6858000"/>
   <p:notesSz cx="6858000" cy="9144000"/>
@@ -120,6 +124,11 @@
       </a:defRPr>
     </a:lvl9pPr>
   </p:defaultTextStyle>
+  <p:extLst>
+    <p:ext uri="{EFAFB233-063F-42B5-8137-9DF3F51BA10A}">
+      <p15:sldGuideLst xmlns:p15="http://schemas.microsoft.com/office/powerpoint/2012/main"/>
+    </p:ext>
+  </p:extLst>
 </p:presentation>
 </file>
 
@@ -1689,6 +1698,11 @@
           </a:r>
         </a:p>
       </dgm:t>
+      <dgm:extLst>
+        <a:ext uri="{E40237B7-FDA0-4F09-8148-C483321AD2D9}">
+          <dgm14:cNvPr xmlns:dgm14="http://schemas.microsoft.com/office/drawing/2010/diagram" id="0" name="" descr="There was no problem to solve&#10;&#13;&#10;I wanted to host my new static website in the cloud on a virtual machine&#13;&#10;"/>
+        </a:ext>
+      </dgm:extLst>
     </dgm:pt>
     <dgm:pt modelId="{A83E7E0D-2FFF-4481-83B1-565994F73D87}" type="parTrans" cxnId="{AB5B0E38-A7D9-43EC-BEAF-615FE819C6F5}">
       <dgm:prSet/>
@@ -1720,19 +1734,24 @@
         <a:lstStyle/>
         <a:p>
           <a:r>
-            <a:rPr lang="en-US"/>
+            <a:rPr lang="en-US" dirty="0"/>
             <a:t>I </a:t>
           </a:r>
           <a:r>
-            <a:rPr lang="en-US" u="sng"/>
+            <a:rPr lang="en-US" u="sng" dirty="0"/>
             <a:t>wanted</a:t>
           </a:r>
           <a:r>
-            <a:rPr lang="en-US"/>
+            <a:rPr lang="en-US" dirty="0"/>
             <a:t> to host my new static website in the cloud on a virtual machine</a:t>
           </a:r>
         </a:p>
       </dgm:t>
+      <dgm:extLst>
+        <a:ext uri="{E40237B7-FDA0-4F09-8148-C483321AD2D9}">
+          <dgm14:cNvPr xmlns:dgm14="http://schemas.microsoft.com/office/drawing/2010/diagram" id="0" name="" descr="There was no problem to solve&#10;&#13;&#10;I wanted to host my new static website in the cloud on a virtual machine&#13;&#10;"/>
+        </a:ext>
+      </dgm:extLst>
     </dgm:pt>
     <dgm:pt modelId="{B0F5B4C9-5347-4E2E-B8AC-2DF00772BC74}" type="parTrans" cxnId="{2A426797-2D3B-433B-A758-476E90919B82}">
       <dgm:prSet/>
@@ -1924,11 +1943,16 @@
             <a:defRPr b="1"/>
           </a:pPr>
           <a:r>
-            <a:rPr lang="en-US"/>
+            <a:rPr lang="en-US" dirty="0"/>
             <a:t>Initial plan - just copy the HTML and CSS files to the server</a:t>
           </a:r>
         </a:p>
       </dgm:t>
+      <dgm:extLst>
+        <a:ext uri="{E40237B7-FDA0-4F09-8148-C483321AD2D9}">
+          <dgm14:cNvPr xmlns:dgm14="http://schemas.microsoft.com/office/drawing/2010/diagram" id="0" name="" descr="Initial plan - just copy the HTML and CSS files to the server&#13;&#10;&#10;"/>
+        </a:ext>
+      </dgm:extLst>
     </dgm:pt>
     <dgm:pt modelId="{E92E4C70-E2F1-44C3-A2CC-57F3AEF1D8DA}" type="parTrans" cxnId="{B0F1E356-D01B-4759-AACA-5DC029AE9B21}">
       <dgm:prSet/>
@@ -2015,11 +2039,16 @@
             <a:defRPr b="1"/>
           </a:pPr>
           <a:r>
-            <a:rPr lang="en-US"/>
+            <a:rPr lang="en-US" dirty="0"/>
             <a:t>Then… I thought of writing my server in Go and serving the files from the filesystem</a:t>
           </a:r>
         </a:p>
       </dgm:t>
+      <dgm:extLst>
+        <a:ext uri="{E40237B7-FDA0-4F09-8148-C483321AD2D9}">
+          <dgm14:cNvPr xmlns:dgm14="http://schemas.microsoft.com/office/drawing/2010/diagram" id="0" name="" descr="•Then… I thought of writing my server in Go and serving the files from the filesystem&#10;"/>
+        </a:ext>
+      </dgm:extLst>
     </dgm:pt>
     <dgm:pt modelId="{9B148DEE-2F09-45BC-B240-02FF61537F2B}" type="parTrans" cxnId="{E3E0B4BA-3BC3-4517-A7CF-6059C5C06CC4}">
       <dgm:prSet/>
@@ -2057,19 +2086,24 @@
             <a:defRPr b="1"/>
           </a:pPr>
           <a:r>
-            <a:rPr lang="en-US"/>
+            <a:rPr lang="en-US" dirty="0"/>
             <a:t>And then… I thought of the </a:t>
           </a:r>
           <a:r>
-            <a:rPr lang="en-US" i="1" u="sng"/>
+            <a:rPr lang="en-US" i="1" u="sng" dirty="0"/>
             <a:t>embed</a:t>
           </a:r>
           <a:r>
-            <a:rPr lang="en-US"/>
+            <a:rPr lang="en-US" dirty="0"/>
             <a:t> package</a:t>
           </a:r>
         </a:p>
       </dgm:t>
+      <dgm:extLst>
+        <a:ext uri="{E40237B7-FDA0-4F09-8148-C483321AD2D9}">
+          <dgm14:cNvPr xmlns:dgm14="http://schemas.microsoft.com/office/drawing/2010/diagram" id="0" name="" descr="•And then… I thought of the embed package"/>
+        </a:ext>
+      </dgm:extLst>
     </dgm:pt>
     <dgm:pt modelId="{42B92E5D-2D87-45B9-87E5-AE9A9AA22195}" type="parTrans" cxnId="{4BFEA011-9CB0-465D-9B07-E466CBA09B54}">
       <dgm:prSet/>
@@ -2618,15 +2652,15 @@
             <a:buNone/>
           </a:pPr>
           <a:r>
-            <a:rPr lang="en-US" sz="2500" kern="1200"/>
+            <a:rPr lang="en-US" sz="2500" kern="1200" dirty="0"/>
             <a:t>I </a:t>
           </a:r>
           <a:r>
-            <a:rPr lang="en-US" sz="2500" u="sng" kern="1200"/>
+            <a:rPr lang="en-US" sz="2500" u="sng" kern="1200" dirty="0"/>
             <a:t>wanted</a:t>
           </a:r>
           <a:r>
-            <a:rPr lang="en-US" sz="2500" kern="1200"/>
+            <a:rPr lang="en-US" sz="2500" kern="1200" dirty="0"/>
             <a:t> to host my new static website in the cloud on a virtual machine</a:t>
           </a:r>
         </a:p>
@@ -2756,7 +2790,7 @@
             <a:defRPr b="1"/>
           </a:pPr>
           <a:r>
-            <a:rPr lang="en-US" sz="1400" kern="1200"/>
+            <a:rPr lang="en-US" sz="1400" kern="1200" dirty="0"/>
             <a:t>Initial plan - just copy the HTML and CSS files to the server</a:t>
           </a:r>
         </a:p>
@@ -2942,7 +2976,7 @@
             <a:defRPr b="1"/>
           </a:pPr>
           <a:r>
-            <a:rPr lang="en-US" sz="1400" kern="1200"/>
+            <a:rPr lang="en-US" sz="1400" kern="1200" dirty="0"/>
             <a:t>Then… I thought of writing my server in Go and serving the files from the filesystem</a:t>
           </a:r>
         </a:p>
@@ -3092,15 +3126,15 @@
             <a:defRPr b="1"/>
           </a:pPr>
           <a:r>
-            <a:rPr lang="en-US" sz="1400" kern="1200"/>
+            <a:rPr lang="en-US" sz="1400" kern="1200" dirty="0"/>
             <a:t>And then… I thought of the </a:t>
           </a:r>
           <a:r>
-            <a:rPr lang="en-US" sz="1400" i="1" u="sng" kern="1200"/>
+            <a:rPr lang="en-US" sz="1400" i="1" u="sng" kern="1200" dirty="0"/>
             <a:t>embed</a:t>
           </a:r>
           <a:r>
-            <a:rPr lang="en-US" sz="1400" kern="1200"/>
+            <a:rPr lang="en-US" sz="1400" kern="1200" dirty="0"/>
             <a:t> package</a:t>
           </a:r>
         </a:p>
@@ -5717,6 +5751,571 @@
 </dgm:styleDef>
 </file>
 
+<file path=ppt/notesMasters/notesMaster1.xml><?xml version="1.0" encoding="utf-8"?>
+<p:notesMaster xmlns:a="http://schemas.openxmlformats.org/drawingml/2006/main" xmlns:r="http://schemas.openxmlformats.org/officeDocument/2006/relationships" xmlns:p="http://schemas.openxmlformats.org/presentationml/2006/main">
+  <p:cSld>
+    <p:bg>
+      <p:bgRef idx="1001">
+        <a:schemeClr val="bg1"/>
+      </p:bgRef>
+    </p:bg>
+    <p:spTree>
+      <p:nvGrpSpPr>
+        <p:cNvPr id="1" name=""/>
+        <p:cNvGrpSpPr/>
+        <p:nvPr/>
+      </p:nvGrpSpPr>
+      <p:grpSpPr>
+        <a:xfrm>
+          <a:off x="0" y="0"/>
+          <a:ext cx="0" cy="0"/>
+          <a:chOff x="0" y="0"/>
+          <a:chExt cx="0" cy="0"/>
+        </a:xfrm>
+      </p:grpSpPr>
+      <p:sp>
+        <p:nvSpPr>
+          <p:cNvPr id="2" name="Header Placeholder 1"/>
+          <p:cNvSpPr>
+            <a:spLocks noGrp="1"/>
+          </p:cNvSpPr>
+          <p:nvPr>
+            <p:ph type="hdr" sz="quarter"/>
+          </p:nvPr>
+        </p:nvSpPr>
+        <p:spPr>
+          <a:xfrm>
+            <a:off x="0" y="0"/>
+            <a:ext cx="2971800" cy="458788"/>
+          </a:xfrm>
+          <a:prstGeom prst="rect">
+            <a:avLst/>
+          </a:prstGeom>
+        </p:spPr>
+        <p:txBody>
+          <a:bodyPr vert="horz" lIns="91440" tIns="45720" rIns="91440" bIns="45720" rtlCol="0"/>
+          <a:lstStyle>
+            <a:lvl1pPr algn="l">
+              <a:defRPr sz="1200"/>
+            </a:lvl1pPr>
+          </a:lstStyle>
+          <a:p>
+            <a:endParaRPr lang="en-US"/>
+          </a:p>
+        </p:txBody>
+      </p:sp>
+      <p:sp>
+        <p:nvSpPr>
+          <p:cNvPr id="3" name="Date Placeholder 2"/>
+          <p:cNvSpPr>
+            <a:spLocks noGrp="1"/>
+          </p:cNvSpPr>
+          <p:nvPr>
+            <p:ph type="dt" idx="1"/>
+          </p:nvPr>
+        </p:nvSpPr>
+        <p:spPr>
+          <a:xfrm>
+            <a:off x="3884613" y="0"/>
+            <a:ext cx="2971800" cy="458788"/>
+          </a:xfrm>
+          <a:prstGeom prst="rect">
+            <a:avLst/>
+          </a:prstGeom>
+        </p:spPr>
+        <p:txBody>
+          <a:bodyPr vert="horz" lIns="91440" tIns="45720" rIns="91440" bIns="45720" rtlCol="0"/>
+          <a:lstStyle>
+            <a:lvl1pPr algn="r">
+              <a:defRPr sz="1200"/>
+            </a:lvl1pPr>
+          </a:lstStyle>
+          <a:p>
+            <a:fld id="{072B102A-D3BB-5D44-B0A8-A082B70C8090}" type="datetimeFigureOut">
+              <a:rPr lang="en-US" smtClean="0"/>
+              <a:t>12/10/21</a:t>
+            </a:fld>
+            <a:endParaRPr lang="en-US"/>
+          </a:p>
+        </p:txBody>
+      </p:sp>
+      <p:sp>
+        <p:nvSpPr>
+          <p:cNvPr id="4" name="Slide Image Placeholder 3"/>
+          <p:cNvSpPr>
+            <a:spLocks noGrp="1" noRot="1" noChangeAspect="1"/>
+          </p:cNvSpPr>
+          <p:nvPr>
+            <p:ph type="sldImg" idx="2"/>
+          </p:nvPr>
+        </p:nvSpPr>
+        <p:spPr>
+          <a:xfrm>
+            <a:off x="685800" y="1143000"/>
+            <a:ext cx="5486400" cy="3086100"/>
+          </a:xfrm>
+          <a:prstGeom prst="rect">
+            <a:avLst/>
+          </a:prstGeom>
+          <a:noFill/>
+          <a:ln w="12700">
+            <a:solidFill>
+              <a:prstClr val="black"/>
+            </a:solidFill>
+          </a:ln>
+        </p:spPr>
+        <p:txBody>
+          <a:bodyPr vert="horz" lIns="91440" tIns="45720" rIns="91440" bIns="45720" rtlCol="0" anchor="ctr"/>
+          <a:lstStyle/>
+          <a:p>
+            <a:endParaRPr lang="en-US"/>
+          </a:p>
+        </p:txBody>
+      </p:sp>
+      <p:sp>
+        <p:nvSpPr>
+          <p:cNvPr id="5" name="Notes Placeholder 4"/>
+          <p:cNvSpPr>
+            <a:spLocks noGrp="1"/>
+          </p:cNvSpPr>
+          <p:nvPr>
+            <p:ph type="body" sz="quarter" idx="3"/>
+          </p:nvPr>
+        </p:nvSpPr>
+        <p:spPr>
+          <a:xfrm>
+            <a:off x="685800" y="4400550"/>
+            <a:ext cx="5486400" cy="3600450"/>
+          </a:xfrm>
+          <a:prstGeom prst="rect">
+            <a:avLst/>
+          </a:prstGeom>
+        </p:spPr>
+        <p:txBody>
+          <a:bodyPr vert="horz" lIns="91440" tIns="45720" rIns="91440" bIns="45720" rtlCol="0"/>
+          <a:lstStyle/>
+          <a:p>
+            <a:pPr lvl="0"/>
+            <a:r>
+              <a:rPr lang="en-GB"/>
+              <a:t>Click to edit Master text styles</a:t>
+            </a:r>
+          </a:p>
+          <a:p>
+            <a:pPr lvl="1"/>
+            <a:r>
+              <a:rPr lang="en-GB"/>
+              <a:t>Second level</a:t>
+            </a:r>
+          </a:p>
+          <a:p>
+            <a:pPr lvl="2"/>
+            <a:r>
+              <a:rPr lang="en-GB"/>
+              <a:t>Third level</a:t>
+            </a:r>
+          </a:p>
+          <a:p>
+            <a:pPr lvl="3"/>
+            <a:r>
+              <a:rPr lang="en-GB"/>
+              <a:t>Fourth level</a:t>
+            </a:r>
+          </a:p>
+          <a:p>
+            <a:pPr lvl="4"/>
+            <a:r>
+              <a:rPr lang="en-GB"/>
+              <a:t>Fifth level</a:t>
+            </a:r>
+            <a:endParaRPr lang="en-US"/>
+          </a:p>
+        </p:txBody>
+      </p:sp>
+      <p:sp>
+        <p:nvSpPr>
+          <p:cNvPr id="6" name="Footer Placeholder 5"/>
+          <p:cNvSpPr>
+            <a:spLocks noGrp="1"/>
+          </p:cNvSpPr>
+          <p:nvPr>
+            <p:ph type="ftr" sz="quarter" idx="4"/>
+          </p:nvPr>
+        </p:nvSpPr>
+        <p:spPr>
+          <a:xfrm>
+            <a:off x="0" y="8685213"/>
+            <a:ext cx="2971800" cy="458787"/>
+          </a:xfrm>
+          <a:prstGeom prst="rect">
+            <a:avLst/>
+          </a:prstGeom>
+        </p:spPr>
+        <p:txBody>
+          <a:bodyPr vert="horz" lIns="91440" tIns="45720" rIns="91440" bIns="45720" rtlCol="0" anchor="b"/>
+          <a:lstStyle>
+            <a:lvl1pPr algn="l">
+              <a:defRPr sz="1200"/>
+            </a:lvl1pPr>
+          </a:lstStyle>
+          <a:p>
+            <a:endParaRPr lang="en-US"/>
+          </a:p>
+        </p:txBody>
+      </p:sp>
+      <p:sp>
+        <p:nvSpPr>
+          <p:cNvPr id="7" name="Slide Number Placeholder 6"/>
+          <p:cNvSpPr>
+            <a:spLocks noGrp="1"/>
+          </p:cNvSpPr>
+          <p:nvPr>
+            <p:ph type="sldNum" sz="quarter" idx="5"/>
+          </p:nvPr>
+        </p:nvSpPr>
+        <p:spPr>
+          <a:xfrm>
+            <a:off x="3884613" y="8685213"/>
+            <a:ext cx="2971800" cy="458787"/>
+          </a:xfrm>
+          <a:prstGeom prst="rect">
+            <a:avLst/>
+          </a:prstGeom>
+        </p:spPr>
+        <p:txBody>
+          <a:bodyPr vert="horz" lIns="91440" tIns="45720" rIns="91440" bIns="45720" rtlCol="0" anchor="b"/>
+          <a:lstStyle>
+            <a:lvl1pPr algn="r">
+              <a:defRPr sz="1200"/>
+            </a:lvl1pPr>
+          </a:lstStyle>
+          <a:p>
+            <a:fld id="{40AB290F-69BF-2A4F-83D7-7421756597C9}" type="slidenum">
+              <a:rPr lang="en-US" smtClean="0"/>
+              <a:t>‹#›</a:t>
+            </a:fld>
+            <a:endParaRPr lang="en-US"/>
+          </a:p>
+        </p:txBody>
+      </p:sp>
+    </p:spTree>
+    <p:extLst>
+      <p:ext uri="{BB962C8B-B14F-4D97-AF65-F5344CB8AC3E}">
+        <p14:creationId xmlns:p14="http://schemas.microsoft.com/office/powerpoint/2010/main" val="1468251457"/>
+      </p:ext>
+    </p:extLst>
+  </p:cSld>
+  <p:clrMap bg1="lt1" tx1="dk1" bg2="lt2" tx2="dk2" accent1="accent1" accent2="accent2" accent3="accent3" accent4="accent4" accent5="accent5" accent6="accent6" hlink="hlink" folHlink="folHlink"/>
+  <p:notesStyle>
+    <a:lvl1pPr marL="0" algn="l" defTabSz="914400" rtl="0" eaLnBrk="1" latinLnBrk="0" hangingPunct="1">
+      <a:defRPr sz="1200" kern="1200">
+        <a:solidFill>
+          <a:schemeClr val="tx1"/>
+        </a:solidFill>
+        <a:latin typeface="+mn-lt"/>
+        <a:ea typeface="+mn-ea"/>
+        <a:cs typeface="+mn-cs"/>
+      </a:defRPr>
+    </a:lvl1pPr>
+    <a:lvl2pPr marL="457200" algn="l" defTabSz="914400" rtl="0" eaLnBrk="1" latinLnBrk="0" hangingPunct="1">
+      <a:defRPr sz="1200" kern="1200">
+        <a:solidFill>
+          <a:schemeClr val="tx1"/>
+        </a:solidFill>
+        <a:latin typeface="+mn-lt"/>
+        <a:ea typeface="+mn-ea"/>
+        <a:cs typeface="+mn-cs"/>
+      </a:defRPr>
+    </a:lvl2pPr>
+    <a:lvl3pPr marL="914400" algn="l" defTabSz="914400" rtl="0" eaLnBrk="1" latinLnBrk="0" hangingPunct="1">
+      <a:defRPr sz="1200" kern="1200">
+        <a:solidFill>
+          <a:schemeClr val="tx1"/>
+        </a:solidFill>
+        <a:latin typeface="+mn-lt"/>
+        <a:ea typeface="+mn-ea"/>
+        <a:cs typeface="+mn-cs"/>
+      </a:defRPr>
+    </a:lvl3pPr>
+    <a:lvl4pPr marL="1371600" algn="l" defTabSz="914400" rtl="0" eaLnBrk="1" latinLnBrk="0" hangingPunct="1">
+      <a:defRPr sz="1200" kern="1200">
+        <a:solidFill>
+          <a:schemeClr val="tx1"/>
+        </a:solidFill>
+        <a:latin typeface="+mn-lt"/>
+        <a:ea typeface="+mn-ea"/>
+        <a:cs typeface="+mn-cs"/>
+      </a:defRPr>
+    </a:lvl4pPr>
+    <a:lvl5pPr marL="1828800" algn="l" defTabSz="914400" rtl="0" eaLnBrk="1" latinLnBrk="0" hangingPunct="1">
+      <a:defRPr sz="1200" kern="1200">
+        <a:solidFill>
+          <a:schemeClr val="tx1"/>
+        </a:solidFill>
+        <a:latin typeface="+mn-lt"/>
+        <a:ea typeface="+mn-ea"/>
+        <a:cs typeface="+mn-cs"/>
+      </a:defRPr>
+    </a:lvl5pPr>
+    <a:lvl6pPr marL="2286000" algn="l" defTabSz="914400" rtl="0" eaLnBrk="1" latinLnBrk="0" hangingPunct="1">
+      <a:defRPr sz="1200" kern="1200">
+        <a:solidFill>
+          <a:schemeClr val="tx1"/>
+        </a:solidFill>
+        <a:latin typeface="+mn-lt"/>
+        <a:ea typeface="+mn-ea"/>
+        <a:cs typeface="+mn-cs"/>
+      </a:defRPr>
+    </a:lvl6pPr>
+    <a:lvl7pPr marL="2743200" algn="l" defTabSz="914400" rtl="0" eaLnBrk="1" latinLnBrk="0" hangingPunct="1">
+      <a:defRPr sz="1200" kern="1200">
+        <a:solidFill>
+          <a:schemeClr val="tx1"/>
+        </a:solidFill>
+        <a:latin typeface="+mn-lt"/>
+        <a:ea typeface="+mn-ea"/>
+        <a:cs typeface="+mn-cs"/>
+      </a:defRPr>
+    </a:lvl7pPr>
+    <a:lvl8pPr marL="3200400" algn="l" defTabSz="914400" rtl="0" eaLnBrk="1" latinLnBrk="0" hangingPunct="1">
+      <a:defRPr sz="1200" kern="1200">
+        <a:solidFill>
+          <a:schemeClr val="tx1"/>
+        </a:solidFill>
+        <a:latin typeface="+mn-lt"/>
+        <a:ea typeface="+mn-ea"/>
+        <a:cs typeface="+mn-cs"/>
+      </a:defRPr>
+    </a:lvl8pPr>
+    <a:lvl9pPr marL="3657600" algn="l" defTabSz="914400" rtl="0" eaLnBrk="1" latinLnBrk="0" hangingPunct="1">
+      <a:defRPr sz="1200" kern="1200">
+        <a:solidFill>
+          <a:schemeClr val="tx1"/>
+        </a:solidFill>
+        <a:latin typeface="+mn-lt"/>
+        <a:ea typeface="+mn-ea"/>
+        <a:cs typeface="+mn-cs"/>
+      </a:defRPr>
+    </a:lvl9pPr>
+  </p:notesStyle>
+</p:notesMaster>
+</file>
+
+<file path=ppt/notesSlides/notesSlide1.xml><?xml version="1.0" encoding="utf-8"?>
+<p:notes xmlns:a="http://schemas.openxmlformats.org/drawingml/2006/main" xmlns:r="http://schemas.openxmlformats.org/officeDocument/2006/relationships" xmlns:p="http://schemas.openxmlformats.org/presentationml/2006/main">
+  <p:cSld>
+    <p:spTree>
+      <p:nvGrpSpPr>
+        <p:cNvPr id="1" name=""/>
+        <p:cNvGrpSpPr/>
+        <p:nvPr/>
+      </p:nvGrpSpPr>
+      <p:grpSpPr>
+        <a:xfrm>
+          <a:off x="0" y="0"/>
+          <a:ext cx="0" cy="0"/>
+          <a:chOff x="0" y="0"/>
+          <a:chExt cx="0" cy="0"/>
+        </a:xfrm>
+      </p:grpSpPr>
+      <p:sp>
+        <p:nvSpPr>
+          <p:cNvPr id="2" name="Slide Image Placeholder 1"/>
+          <p:cNvSpPr>
+            <a:spLocks noGrp="1" noRot="1" noChangeAspect="1"/>
+          </p:cNvSpPr>
+          <p:nvPr>
+            <p:ph type="sldImg"/>
+          </p:nvPr>
+        </p:nvSpPr>
+        <p:spPr/>
+      </p:sp>
+      <p:sp>
+        <p:nvSpPr>
+          <p:cNvPr id="3" name="Notes Placeholder 2"/>
+          <p:cNvSpPr>
+            <a:spLocks noGrp="1"/>
+          </p:cNvSpPr>
+          <p:nvPr>
+            <p:ph type="body" idx="1"/>
+          </p:nvPr>
+        </p:nvSpPr>
+        <p:spPr/>
+        <p:txBody>
+          <a:bodyPr/>
+          <a:lstStyle/>
+          <a:p>
+            <a:r>
+              <a:rPr lang="en-US" dirty="0"/>
+              <a:t>Hello </a:t>
+            </a:r>
+            <a:r>
+              <a:rPr lang="en-US" dirty="0" err="1"/>
+              <a:t>Gophercon</a:t>
+            </a:r>
+            <a:r>
+              <a:rPr lang="en-US" dirty="0"/>
+              <a:t>! I am super excited to be presenting my lightning talk today - a first for me at </a:t>
+            </a:r>
+            <a:r>
+              <a:rPr lang="en-US" dirty="0" err="1"/>
+              <a:t>Gophercon</a:t>
+            </a:r>
+            <a:r>
+              <a:rPr lang="en-US" dirty="0"/>
+              <a:t> ever. </a:t>
+            </a:r>
+          </a:p>
+          <a:p>
+            <a:endParaRPr lang="en-US" dirty="0"/>
+          </a:p>
+          <a:p>
+            <a:r>
+              <a:rPr lang="en-US" dirty="0"/>
+              <a:t>Welcome to my talk, today </a:t>
+            </a:r>
+            <a:r>
+              <a:rPr lang="en-US" dirty="0" err="1"/>
+              <a:t>i</a:t>
+            </a:r>
+            <a:r>
+              <a:rPr lang="en-US" dirty="0"/>
+              <a:t> will be sharing my experiment with deploying a static website as a binary using </a:t>
+            </a:r>
+            <a:r>
+              <a:rPr lang="en-US" dirty="0" err="1"/>
+              <a:t>go:embed</a:t>
+            </a:r>
+            <a:r>
+              <a:rPr lang="en-US" dirty="0"/>
+              <a:t> magic. embed</a:t>
+            </a:r>
+          </a:p>
+        </p:txBody>
+      </p:sp>
+      <p:sp>
+        <p:nvSpPr>
+          <p:cNvPr id="4" name="Slide Number Placeholder 3"/>
+          <p:cNvSpPr>
+            <a:spLocks noGrp="1"/>
+          </p:cNvSpPr>
+          <p:nvPr>
+            <p:ph type="sldNum" sz="quarter" idx="5"/>
+          </p:nvPr>
+        </p:nvSpPr>
+        <p:spPr/>
+        <p:txBody>
+          <a:bodyPr/>
+          <a:lstStyle/>
+          <a:p>
+            <a:fld id="{40AB290F-69BF-2A4F-83D7-7421756597C9}" type="slidenum">
+              <a:rPr lang="en-US" smtClean="0"/>
+              <a:t>1</a:t>
+            </a:fld>
+            <a:endParaRPr lang="en-US"/>
+          </a:p>
+        </p:txBody>
+      </p:sp>
+    </p:spTree>
+    <p:extLst>
+      <p:ext uri="{BB962C8B-B14F-4D97-AF65-F5344CB8AC3E}">
+        <p14:creationId xmlns:p14="http://schemas.microsoft.com/office/powerpoint/2010/main" val="1744686315"/>
+      </p:ext>
+    </p:extLst>
+  </p:cSld>
+  <p:clrMapOvr>
+    <a:masterClrMapping/>
+  </p:clrMapOvr>
+</p:notes>
+</file>
+
+<file path=ppt/notesSlides/notesSlide2.xml><?xml version="1.0" encoding="utf-8"?>
+<p:notes xmlns:a="http://schemas.openxmlformats.org/drawingml/2006/main" xmlns:r="http://schemas.openxmlformats.org/officeDocument/2006/relationships" xmlns:p="http://schemas.openxmlformats.org/presentationml/2006/main">
+  <p:cSld>
+    <p:spTree>
+      <p:nvGrpSpPr>
+        <p:cNvPr id="1" name=""/>
+        <p:cNvGrpSpPr/>
+        <p:nvPr/>
+      </p:nvGrpSpPr>
+      <p:grpSpPr>
+        <a:xfrm>
+          <a:off x="0" y="0"/>
+          <a:ext cx="0" cy="0"/>
+          <a:chOff x="0" y="0"/>
+          <a:chExt cx="0" cy="0"/>
+        </a:xfrm>
+      </p:grpSpPr>
+      <p:sp>
+        <p:nvSpPr>
+          <p:cNvPr id="2" name="Slide Image Placeholder 1"/>
+          <p:cNvSpPr>
+            <a:spLocks noGrp="1" noRot="1" noChangeAspect="1"/>
+          </p:cNvSpPr>
+          <p:nvPr>
+            <p:ph type="sldImg"/>
+          </p:nvPr>
+        </p:nvSpPr>
+        <p:spPr/>
+      </p:sp>
+      <p:sp>
+        <p:nvSpPr>
+          <p:cNvPr id="3" name="Notes Placeholder 2"/>
+          <p:cNvSpPr>
+            <a:spLocks noGrp="1"/>
+          </p:cNvSpPr>
+          <p:nvPr>
+            <p:ph type="body" idx="1"/>
+          </p:nvPr>
+        </p:nvSpPr>
+        <p:spPr/>
+        <p:txBody>
+          <a:bodyPr/>
+          <a:lstStyle/>
+          <a:p>
+            <a:r>
+              <a:rPr lang="en-US" dirty="0"/>
+              <a:t>the embed package was added in Go 1.16</a:t>
+            </a:r>
+          </a:p>
+        </p:txBody>
+      </p:sp>
+      <p:sp>
+        <p:nvSpPr>
+          <p:cNvPr id="4" name="Slide Number Placeholder 3"/>
+          <p:cNvSpPr>
+            <a:spLocks noGrp="1"/>
+          </p:cNvSpPr>
+          <p:nvPr>
+            <p:ph type="sldNum" sz="quarter" idx="5"/>
+          </p:nvPr>
+        </p:nvSpPr>
+        <p:spPr/>
+        <p:txBody>
+          <a:bodyPr/>
+          <a:lstStyle/>
+          <a:p>
+            <a:fld id="{40AB290F-69BF-2A4F-83D7-7421756597C9}" type="slidenum">
+              <a:rPr lang="en-US" smtClean="0"/>
+              <a:t>4</a:t>
+            </a:fld>
+            <a:endParaRPr lang="en-US"/>
+          </a:p>
+        </p:txBody>
+      </p:sp>
+    </p:spTree>
+    <p:extLst>
+      <p:ext uri="{BB962C8B-B14F-4D97-AF65-F5344CB8AC3E}">
+        <p14:creationId xmlns:p14="http://schemas.microsoft.com/office/powerpoint/2010/main" val="722062837"/>
+      </p:ext>
+    </p:extLst>
+  </p:cSld>
+  <p:clrMapOvr>
+    <a:masterClrMapping/>
+  </p:clrMapOvr>
+</p:notes>
+</file>
+
 <file path=ppt/slideLayouts/slideLayout1.xml><?xml version="1.0" encoding="utf-8"?>
 <p:sldLayout xmlns:a="http://schemas.openxmlformats.org/drawingml/2006/main" xmlns:r="http://schemas.openxmlformats.org/officeDocument/2006/relationships" xmlns:p="http://schemas.openxmlformats.org/presentationml/2006/main" type="title" preserve="1">
   <p:cSld name="Title Slide">
@@ -5849,7 +6448,7 @@
             <a:fld id="{B61BEF0D-F0BB-DE4B-95CE-6DB70DBA9567}" type="datetimeFigureOut">
               <a:rPr lang="en-US" smtClean="0"/>
               <a:pPr/>
-              <a:t>12/5/21</a:t>
+              <a:t>12/10/21</a:t>
             </a:fld>
             <a:endParaRPr lang="en-US" dirty="0"/>
           </a:p>
@@ -6021,7 +6620,7 @@
             <a:fld id="{B61BEF0D-F0BB-DE4B-95CE-6DB70DBA9567}" type="datetimeFigureOut">
               <a:rPr lang="en-US" smtClean="0"/>
               <a:pPr/>
-              <a:t>12/5/21</a:t>
+              <a:t>12/10/21</a:t>
             </a:fld>
             <a:endParaRPr lang="en-US" dirty="0"/>
           </a:p>
@@ -6203,7 +6802,7 @@
             <a:fld id="{B61BEF0D-F0BB-DE4B-95CE-6DB70DBA9567}" type="datetimeFigureOut">
               <a:rPr lang="en-US" smtClean="0"/>
               <a:pPr/>
-              <a:t>12/5/21</a:t>
+              <a:t>12/10/21</a:t>
             </a:fld>
             <a:endParaRPr lang="en-US" dirty="0"/>
           </a:p>
@@ -6375,7 +6974,7 @@
             <a:fld id="{B61BEF0D-F0BB-DE4B-95CE-6DB70DBA9567}" type="datetimeFigureOut">
               <a:rPr lang="en-US" smtClean="0"/>
               <a:pPr/>
-              <a:t>12/5/21</a:t>
+              <a:t>12/10/21</a:t>
             </a:fld>
             <a:endParaRPr lang="en-US" dirty="0"/>
           </a:p>
@@ -6623,7 +7222,7 @@
             <a:fld id="{B61BEF0D-F0BB-DE4B-95CE-6DB70DBA9567}" type="datetimeFigureOut">
               <a:rPr lang="en-US" smtClean="0"/>
               <a:pPr/>
-              <a:t>12/5/21</a:t>
+              <a:t>12/10/21</a:t>
             </a:fld>
             <a:endParaRPr lang="en-US" dirty="0"/>
           </a:p>
@@ -6857,7 +7456,7 @@
             <a:fld id="{B61BEF0D-F0BB-DE4B-95CE-6DB70DBA9567}" type="datetimeFigureOut">
               <a:rPr lang="en-US" smtClean="0"/>
               <a:pPr/>
-              <a:t>12/5/21</a:t>
+              <a:t>12/10/21</a:t>
             </a:fld>
             <a:endParaRPr lang="en-US" dirty="0"/>
           </a:p>
@@ -7226,7 +7825,7 @@
             <a:fld id="{B61BEF0D-F0BB-DE4B-95CE-6DB70DBA9567}" type="datetimeFigureOut">
               <a:rPr lang="en-US" smtClean="0"/>
               <a:pPr/>
-              <a:t>12/5/21</a:t>
+              <a:t>12/10/21</a:t>
             </a:fld>
             <a:endParaRPr lang="en-US" dirty="0"/>
           </a:p>
@@ -7346,7 +7945,7 @@
             <a:fld id="{B61BEF0D-F0BB-DE4B-95CE-6DB70DBA9567}" type="datetimeFigureOut">
               <a:rPr lang="en-US" smtClean="0"/>
               <a:pPr/>
-              <a:t>12/5/21</a:t>
+              <a:t>12/10/21</a:t>
             </a:fld>
             <a:endParaRPr lang="en-US" dirty="0"/>
           </a:p>
@@ -7443,7 +8042,7 @@
             <a:fld id="{B61BEF0D-F0BB-DE4B-95CE-6DB70DBA9567}" type="datetimeFigureOut">
               <a:rPr lang="en-US" smtClean="0"/>
               <a:pPr/>
-              <a:t>12/5/21</a:t>
+              <a:t>12/10/21</a:t>
             </a:fld>
             <a:endParaRPr lang="en-US" dirty="0"/>
           </a:p>
@@ -7722,7 +8321,7 @@
             <a:fld id="{B61BEF0D-F0BB-DE4B-95CE-6DB70DBA9567}" type="datetimeFigureOut">
               <a:rPr lang="en-US" smtClean="0"/>
               <a:pPr/>
-              <a:t>12/5/21</a:t>
+              <a:t>12/10/21</a:t>
             </a:fld>
             <a:endParaRPr lang="en-US" dirty="0"/>
           </a:p>
@@ -7981,7 +8580,7 @@
             <a:fld id="{B61BEF0D-F0BB-DE4B-95CE-6DB70DBA9567}" type="datetimeFigureOut">
               <a:rPr lang="en-US" smtClean="0"/>
               <a:pPr/>
-              <a:t>12/5/21</a:t>
+              <a:t>12/10/21</a:t>
             </a:fld>
             <a:endParaRPr lang="en-US" dirty="0"/>
           </a:p>
@@ -8196,7 +8795,7 @@
             <a:fld id="{B61BEF0D-F0BB-DE4B-95CE-6DB70DBA9567}" type="datetimeFigureOut">
               <a:rPr lang="en-US" smtClean="0"/>
               <a:pPr/>
-              <a:t>12/5/21</a:t>
+              <a:t>12/10/21</a:t>
             </a:fld>
             <a:endParaRPr lang="en-US" dirty="0"/>
           </a:p>
@@ -8612,10 +9211,10 @@
       </p:grpSpPr>
       <p:sp>
         <p:nvSpPr>
-          <p:cNvPr id="59" name="Rectangle 58">
+          <p:cNvPr id="104" name="Rectangle 103">
             <a:extLst>
               <a:ext uri="{FF2B5EF4-FFF2-40B4-BE49-F238E27FC236}">
-                <a16:creationId xmlns:a16="http://schemas.microsoft.com/office/drawing/2014/main" id="{E561AD0F-2B15-4989-ABCB-25A120A180F7}"/>
+                <a16:creationId xmlns:a16="http://schemas.microsoft.com/office/drawing/2014/main" id="{8B646C36-EEEC-4D52-8E8E-206F4CD8A3DA}"/>
               </a:ext>
               <a:ext uri="{C183D7F6-B498-43B3-948B-1728B52AA6E4}">
                 <adec:decorative xmlns:adec="http://schemas.microsoft.com/office/drawing/2017/decorative" val="1"/>
@@ -8642,7 +9241,7 @@
             <a:avLst/>
           </a:prstGeom>
           <a:solidFill>
-            <a:schemeClr val="bg2"/>
+            <a:schemeClr val="tx1"/>
           </a:solidFill>
           <a:ln>
             <a:noFill/>
@@ -8669,16 +9268,176 @@
           <a:lstStyle/>
           <a:p>
             <a:pPr algn="ctr"/>
-            <a:endParaRPr lang="en-US" dirty="0"/>
+            <a:endParaRPr lang="en-US" cap="all" spc="600" dirty="0"/>
           </a:p>
         </p:txBody>
       </p:sp>
+      <p:grpSp>
+        <p:nvGrpSpPr>
+          <p:cNvPr id="106" name="Group 105">
+            <a:extLst>
+              <a:ext uri="{FF2B5EF4-FFF2-40B4-BE49-F238E27FC236}">
+                <a16:creationId xmlns:a16="http://schemas.microsoft.com/office/drawing/2014/main" id="{E7E9D86A-D513-48F9-851A-5F3725E80003}"/>
+              </a:ext>
+              <a:ext uri="{C183D7F6-B498-43B3-948B-1728B52AA6E4}">
+                <adec:decorative xmlns:adec="http://schemas.microsoft.com/office/drawing/2017/decorative" val="1"/>
+              </a:ext>
+            </a:extLst>
+          </p:cNvPr>
+          <p:cNvGrpSpPr>
+            <a:grpSpLocks noGrp="1" noUngrp="1" noRot="1" noChangeAspect="1" noMove="1" noResize="1"/>
+          </p:cNvGrpSpPr>
+          <p:nvPr>
+            <p:extLst>
+              <p:ext uri="{386F3935-93C4-4BCD-93E2-E3B085C9AB24}">
+                <p16:designElem xmlns:p16="http://schemas.microsoft.com/office/powerpoint/2015/main" val="1"/>
+              </p:ext>
+            </p:extLst>
+          </p:nvPr>
+        </p:nvGrpSpPr>
+        <p:grpSpPr>
+          <a:xfrm>
+            <a:off x="1741565" y="330817"/>
+            <a:ext cx="4833901" cy="5995583"/>
+            <a:chOff x="1754444" y="330817"/>
+            <a:chExt cx="4833901" cy="5995583"/>
+          </a:xfrm>
+        </p:grpSpPr>
+        <p:sp>
+          <p:nvSpPr>
+            <p:cNvPr id="107" name="Rectangle 106">
+              <a:extLst>
+                <a:ext uri="{FF2B5EF4-FFF2-40B4-BE49-F238E27FC236}">
+                  <a16:creationId xmlns:a16="http://schemas.microsoft.com/office/drawing/2014/main" id="{8258443E-B333-44F4-8D49-1EAB1C1A4613}"/>
+                </a:ext>
+                <a:ext uri="{C183D7F6-B498-43B3-948B-1728B52AA6E4}">
+                  <adec:decorative xmlns:adec="http://schemas.microsoft.com/office/drawing/2017/decorative" val="1"/>
+                </a:ext>
+              </a:extLst>
+            </p:cNvPr>
+            <p:cNvSpPr/>
+            <p:nvPr>
+              <p:extLst>
+                <p:ext uri="{386F3935-93C4-4BCD-93E2-E3B085C9AB24}">
+                  <p16:designElem xmlns:p16="http://schemas.microsoft.com/office/powerpoint/2015/main" val="1"/>
+                </p:ext>
+              </p:extLst>
+            </p:nvPr>
+          </p:nvSpPr>
+          <p:spPr>
+            <a:xfrm>
+              <a:off x="1754444" y="330817"/>
+              <a:ext cx="4833901" cy="5995583"/>
+            </a:xfrm>
+            <a:prstGeom prst="rect">
+              <a:avLst/>
+            </a:prstGeom>
+            <a:solidFill>
+              <a:srgbClr val="FFFFFF"/>
+            </a:solidFill>
+            <a:ln w="28575">
+              <a:solidFill>
+                <a:schemeClr val="tx1"/>
+              </a:solidFill>
+            </a:ln>
+          </p:spPr>
+          <p:style>
+            <a:lnRef idx="2">
+              <a:schemeClr val="accent1">
+                <a:shade val="50000"/>
+              </a:schemeClr>
+            </a:lnRef>
+            <a:fillRef idx="1">
+              <a:schemeClr val="accent1"/>
+            </a:fillRef>
+            <a:effectRef idx="0">
+              <a:schemeClr val="accent1"/>
+            </a:effectRef>
+            <a:fontRef idx="minor">
+              <a:schemeClr val="lt1"/>
+            </a:fontRef>
+          </p:style>
+          <p:txBody>
+            <a:bodyPr rtlCol="0" anchor="ctr"/>
+            <a:lstStyle/>
+            <a:p>
+              <a:pPr algn="ctr"/>
+              <a:endParaRPr lang="en-US"/>
+            </a:p>
+          </p:txBody>
+        </p:sp>
+        <p:sp>
+          <p:nvSpPr>
+            <p:cNvPr id="108" name="Rectangle 107">
+              <a:extLst>
+                <a:ext uri="{FF2B5EF4-FFF2-40B4-BE49-F238E27FC236}">
+                  <a16:creationId xmlns:a16="http://schemas.microsoft.com/office/drawing/2014/main" id="{09132A4E-0C09-40DA-A360-EA9D3DAFFBAA}"/>
+                </a:ext>
+                <a:ext uri="{C183D7F6-B498-43B3-948B-1728B52AA6E4}">
+                  <adec:decorative xmlns:adec="http://schemas.microsoft.com/office/drawing/2017/decorative" val="1"/>
+                </a:ext>
+              </a:extLst>
+            </p:cNvPr>
+            <p:cNvSpPr/>
+            <p:nvPr>
+              <p:extLst>
+                <p:ext uri="{386F3935-93C4-4BCD-93E2-E3B085C9AB24}">
+                  <p16:designElem xmlns:p16="http://schemas.microsoft.com/office/powerpoint/2015/main" val="1"/>
+                </p:ext>
+              </p:extLst>
+            </p:nvPr>
+          </p:nvSpPr>
+          <p:spPr>
+            <a:xfrm>
+              <a:off x="1754444" y="330817"/>
+              <a:ext cx="4833901" cy="5995583"/>
+            </a:xfrm>
+            <a:prstGeom prst="rect">
+              <a:avLst/>
+            </a:prstGeom>
+            <a:solidFill>
+              <a:schemeClr val="accent6">
+                <a:alpha val="30000"/>
+              </a:schemeClr>
+            </a:solidFill>
+            <a:ln w="28575">
+              <a:solidFill>
+                <a:schemeClr val="bg1"/>
+              </a:solidFill>
+            </a:ln>
+          </p:spPr>
+          <p:style>
+            <a:lnRef idx="2">
+              <a:schemeClr val="accent1">
+                <a:shade val="50000"/>
+              </a:schemeClr>
+            </a:lnRef>
+            <a:fillRef idx="1">
+              <a:schemeClr val="accent1"/>
+            </a:fillRef>
+            <a:effectRef idx="0">
+              <a:schemeClr val="accent1"/>
+            </a:effectRef>
+            <a:fontRef idx="minor">
+              <a:schemeClr val="lt1"/>
+            </a:fontRef>
+          </p:style>
+          <p:txBody>
+            <a:bodyPr rtlCol="0" anchor="ctr"/>
+            <a:lstStyle/>
+            <a:p>
+              <a:pPr algn="ctr"/>
+              <a:endParaRPr lang="en-US"/>
+            </a:p>
+          </p:txBody>
+        </p:sp>
+      </p:grpSp>
       <p:sp>
         <p:nvSpPr>
-          <p:cNvPr id="64" name="Rectangle 60">
+          <p:cNvPr id="110" name="Rectangle 109">
             <a:extLst>
               <a:ext uri="{FF2B5EF4-FFF2-40B4-BE49-F238E27FC236}">
-                <a16:creationId xmlns:a16="http://schemas.microsoft.com/office/drawing/2014/main" id="{5707F116-8EC0-4822-9067-186AC8C96EB8}"/>
+                <a16:creationId xmlns:a16="http://schemas.microsoft.com/office/drawing/2014/main" id="{D649D88F-3460-4C52-888E-001C62B26EE5}"/>
               </a:ext>
               <a:ext uri="{C183D7F6-B498-43B3-948B-1728B52AA6E4}">
                 <adec:decorative xmlns:adec="http://schemas.microsoft.com/office/drawing/2017/decorative" val="1"/>
@@ -8697,18 +9456,20 @@
           </p:nvPr>
         </p:nvSpPr>
         <p:spPr>
-          <a:xfrm rot="2700000">
-            <a:off x="6828180" y="1316432"/>
-            <a:ext cx="4225136" cy="4225134"/>
+          <a:xfrm>
+            <a:off x="1621649" y="213740"/>
+            <a:ext cx="4833901" cy="5995583"/>
           </a:xfrm>
           <a:prstGeom prst="rect">
             <a:avLst/>
           </a:prstGeom>
           <a:solidFill>
-            <a:srgbClr val="FFFFFF"/>
+            <a:schemeClr val="tx1"/>
           </a:solidFill>
-          <a:ln>
-            <a:noFill/>
+          <a:ln w="28575">
+            <a:solidFill>
+              <a:schemeClr val="bg1"/>
+            </a:solidFill>
           </a:ln>
         </p:spPr>
         <p:style>
@@ -8732,16 +9493,73 @@
           <a:lstStyle/>
           <a:p>
             <a:pPr algn="ctr"/>
-            <a:endParaRPr lang="en-US" sz="1600"/>
+            <a:endParaRPr lang="en-US"/>
           </a:p>
         </p:txBody>
       </p:sp>
       <p:sp>
         <p:nvSpPr>
-          <p:cNvPr id="63" name="Freeform: Shape 62">
+          <p:cNvPr id="2" name="Title 1">
             <a:extLst>
               <a:ext uri="{FF2B5EF4-FFF2-40B4-BE49-F238E27FC236}">
-                <a16:creationId xmlns:a16="http://schemas.microsoft.com/office/drawing/2014/main" id="{B1ECBAC9-8FF8-4D44-BD49-6B81C38167DA}"/>
+                <a16:creationId xmlns:a16="http://schemas.microsoft.com/office/drawing/2014/main" id="{C5314FCA-B6E2-A640-9875-C1F986D0DB09}"/>
+              </a:ext>
+            </a:extLst>
+          </p:cNvPr>
+          <p:cNvSpPr>
+            <a:spLocks noGrp="1"/>
+          </p:cNvSpPr>
+          <p:nvPr>
+            <p:ph type="ctrTitle"/>
+          </p:nvPr>
+        </p:nvSpPr>
+        <p:spPr>
+          <a:xfrm>
+            <a:off x="2026693" y="510803"/>
+            <a:ext cx="4069306" cy="5339736"/>
+          </a:xfrm>
+        </p:spPr>
+        <p:txBody>
+          <a:bodyPr anchor="ctr">
+            <a:normAutofit/>
+          </a:bodyPr>
+          <a:lstStyle/>
+          <a:p>
+            <a:r>
+              <a:rPr lang="en-US" sz="5400">
+                <a:solidFill>
+                  <a:schemeClr val="bg1"/>
+                </a:solidFill>
+                <a:latin typeface="Century" panose="02040604050505020304" pitchFamily="18" charset="0"/>
+              </a:rPr>
+              <a:t>static website + go:embed =&gt;</a:t>
+            </a:r>
+            <a:br>
+              <a:rPr lang="en-US" sz="5400">
+                <a:solidFill>
+                  <a:schemeClr val="bg1"/>
+                </a:solidFill>
+                <a:latin typeface="Century" panose="02040604050505020304" pitchFamily="18" charset="0"/>
+              </a:rPr>
+            </a:br>
+            <a:r>
+              <a:rPr lang="en-US" sz="5400">
+                <a:solidFill>
+                  <a:schemeClr val="bg1"/>
+                </a:solidFill>
+                <a:latin typeface="Century" panose="02040604050505020304" pitchFamily="18" charset="0"/>
+              </a:rPr>
+              <a:t>./website</a:t>
+            </a:r>
+          </a:p>
+        </p:txBody>
+      </p:sp>
+      <p:sp>
+        <p:nvSpPr>
+          <p:cNvPr id="119" name="Freeform: Shape 111">
+            <a:extLst>
+              <a:ext uri="{FF2B5EF4-FFF2-40B4-BE49-F238E27FC236}">
+                <a16:creationId xmlns:a16="http://schemas.microsoft.com/office/drawing/2014/main" id="{A2B5CBEA-F125-49B6-8335-227C325B112B}"/>
               </a:ext>
               <a:ext uri="{C183D7F6-B498-43B3-948B-1728B52AA6E4}">
                 <adec:decorative xmlns:adec="http://schemas.microsoft.com/office/drawing/2017/decorative" val="1"/>
@@ -8760,21 +9578,29 @@
           </p:nvPr>
         </p:nvSpPr>
         <p:spPr>
-          <a:xfrm rot="18900000" flipH="1">
-            <a:off x="-212690" y="-514542"/>
-            <a:ext cx="2039436" cy="1444373"/>
+          <a:xfrm>
+            <a:off x="9422467" y="4200769"/>
+            <a:ext cx="2769534" cy="2657232"/>
           </a:xfrm>
           <a:custGeom>
             <a:avLst/>
             <a:gdLst>
-              <a:gd name="connsiteX0" fmla="*/ 0 w 2495927"/>
-              <a:gd name="connsiteY0" fmla="*/ 1767670 h 1767670"/>
-              <a:gd name="connsiteX1" fmla="*/ 1767670 w 2495927"/>
-              <a:gd name="connsiteY1" fmla="*/ 0 h 1767670"/>
-              <a:gd name="connsiteX2" fmla="*/ 2495927 w 2495927"/>
-              <a:gd name="connsiteY2" fmla="*/ 728256 h 1767670"/>
-              <a:gd name="connsiteX3" fmla="*/ 2495927 w 2495927"/>
-              <a:gd name="connsiteY3" fmla="*/ 1767670 h 1767670"/>
+              <a:gd name="connsiteX0" fmla="*/ 2473947 w 3432581"/>
+              <a:gd name="connsiteY0" fmla="*/ 0 h 3293393"/>
+              <a:gd name="connsiteX1" fmla="*/ 3209623 w 3432581"/>
+              <a:gd name="connsiteY1" fmla="*/ 111224 h 3293393"/>
+              <a:gd name="connsiteX2" fmla="*/ 3432581 w 3432581"/>
+              <a:gd name="connsiteY2" fmla="*/ 192828 h 3293393"/>
+              <a:gd name="connsiteX3" fmla="*/ 3432581 w 3432581"/>
+              <a:gd name="connsiteY3" fmla="*/ 3293393 h 3293393"/>
+              <a:gd name="connsiteX4" fmla="*/ 141884 w 3432581"/>
+              <a:gd name="connsiteY4" fmla="*/ 3293393 h 3293393"/>
+              <a:gd name="connsiteX5" fmla="*/ 111224 w 3432581"/>
+              <a:gd name="connsiteY5" fmla="*/ 3209623 h 3293393"/>
+              <a:gd name="connsiteX6" fmla="*/ 0 w 3432581"/>
+              <a:gd name="connsiteY6" fmla="*/ 2473947 h 3293393"/>
+              <a:gd name="connsiteX7" fmla="*/ 2473947 w 3432581"/>
+              <a:gd name="connsiteY7" fmla="*/ 0 h 3293393"/>
             </a:gdLst>
             <a:ahLst/>
             <a:cxnLst>
@@ -8790,32 +9616,60 @@
               <a:cxn ang="0">
                 <a:pos x="connsiteX3" y="connsiteY3"/>
               </a:cxn>
+              <a:cxn ang="0">
+                <a:pos x="connsiteX4" y="connsiteY4"/>
+              </a:cxn>
+              <a:cxn ang="0">
+                <a:pos x="connsiteX5" y="connsiteY5"/>
+              </a:cxn>
+              <a:cxn ang="0">
+                <a:pos x="connsiteX6" y="connsiteY6"/>
+              </a:cxn>
+              <a:cxn ang="0">
+                <a:pos x="connsiteX7" y="connsiteY7"/>
+              </a:cxn>
             </a:cxnLst>
             <a:rect l="l" t="t" r="r" b="b"/>
             <a:pathLst>
-              <a:path w="2495927" h="1767670">
+              <a:path w="3432581" h="3293393">
                 <a:moveTo>
-                  <a:pt x="0" y="1767670"/>
+                  <a:pt x="2473947" y="0"/>
                 </a:moveTo>
+                <a:cubicBezTo>
+                  <a:pt x="2730133" y="0"/>
+                  <a:pt x="2977223" y="38940"/>
+                  <a:pt x="3209623" y="111224"/>
+                </a:cubicBezTo>
                 <a:lnTo>
-                  <a:pt x="1767670" y="0"/>
+                  <a:pt x="3432581" y="192828"/>
                 </a:lnTo>
                 <a:lnTo>
-                  <a:pt x="2495927" y="728256"/>
+                  <a:pt x="3432581" y="3293393"/>
                 </a:lnTo>
                 <a:lnTo>
-                  <a:pt x="2495927" y="1767670"/>
+                  <a:pt x="141884" y="3293393"/>
                 </a:lnTo>
+                <a:lnTo>
+                  <a:pt x="111224" y="3209623"/>
+                </a:lnTo>
+                <a:cubicBezTo>
+                  <a:pt x="38940" y="2977224"/>
+                  <a:pt x="0" y="2730133"/>
+                  <a:pt x="0" y="2473947"/>
+                </a:cubicBezTo>
+                <a:cubicBezTo>
+                  <a:pt x="0" y="1107624"/>
+                  <a:pt x="1107624" y="0"/>
+                  <a:pt x="2473947" y="0"/>
+                </a:cubicBezTo>
                 <a:close/>
               </a:path>
             </a:pathLst>
           </a:custGeom>
           <a:solidFill>
-            <a:schemeClr val="accent1">
-              <a:alpha val="30000"/>
-            </a:schemeClr>
+            <a:srgbClr val="FFFFFF"/>
           </a:solidFill>
-          <a:ln>
+          <a:ln w="28575">
             <a:noFill/>
           </a:ln>
         </p:spPr>
@@ -8836,20 +9690,25 @@
           </a:fontRef>
         </p:style>
         <p:txBody>
-          <a:bodyPr rtlCol="0" anchor="ctr"/>
+          <a:bodyPr rot="0" spcFirstLastPara="0" vertOverflow="overflow" horzOverflow="overflow" vert="horz" wrap="square" lIns="91440" tIns="45720" rIns="91440" bIns="45720" numCol="1" spcCol="0" rtlCol="0" fromWordArt="0" anchor="ctr" anchorCtr="0" forceAA="0" compatLnSpc="1">
+            <a:prstTxWarp prst="textNoShape">
+              <a:avLst/>
+            </a:prstTxWarp>
+            <a:noAutofit/>
+          </a:bodyPr>
           <a:lstStyle/>
           <a:p>
             <a:pPr algn="ctr"/>
-            <a:endParaRPr lang="en-US"/>
+            <a:endParaRPr lang="en-US" dirty="0"/>
           </a:p>
         </p:txBody>
       </p:sp>
       <p:sp>
         <p:nvSpPr>
-          <p:cNvPr id="65" name="Rectangle 64">
+          <p:cNvPr id="121" name="Freeform: Shape 113">
             <a:extLst>
               <a:ext uri="{FF2B5EF4-FFF2-40B4-BE49-F238E27FC236}">
-                <a16:creationId xmlns:a16="http://schemas.microsoft.com/office/drawing/2014/main" id="{530F234A-713C-4B90-B43E-8F10C8B679D2}"/>
+                <a16:creationId xmlns:a16="http://schemas.microsoft.com/office/drawing/2014/main" id="{217DD14E-3BC7-413D-B4AB-B92EED2F57C5}"/>
               </a:ext>
               <a:ext uri="{C183D7F6-B498-43B3-948B-1728B52AA6E4}">
                 <adec:decorative xmlns:adec="http://schemas.microsoft.com/office/drawing/2017/decorative" val="1"/>
@@ -8868,19 +9727,100 @@
           </p:nvPr>
         </p:nvSpPr>
         <p:spPr>
-          <a:xfrm rot="2700000">
-            <a:off x="663387" y="539055"/>
-            <a:ext cx="745834" cy="745834"/>
+          <a:xfrm>
+            <a:off x="9422467" y="4200769"/>
+            <a:ext cx="2769534" cy="2657232"/>
           </a:xfrm>
-          <a:prstGeom prst="rect">
+          <a:custGeom>
             <a:avLst/>
-          </a:prstGeom>
+            <a:gdLst>
+              <a:gd name="connsiteX0" fmla="*/ 2473947 w 3432581"/>
+              <a:gd name="connsiteY0" fmla="*/ 0 h 3293393"/>
+              <a:gd name="connsiteX1" fmla="*/ 3209623 w 3432581"/>
+              <a:gd name="connsiteY1" fmla="*/ 111224 h 3293393"/>
+              <a:gd name="connsiteX2" fmla="*/ 3432581 w 3432581"/>
+              <a:gd name="connsiteY2" fmla="*/ 192828 h 3293393"/>
+              <a:gd name="connsiteX3" fmla="*/ 3432581 w 3432581"/>
+              <a:gd name="connsiteY3" fmla="*/ 3293393 h 3293393"/>
+              <a:gd name="connsiteX4" fmla="*/ 141884 w 3432581"/>
+              <a:gd name="connsiteY4" fmla="*/ 3293393 h 3293393"/>
+              <a:gd name="connsiteX5" fmla="*/ 111224 w 3432581"/>
+              <a:gd name="connsiteY5" fmla="*/ 3209623 h 3293393"/>
+              <a:gd name="connsiteX6" fmla="*/ 0 w 3432581"/>
+              <a:gd name="connsiteY6" fmla="*/ 2473947 h 3293393"/>
+              <a:gd name="connsiteX7" fmla="*/ 2473947 w 3432581"/>
+              <a:gd name="connsiteY7" fmla="*/ 0 h 3293393"/>
+            </a:gdLst>
+            <a:ahLst/>
+            <a:cxnLst>
+              <a:cxn ang="0">
+                <a:pos x="connsiteX0" y="connsiteY0"/>
+              </a:cxn>
+              <a:cxn ang="0">
+                <a:pos x="connsiteX1" y="connsiteY1"/>
+              </a:cxn>
+              <a:cxn ang="0">
+                <a:pos x="connsiteX2" y="connsiteY2"/>
+              </a:cxn>
+              <a:cxn ang="0">
+                <a:pos x="connsiteX3" y="connsiteY3"/>
+              </a:cxn>
+              <a:cxn ang="0">
+                <a:pos x="connsiteX4" y="connsiteY4"/>
+              </a:cxn>
+              <a:cxn ang="0">
+                <a:pos x="connsiteX5" y="connsiteY5"/>
+              </a:cxn>
+              <a:cxn ang="0">
+                <a:pos x="connsiteX6" y="connsiteY6"/>
+              </a:cxn>
+              <a:cxn ang="0">
+                <a:pos x="connsiteX7" y="connsiteY7"/>
+              </a:cxn>
+            </a:cxnLst>
+            <a:rect l="l" t="t" r="r" b="b"/>
+            <a:pathLst>
+              <a:path w="3432581" h="3293393">
+                <a:moveTo>
+                  <a:pt x="2473947" y="0"/>
+                </a:moveTo>
+                <a:cubicBezTo>
+                  <a:pt x="2730133" y="0"/>
+                  <a:pt x="2977223" y="38940"/>
+                  <a:pt x="3209623" y="111224"/>
+                </a:cubicBezTo>
+                <a:lnTo>
+                  <a:pt x="3432581" y="192828"/>
+                </a:lnTo>
+                <a:lnTo>
+                  <a:pt x="3432581" y="3293393"/>
+                </a:lnTo>
+                <a:lnTo>
+                  <a:pt x="141884" y="3293393"/>
+                </a:lnTo>
+                <a:lnTo>
+                  <a:pt x="111224" y="3209623"/>
+                </a:lnTo>
+                <a:cubicBezTo>
+                  <a:pt x="38940" y="2977224"/>
+                  <a:pt x="0" y="2730133"/>
+                  <a:pt x="0" y="2473947"/>
+                </a:cubicBezTo>
+                <a:cubicBezTo>
+                  <a:pt x="0" y="1107624"/>
+                  <a:pt x="1107624" y="0"/>
+                  <a:pt x="2473947" y="0"/>
+                </a:cubicBezTo>
+                <a:close/>
+              </a:path>
+            </a:pathLst>
+          </a:custGeom>
           <a:solidFill>
-            <a:schemeClr val="accent1">
+            <a:schemeClr val="accent2">
               <a:alpha val="30000"/>
             </a:schemeClr>
           </a:solidFill>
-          <a:ln>
+          <a:ln w="28575">
             <a:noFill/>
           </a:ln>
         </p:spPr>
@@ -8901,280 +9841,96 @@
           </a:fontRef>
         </p:style>
         <p:txBody>
-          <a:bodyPr rtlCol="0" anchor="ctr"/>
+          <a:bodyPr rot="0" spcFirstLastPara="0" vertOverflow="overflow" horzOverflow="overflow" vert="horz" wrap="square" lIns="91440" tIns="45720" rIns="91440" bIns="45720" numCol="1" spcCol="0" rtlCol="0" fromWordArt="0" anchor="ctr" anchorCtr="0" forceAA="0" compatLnSpc="1">
+            <a:prstTxWarp prst="textNoShape">
+              <a:avLst/>
+            </a:prstTxWarp>
+            <a:noAutofit/>
+          </a:bodyPr>
           <a:lstStyle/>
           <a:p>
             <a:pPr algn="ctr"/>
-            <a:endParaRPr lang="en-US"/>
+            <a:endParaRPr lang="en-US" dirty="0"/>
           </a:p>
         </p:txBody>
       </p:sp>
       <p:sp>
         <p:nvSpPr>
-          <p:cNvPr id="67" name="Rectangle 66">
+          <p:cNvPr id="3" name="Subtitle 2">
             <a:extLst>
               <a:ext uri="{FF2B5EF4-FFF2-40B4-BE49-F238E27FC236}">
-                <a16:creationId xmlns:a16="http://schemas.microsoft.com/office/drawing/2014/main" id="{028836FF-97B4-4EE9-AF5D-39FF0F5AC8A0}"/>
-              </a:ext>
-              <a:ext uri="{C183D7F6-B498-43B3-948B-1728B52AA6E4}">
-                <adec:decorative xmlns:adec="http://schemas.microsoft.com/office/drawing/2017/decorative" val="1"/>
+                <a16:creationId xmlns:a16="http://schemas.microsoft.com/office/drawing/2014/main" id="{921A4182-E054-274D-A8FA-F3493BE75DC9}"/>
               </a:ext>
             </a:extLst>
           </p:cNvPr>
           <p:cNvSpPr>
-            <a:spLocks noGrp="1" noRot="1" noChangeAspect="1" noMove="1" noResize="1" noEditPoints="1" noAdjustHandles="1" noChangeArrowheads="1" noChangeShapeType="1" noTextEdit="1"/>
+            <a:spLocks noGrp="1"/>
           </p:cNvSpPr>
           <p:nvPr>
-            <p:extLst>
-              <p:ext uri="{386F3935-93C4-4BCD-93E2-E3B085C9AB24}">
-                <p16:designElem xmlns:p16="http://schemas.microsoft.com/office/powerpoint/2015/main" val="1"/>
-              </p:ext>
-            </p:extLst>
+            <p:ph type="subTitle" idx="1"/>
           </p:nvPr>
         </p:nvSpPr>
         <p:spPr>
-          <a:xfrm rot="2700000">
-            <a:off x="4145850" y="1748175"/>
-            <a:ext cx="933492" cy="933492"/>
+          <a:xfrm>
+            <a:off x="7267417" y="3632200"/>
+            <a:ext cx="3336001" cy="2354863"/>
           </a:xfrm>
-          <a:prstGeom prst="rect">
-            <a:avLst/>
-          </a:prstGeom>
-          <a:solidFill>
-            <a:schemeClr val="accent4">
-              <a:alpha val="30000"/>
-            </a:schemeClr>
-          </a:solidFill>
-          <a:ln>
-            <a:noFill/>
-          </a:ln>
         </p:spPr>
-        <p:style>
-          <a:lnRef idx="2">
-            <a:schemeClr val="accent1">
-              <a:shade val="50000"/>
-            </a:schemeClr>
-          </a:lnRef>
-          <a:fillRef idx="1">
-            <a:schemeClr val="accent1"/>
-          </a:fillRef>
-          <a:effectRef idx="0">
-            <a:schemeClr val="accent1"/>
-          </a:effectRef>
-          <a:fontRef idx="minor">
-            <a:schemeClr val="lt1"/>
-          </a:fontRef>
-        </p:style>
         <p:txBody>
-          <a:bodyPr rtlCol="0" anchor="ctr"/>
+          <a:bodyPr>
+            <a:normAutofit/>
+          </a:bodyPr>
           <a:lstStyle/>
           <a:p>
-            <a:pPr algn="ctr"/>
-            <a:endParaRPr lang="en-US"/>
+            <a:pPr algn="l"/>
+            <a:endParaRPr lang="en-US" sz="2000">
+              <a:solidFill>
+                <a:schemeClr val="bg1"/>
+              </a:solidFill>
+            </a:endParaRPr>
+          </a:p>
+          <a:p>
+            <a:pPr algn="l"/>
+            <a:r>
+              <a:rPr lang="en-US" sz="2000" b="1">
+                <a:solidFill>
+                  <a:schemeClr val="bg1"/>
+                </a:solidFill>
+                <a:latin typeface="Courier New" panose="02070309020205020404" pitchFamily="49" charset="0"/>
+              </a:rPr>
+              <a:t>Amit Saha</a:t>
+            </a:r>
+          </a:p>
+          <a:p>
+            <a:pPr algn="l"/>
+            <a:r>
+              <a:rPr lang="en-US" sz="2000" b="1">
+                <a:solidFill>
+                  <a:schemeClr val="bg1"/>
+                </a:solidFill>
+                <a:latin typeface="Courier New" panose="02070309020205020404" pitchFamily="49" charset="0"/>
+                <a:hlinkClick r:id="rId3"/>
+              </a:rPr>
+              <a:t>https://echorand.me</a:t>
+            </a:r>
+            <a:r>
+              <a:rPr lang="en-US" sz="2000" b="1">
+                <a:solidFill>
+                  <a:schemeClr val="bg1"/>
+                </a:solidFill>
+                <a:latin typeface="Courier New" panose="02070309020205020404" pitchFamily="49" charset="0"/>
+              </a:rPr>
+              <a:t> </a:t>
+            </a:r>
           </a:p>
         </p:txBody>
       </p:sp>
       <p:sp>
         <p:nvSpPr>
-          <p:cNvPr id="69" name="Rectangle 68">
+          <p:cNvPr id="123" name="Graphic 212">
             <a:extLst>
               <a:ext uri="{FF2B5EF4-FFF2-40B4-BE49-F238E27FC236}">
-                <a16:creationId xmlns:a16="http://schemas.microsoft.com/office/drawing/2014/main" id="{52329D9A-3D48-4B69-939D-2A480F14786F}"/>
-              </a:ext>
-              <a:ext uri="{C183D7F6-B498-43B3-948B-1728B52AA6E4}">
-                <adec:decorative xmlns:adec="http://schemas.microsoft.com/office/drawing/2017/decorative" val="1"/>
-              </a:ext>
-            </a:extLst>
-          </p:cNvPr>
-          <p:cNvSpPr>
-            <a:spLocks noGrp="1" noRot="1" noChangeAspect="1" noMove="1" noResize="1" noEditPoints="1" noAdjustHandles="1" noChangeArrowheads="1" noChangeShapeType="1" noTextEdit="1"/>
-          </p:cNvSpPr>
-          <p:nvPr>
-            <p:extLst>
-              <p:ext uri="{386F3935-93C4-4BCD-93E2-E3B085C9AB24}">
-                <p16:designElem xmlns:p16="http://schemas.microsoft.com/office/powerpoint/2015/main" val="1"/>
-              </p:ext>
-            </p:extLst>
-          </p:nvPr>
-        </p:nvSpPr>
-        <p:spPr>
-          <a:xfrm rot="2700000">
-            <a:off x="1905250" y="5023033"/>
-            <a:ext cx="856138" cy="856138"/>
-          </a:xfrm>
-          <a:prstGeom prst="rect">
-            <a:avLst/>
-          </a:prstGeom>
-          <a:solidFill>
-            <a:schemeClr val="accent4">
-              <a:alpha val="40000"/>
-            </a:schemeClr>
-          </a:solidFill>
-          <a:ln>
-            <a:noFill/>
-          </a:ln>
-        </p:spPr>
-        <p:style>
-          <a:lnRef idx="2">
-            <a:schemeClr val="accent1">
-              <a:shade val="50000"/>
-            </a:schemeClr>
-          </a:lnRef>
-          <a:fillRef idx="1">
-            <a:schemeClr val="accent1"/>
-          </a:fillRef>
-          <a:effectRef idx="0">
-            <a:schemeClr val="accent1"/>
-          </a:effectRef>
-          <a:fontRef idx="minor">
-            <a:schemeClr val="lt1"/>
-          </a:fontRef>
-        </p:style>
-        <p:txBody>
-          <a:bodyPr rtlCol="0" anchor="ctr"/>
-          <a:lstStyle/>
-          <a:p>
-            <a:pPr algn="ctr"/>
-            <a:endParaRPr lang="en-US"/>
-          </a:p>
-        </p:txBody>
-      </p:sp>
-      <p:sp>
-        <p:nvSpPr>
-          <p:cNvPr id="71" name="Rectangle 70">
-            <a:extLst>
-              <a:ext uri="{FF2B5EF4-FFF2-40B4-BE49-F238E27FC236}">
-                <a16:creationId xmlns:a16="http://schemas.microsoft.com/office/drawing/2014/main" id="{2D5CC4CB-7B78-480A-A0AE-A8A35C08E190}"/>
-              </a:ext>
-              <a:ext uri="{C183D7F6-B498-43B3-948B-1728B52AA6E4}">
-                <adec:decorative xmlns:adec="http://schemas.microsoft.com/office/drawing/2017/decorative" val="1"/>
-              </a:ext>
-            </a:extLst>
-          </p:cNvPr>
-          <p:cNvSpPr>
-            <a:spLocks noGrp="1" noRot="1" noChangeAspect="1" noMove="1" noResize="1" noEditPoints="1" noAdjustHandles="1" noChangeArrowheads="1" noChangeShapeType="1" noTextEdit="1"/>
-          </p:cNvSpPr>
-          <p:nvPr>
-            <p:extLst>
-              <p:ext uri="{386F3935-93C4-4BCD-93E2-E3B085C9AB24}">
-                <p16:designElem xmlns:p16="http://schemas.microsoft.com/office/powerpoint/2015/main" val="1"/>
-              </p:ext>
-            </p:extLst>
-          </p:nvPr>
-        </p:nvSpPr>
-        <p:spPr>
-          <a:xfrm rot="2700000">
-            <a:off x="1909228" y="5596021"/>
-            <a:ext cx="381459" cy="381459"/>
-          </a:xfrm>
-          <a:prstGeom prst="rect">
-            <a:avLst/>
-          </a:prstGeom>
-          <a:solidFill>
-            <a:schemeClr val="accent4">
-              <a:alpha val="40000"/>
-            </a:schemeClr>
-          </a:solidFill>
-          <a:ln>
-            <a:noFill/>
-          </a:ln>
-        </p:spPr>
-        <p:style>
-          <a:lnRef idx="2">
-            <a:schemeClr val="accent1">
-              <a:shade val="50000"/>
-            </a:schemeClr>
-          </a:lnRef>
-          <a:fillRef idx="1">
-            <a:schemeClr val="accent1"/>
-          </a:fillRef>
-          <a:effectRef idx="0">
-            <a:schemeClr val="accent1"/>
-          </a:effectRef>
-          <a:fontRef idx="minor">
-            <a:schemeClr val="lt1"/>
-          </a:fontRef>
-        </p:style>
-        <p:txBody>
-          <a:bodyPr rtlCol="0" anchor="ctr"/>
-          <a:lstStyle/>
-          <a:p>
-            <a:pPr algn="ctr"/>
-            <a:endParaRPr lang="en-US"/>
-          </a:p>
-        </p:txBody>
-      </p:sp>
-      <p:sp>
-        <p:nvSpPr>
-          <p:cNvPr id="73" name="Rectangle 72">
-            <a:extLst>
-              <a:ext uri="{FF2B5EF4-FFF2-40B4-BE49-F238E27FC236}">
-                <a16:creationId xmlns:a16="http://schemas.microsoft.com/office/drawing/2014/main" id="{DC580C66-5435-4F00-873E-679D3D5049C0}"/>
-              </a:ext>
-              <a:ext uri="{C183D7F6-B498-43B3-948B-1728B52AA6E4}">
-                <adec:decorative xmlns:adec="http://schemas.microsoft.com/office/drawing/2017/decorative" val="1"/>
-              </a:ext>
-            </a:extLst>
-          </p:cNvPr>
-          <p:cNvSpPr>
-            <a:spLocks noGrp="1" noRot="1" noChangeAspect="1" noMove="1" noResize="1" noEditPoints="1" noAdjustHandles="1" noChangeArrowheads="1" noChangeShapeType="1" noTextEdit="1"/>
-          </p:cNvSpPr>
-          <p:nvPr>
-            <p:extLst>
-              <p:ext uri="{386F3935-93C4-4BCD-93E2-E3B085C9AB24}">
-                <p16:designElem xmlns:p16="http://schemas.microsoft.com/office/powerpoint/2015/main" val="1"/>
-              </p:ext>
-            </p:extLst>
-          </p:nvPr>
-        </p:nvSpPr>
-        <p:spPr>
-          <a:xfrm rot="2700000">
-            <a:off x="4219130" y="5848285"/>
-            <a:ext cx="714978" cy="714978"/>
-          </a:xfrm>
-          <a:prstGeom prst="rect">
-            <a:avLst/>
-          </a:prstGeom>
-          <a:solidFill>
-            <a:schemeClr val="accent4">
-              <a:alpha val="30000"/>
-            </a:schemeClr>
-          </a:solidFill>
-          <a:ln>
-            <a:noFill/>
-          </a:ln>
-        </p:spPr>
-        <p:style>
-          <a:lnRef idx="2">
-            <a:schemeClr val="accent1">
-              <a:shade val="50000"/>
-            </a:schemeClr>
-          </a:lnRef>
-          <a:fillRef idx="1">
-            <a:schemeClr val="accent1"/>
-          </a:fillRef>
-          <a:effectRef idx="0">
-            <a:schemeClr val="accent1"/>
-          </a:effectRef>
-          <a:fontRef idx="minor">
-            <a:schemeClr val="lt1"/>
-          </a:fontRef>
-        </p:style>
-        <p:txBody>
-          <a:bodyPr rtlCol="0" anchor="ctr"/>
-          <a:lstStyle/>
-          <a:p>
-            <a:pPr algn="ctr"/>
-            <a:endParaRPr lang="en-US"/>
-          </a:p>
-        </p:txBody>
-      </p:sp>
-      <p:sp>
-        <p:nvSpPr>
-          <p:cNvPr id="75" name="Isosceles Triangle 74">
-            <a:extLst>
-              <a:ext uri="{FF2B5EF4-FFF2-40B4-BE49-F238E27FC236}">
-                <a16:creationId xmlns:a16="http://schemas.microsoft.com/office/drawing/2014/main" id="{B4AFD177-1A38-4FAE-87D4-840AE22C861C}"/>
+                <a16:creationId xmlns:a16="http://schemas.microsoft.com/office/drawing/2014/main" id="{4FB204DF-284E-45F6-A017-79A4DF57BCCB}"/>
               </a:ext>
               <a:ext uri="{C183D7F6-B498-43B3-948B-1728B52AA6E4}">
                 <adec:decorative xmlns:adec="http://schemas.microsoft.com/office/drawing/2017/decorative" val="1"/>
@@ -9194,134 +9950,32 @@
         </p:nvSpPr>
         <p:spPr>
           <a:xfrm>
-            <a:off x="3935950" y="5474491"/>
-            <a:ext cx="2767017" cy="1383509"/>
-          </a:xfrm>
-          <a:prstGeom prst="triangle">
-            <a:avLst/>
-          </a:prstGeom>
-          <a:solidFill>
-            <a:schemeClr val="accent4">
-              <a:alpha val="30000"/>
-            </a:schemeClr>
-          </a:solidFill>
-          <a:ln>
-            <a:noFill/>
-          </a:ln>
-        </p:spPr>
-        <p:style>
-          <a:lnRef idx="2">
-            <a:schemeClr val="accent1">
-              <a:shade val="50000"/>
-            </a:schemeClr>
-          </a:lnRef>
-          <a:fillRef idx="1">
-            <a:schemeClr val="accent1"/>
-          </a:fillRef>
-          <a:effectRef idx="0">
-            <a:schemeClr val="accent1"/>
-          </a:effectRef>
-          <a:fontRef idx="minor">
-            <a:schemeClr val="lt1"/>
-          </a:fontRef>
-        </p:style>
-        <p:txBody>
-          <a:bodyPr rtlCol="0" anchor="ctr"/>
-          <a:lstStyle/>
-          <a:p>
-            <a:pPr algn="ctr"/>
-            <a:endParaRPr lang="en-US"/>
-          </a:p>
-        </p:txBody>
-      </p:sp>
-      <p:pic>
-        <p:nvPicPr>
-          <p:cNvPr id="54" name="Picture 53">
-            <a:extLst>
-              <a:ext uri="{FF2B5EF4-FFF2-40B4-BE49-F238E27FC236}">
-                <a16:creationId xmlns:a16="http://schemas.microsoft.com/office/drawing/2014/main" id="{013B3E8B-3965-46FE-951F-5A5BD4E8EB41}"/>
-              </a:ext>
-            </a:extLst>
-          </p:cNvPr>
-          <p:cNvPicPr>
-            <a:picLocks noChangeAspect="1"/>
-          </p:cNvPicPr>
-          <p:nvPr/>
-        </p:nvPicPr>
-        <p:blipFill rotWithShape="1">
-          <a:blip r:embed="rId2"/>
-          <a:srcRect l="1590" r="38982" b="-1"/>
-          <a:stretch/>
-        </p:blipFill>
-        <p:spPr>
-          <a:xfrm>
-            <a:off x="321735" y="856791"/>
-            <a:ext cx="4580065" cy="5144417"/>
-          </a:xfrm>
-          <a:prstGeom prst="rect">
-            <a:avLst/>
-          </a:prstGeom>
-        </p:spPr>
-      </p:pic>
-      <p:sp>
-        <p:nvSpPr>
-          <p:cNvPr id="77" name="Freeform: Shape 76">
-            <a:extLst>
-              <a:ext uri="{FF2B5EF4-FFF2-40B4-BE49-F238E27FC236}">
-                <a16:creationId xmlns:a16="http://schemas.microsoft.com/office/drawing/2014/main" id="{655520DF-BCFA-4422-B5D9-A5A1FABAD510}"/>
-              </a:ext>
-              <a:ext uri="{C183D7F6-B498-43B3-948B-1728B52AA6E4}">
-                <adec:decorative xmlns:adec="http://schemas.microsoft.com/office/drawing/2017/decorative" val="1"/>
-              </a:ext>
-            </a:extLst>
-          </p:cNvPr>
-          <p:cNvSpPr>
-            <a:spLocks noGrp="1" noRot="1" noChangeAspect="1" noMove="1" noResize="1" noEditPoints="1" noAdjustHandles="1" noChangeArrowheads="1" noChangeShapeType="1" noTextEdit="1"/>
-          </p:cNvSpPr>
-          <p:nvPr>
-            <p:extLst>
-              <p:ext uri="{386F3935-93C4-4BCD-93E2-E3B085C9AB24}">
-                <p16:designElem xmlns:p16="http://schemas.microsoft.com/office/powerpoint/2015/main" val="1"/>
-              </p:ext>
-            </p:extLst>
-          </p:nvPr>
-        </p:nvSpPr>
-        <p:spPr>
-          <a:xfrm rot="18900000" flipH="1">
-            <a:off x="6274246" y="753376"/>
-            <a:ext cx="5353835" cy="5353835"/>
+            <a:off x="6096000" y="798490"/>
+            <a:ext cx="914565" cy="914565"/>
           </a:xfrm>
           <a:custGeom>
             <a:avLst/>
             <a:gdLst>
-              <a:gd name="connsiteX0" fmla="*/ 690507 w 5353835"/>
-              <a:gd name="connsiteY0" fmla="*/ 5273742 h 5353835"/>
-              <a:gd name="connsiteX1" fmla="*/ 4938299 w 5353835"/>
-              <a:gd name="connsiteY1" fmla="*/ 5273742 h 5353835"/>
-              <a:gd name="connsiteX2" fmla="*/ 4858206 w 5353835"/>
-              <a:gd name="connsiteY2" fmla="*/ 5353835 h 5353835"/>
-              <a:gd name="connsiteX3" fmla="*/ 770600 w 5353835"/>
-              <a:gd name="connsiteY3" fmla="*/ 5353835 h 5353835"/>
-              <a:gd name="connsiteX4" fmla="*/ 433255 w 5353835"/>
-              <a:gd name="connsiteY4" fmla="*/ 80093 h 5353835"/>
-              <a:gd name="connsiteX5" fmla="*/ 513348 w 5353835"/>
-              <a:gd name="connsiteY5" fmla="*/ 0 h 5353835"/>
-              <a:gd name="connsiteX6" fmla="*/ 5353835 w 5353835"/>
-              <a:gd name="connsiteY6" fmla="*/ 0 h 5353835"/>
-              <a:gd name="connsiteX7" fmla="*/ 5353835 w 5353835"/>
-              <a:gd name="connsiteY7" fmla="*/ 4858206 h 5353835"/>
-              <a:gd name="connsiteX8" fmla="*/ 5273742 w 5353835"/>
-              <a:gd name="connsiteY8" fmla="*/ 4938299 h 5353835"/>
-              <a:gd name="connsiteX9" fmla="*/ 5273742 w 5353835"/>
-              <a:gd name="connsiteY9" fmla="*/ 80093 h 5353835"/>
-              <a:gd name="connsiteX10" fmla="*/ 0 w 5353835"/>
-              <a:gd name="connsiteY10" fmla="*/ 513348 h 5353835"/>
-              <a:gd name="connsiteX11" fmla="*/ 80093 w 5353835"/>
-              <a:gd name="connsiteY11" fmla="*/ 433255 h 5353835"/>
-              <a:gd name="connsiteX12" fmla="*/ 80093 w 5353835"/>
-              <a:gd name="connsiteY12" fmla="*/ 4663328 h 5353835"/>
-              <a:gd name="connsiteX13" fmla="*/ 0 w 5353835"/>
-              <a:gd name="connsiteY13" fmla="*/ 4583235 h 5353835"/>
+              <a:gd name="connsiteX0" fmla="*/ 403574 w 807148"/>
+              <a:gd name="connsiteY0" fmla="*/ 0 h 807148"/>
+              <a:gd name="connsiteX1" fmla="*/ 0 w 807148"/>
+              <a:gd name="connsiteY1" fmla="*/ 403574 h 807148"/>
+              <a:gd name="connsiteX2" fmla="*/ 403574 w 807148"/>
+              <a:gd name="connsiteY2" fmla="*/ 807149 h 807148"/>
+              <a:gd name="connsiteX3" fmla="*/ 807149 w 807148"/>
+              <a:gd name="connsiteY3" fmla="*/ 403574 h 807148"/>
+              <a:gd name="connsiteX4" fmla="*/ 403574 w 807148"/>
+              <a:gd name="connsiteY4" fmla="*/ 0 h 807148"/>
+              <a:gd name="connsiteX5" fmla="*/ 403574 w 807148"/>
+              <a:gd name="connsiteY5" fmla="*/ 667988 h 807148"/>
+              <a:gd name="connsiteX6" fmla="*/ 139160 w 807148"/>
+              <a:gd name="connsiteY6" fmla="*/ 403574 h 807148"/>
+              <a:gd name="connsiteX7" fmla="*/ 403574 w 807148"/>
+              <a:gd name="connsiteY7" fmla="*/ 139160 h 807148"/>
+              <a:gd name="connsiteX8" fmla="*/ 667988 w 807148"/>
+              <a:gd name="connsiteY8" fmla="*/ 403574 h 807148"/>
+              <a:gd name="connsiteX9" fmla="*/ 403574 w 807148"/>
+              <a:gd name="connsiteY9" fmla="*/ 667988 h 807148"/>
             </a:gdLst>
             <a:ahLst/>
             <a:cxnLst>
@@ -9355,77 +10009,68 @@
               <a:cxn ang="0">
                 <a:pos x="connsiteX9" y="connsiteY9"/>
               </a:cxn>
-              <a:cxn ang="0">
-                <a:pos x="connsiteX10" y="connsiteY10"/>
-              </a:cxn>
-              <a:cxn ang="0">
-                <a:pos x="connsiteX11" y="connsiteY11"/>
-              </a:cxn>
-              <a:cxn ang="0">
-                <a:pos x="connsiteX12" y="connsiteY12"/>
-              </a:cxn>
-              <a:cxn ang="0">
-                <a:pos x="connsiteX13" y="connsiteY13"/>
-              </a:cxn>
             </a:cxnLst>
             <a:rect l="l" t="t" r="r" b="b"/>
             <a:pathLst>
-              <a:path w="5353835" h="5353835">
+              <a:path w="807148" h="807148">
                 <a:moveTo>
-                  <a:pt x="690507" y="5273742"/>
+                  <a:pt x="403574" y="0"/>
                 </a:moveTo>
-                <a:lnTo>
-                  <a:pt x="4938299" y="5273742"/>
-                </a:lnTo>
-                <a:lnTo>
-                  <a:pt x="4858206" y="5353835"/>
-                </a:lnTo>
-                <a:lnTo>
-                  <a:pt x="770600" y="5353835"/>
-                </a:lnTo>
+                <a:cubicBezTo>
+                  <a:pt x="180689" y="0"/>
+                  <a:pt x="0" y="180689"/>
+                  <a:pt x="0" y="403574"/>
+                </a:cubicBezTo>
+                <a:cubicBezTo>
+                  <a:pt x="0" y="626459"/>
+                  <a:pt x="180689" y="807149"/>
+                  <a:pt x="403574" y="807149"/>
+                </a:cubicBezTo>
+                <a:cubicBezTo>
+                  <a:pt x="626459" y="807149"/>
+                  <a:pt x="807149" y="626459"/>
+                  <a:pt x="807149" y="403574"/>
+                </a:cubicBezTo>
+                <a:cubicBezTo>
+                  <a:pt x="807149" y="180689"/>
+                  <a:pt x="626459" y="0"/>
+                  <a:pt x="403574" y="0"/>
+                </a:cubicBezTo>
                 <a:close/>
                 <a:moveTo>
-                  <a:pt x="433255" y="80093"/>
+                  <a:pt x="403574" y="667988"/>
                 </a:moveTo>
-                <a:lnTo>
-                  <a:pt x="513348" y="0"/>
-                </a:lnTo>
-                <a:lnTo>
-                  <a:pt x="5353835" y="0"/>
-                </a:lnTo>
-                <a:lnTo>
-                  <a:pt x="5353835" y="4858206"/>
-                </a:lnTo>
-                <a:lnTo>
-                  <a:pt x="5273742" y="4938299"/>
-                </a:lnTo>
-                <a:lnTo>
-                  <a:pt x="5273742" y="80093"/>
-                </a:lnTo>
-                <a:close/>
-                <a:moveTo>
-                  <a:pt x="0" y="513348"/>
-                </a:moveTo>
-                <a:lnTo>
-                  <a:pt x="80093" y="433255"/>
-                </a:lnTo>
-                <a:lnTo>
-                  <a:pt x="80093" y="4663328"/>
-                </a:lnTo>
-                <a:lnTo>
-                  <a:pt x="0" y="4583235"/>
-                </a:lnTo>
+                <a:cubicBezTo>
+                  <a:pt x="257556" y="667988"/>
+                  <a:pt x="139160" y="549593"/>
+                  <a:pt x="139160" y="403574"/>
+                </a:cubicBezTo>
+                <a:cubicBezTo>
+                  <a:pt x="139160" y="257556"/>
+                  <a:pt x="257556" y="139160"/>
+                  <a:pt x="403574" y="139160"/>
+                </a:cubicBezTo>
+                <a:cubicBezTo>
+                  <a:pt x="549593" y="139160"/>
+                  <a:pt x="667988" y="257556"/>
+                  <a:pt x="667988" y="403574"/>
+                </a:cubicBezTo>
+                <a:cubicBezTo>
+                  <a:pt x="667988" y="549593"/>
+                  <a:pt x="549593" y="667988"/>
+                  <a:pt x="403574" y="667988"/>
+                </a:cubicBezTo>
                 <a:close/>
               </a:path>
             </a:pathLst>
           </a:custGeom>
           <a:solidFill>
-            <a:srgbClr val="FFFFFF">
-              <a:alpha val="60000"/>
-            </a:srgbClr>
+            <a:srgbClr val="FFFFFF"/>
           </a:solidFill>
-          <a:ln>
-            <a:noFill/>
+          <a:ln w="28575">
+            <a:solidFill>
+              <a:schemeClr val="tx1"/>
+            </a:solidFill>
           </a:ln>
         </p:spPr>
         <p:style>
@@ -9445,7 +10090,10 @@
           </a:fontRef>
         </p:style>
         <p:txBody>
-          <a:bodyPr wrap="square" rtlCol="0" anchor="ctr">
+          <a:bodyPr rot="0" spcFirstLastPara="0" vertOverflow="overflow" horzOverflow="overflow" vert="horz" wrap="square" lIns="91440" tIns="45720" rIns="91440" bIns="45720" numCol="1" spcCol="0" rtlCol="0" fromWordArt="0" anchor="ctr" anchorCtr="0" forceAA="0" compatLnSpc="1">
+            <a:prstTxWarp prst="textNoShape">
+              <a:avLst/>
+            </a:prstTxWarp>
             <a:noAutofit/>
           </a:bodyPr>
           <a:lstStyle/>
@@ -9453,7 +10101,7 @@
             <a:pPr algn="ctr"/>
             <a:endParaRPr lang="en-US">
               <a:solidFill>
-                <a:schemeClr val="tx1"/>
+                <a:schemeClr val="lt1"/>
               </a:solidFill>
             </a:endParaRPr>
           </a:p>
@@ -9461,131 +10109,800 @@
       </p:sp>
       <p:sp>
         <p:nvSpPr>
-          <p:cNvPr id="3" name="Subtitle 2">
+          <p:cNvPr id="118" name="Graphic 212">
             <a:extLst>
               <a:ext uri="{FF2B5EF4-FFF2-40B4-BE49-F238E27FC236}">
-                <a16:creationId xmlns:a16="http://schemas.microsoft.com/office/drawing/2014/main" id="{921A4182-E054-274D-A8FA-F3493BE75DC9}"/>
+                <a16:creationId xmlns:a16="http://schemas.microsoft.com/office/drawing/2014/main" id="{6908275D-177E-42F2-8887-134AFE8B70CC}"/>
+              </a:ext>
+              <a:ext uri="{C183D7F6-B498-43B3-948B-1728B52AA6E4}">
+                <adec:decorative xmlns:adec="http://schemas.microsoft.com/office/drawing/2017/decorative" val="1"/>
               </a:ext>
             </a:extLst>
           </p:cNvPr>
           <p:cNvSpPr>
-            <a:spLocks noGrp="1"/>
+            <a:spLocks noGrp="1" noRot="1" noChangeAspect="1" noMove="1" noResize="1" noEditPoints="1" noAdjustHandles="1" noChangeArrowheads="1" noChangeShapeType="1" noTextEdit="1"/>
           </p:cNvSpPr>
           <p:nvPr>
-            <p:ph type="subTitle" idx="1"/>
+            <p:extLst>
+              <p:ext uri="{386F3935-93C4-4BCD-93E2-E3B085C9AB24}">
+                <p16:designElem xmlns:p16="http://schemas.microsoft.com/office/powerpoint/2015/main" val="1"/>
+              </p:ext>
+            </p:extLst>
           </p:nvPr>
         </p:nvSpPr>
         <p:spPr>
           <a:xfrm>
-            <a:off x="7757565" y="4557900"/>
-            <a:ext cx="2442690" cy="915772"/>
+            <a:off x="6096000" y="798490"/>
+            <a:ext cx="914565" cy="914565"/>
           </a:xfrm>
-          <a:noFill/>
+          <a:custGeom>
+            <a:avLst/>
+            <a:gdLst>
+              <a:gd name="connsiteX0" fmla="*/ 403574 w 807148"/>
+              <a:gd name="connsiteY0" fmla="*/ 0 h 807148"/>
+              <a:gd name="connsiteX1" fmla="*/ 0 w 807148"/>
+              <a:gd name="connsiteY1" fmla="*/ 403574 h 807148"/>
+              <a:gd name="connsiteX2" fmla="*/ 403574 w 807148"/>
+              <a:gd name="connsiteY2" fmla="*/ 807149 h 807148"/>
+              <a:gd name="connsiteX3" fmla="*/ 807149 w 807148"/>
+              <a:gd name="connsiteY3" fmla="*/ 403574 h 807148"/>
+              <a:gd name="connsiteX4" fmla="*/ 403574 w 807148"/>
+              <a:gd name="connsiteY4" fmla="*/ 0 h 807148"/>
+              <a:gd name="connsiteX5" fmla="*/ 403574 w 807148"/>
+              <a:gd name="connsiteY5" fmla="*/ 667988 h 807148"/>
+              <a:gd name="connsiteX6" fmla="*/ 139160 w 807148"/>
+              <a:gd name="connsiteY6" fmla="*/ 403574 h 807148"/>
+              <a:gd name="connsiteX7" fmla="*/ 403574 w 807148"/>
+              <a:gd name="connsiteY7" fmla="*/ 139160 h 807148"/>
+              <a:gd name="connsiteX8" fmla="*/ 667988 w 807148"/>
+              <a:gd name="connsiteY8" fmla="*/ 403574 h 807148"/>
+              <a:gd name="connsiteX9" fmla="*/ 403574 w 807148"/>
+              <a:gd name="connsiteY9" fmla="*/ 667988 h 807148"/>
+            </a:gdLst>
+            <a:ahLst/>
+            <a:cxnLst>
+              <a:cxn ang="0">
+                <a:pos x="connsiteX0" y="connsiteY0"/>
+              </a:cxn>
+              <a:cxn ang="0">
+                <a:pos x="connsiteX1" y="connsiteY1"/>
+              </a:cxn>
+              <a:cxn ang="0">
+                <a:pos x="connsiteX2" y="connsiteY2"/>
+              </a:cxn>
+              <a:cxn ang="0">
+                <a:pos x="connsiteX3" y="connsiteY3"/>
+              </a:cxn>
+              <a:cxn ang="0">
+                <a:pos x="connsiteX4" y="connsiteY4"/>
+              </a:cxn>
+              <a:cxn ang="0">
+                <a:pos x="connsiteX5" y="connsiteY5"/>
+              </a:cxn>
+              <a:cxn ang="0">
+                <a:pos x="connsiteX6" y="connsiteY6"/>
+              </a:cxn>
+              <a:cxn ang="0">
+                <a:pos x="connsiteX7" y="connsiteY7"/>
+              </a:cxn>
+              <a:cxn ang="0">
+                <a:pos x="connsiteX8" y="connsiteY8"/>
+              </a:cxn>
+              <a:cxn ang="0">
+                <a:pos x="connsiteX9" y="connsiteY9"/>
+              </a:cxn>
+            </a:cxnLst>
+            <a:rect l="l" t="t" r="r" b="b"/>
+            <a:pathLst>
+              <a:path w="807148" h="807148">
+                <a:moveTo>
+                  <a:pt x="403574" y="0"/>
+                </a:moveTo>
+                <a:cubicBezTo>
+                  <a:pt x="180689" y="0"/>
+                  <a:pt x="0" y="180689"/>
+                  <a:pt x="0" y="403574"/>
+                </a:cubicBezTo>
+                <a:cubicBezTo>
+                  <a:pt x="0" y="626459"/>
+                  <a:pt x="180689" y="807149"/>
+                  <a:pt x="403574" y="807149"/>
+                </a:cubicBezTo>
+                <a:cubicBezTo>
+                  <a:pt x="626459" y="807149"/>
+                  <a:pt x="807149" y="626459"/>
+                  <a:pt x="807149" y="403574"/>
+                </a:cubicBezTo>
+                <a:cubicBezTo>
+                  <a:pt x="807149" y="180689"/>
+                  <a:pt x="626459" y="0"/>
+                  <a:pt x="403574" y="0"/>
+                </a:cubicBezTo>
+                <a:close/>
+                <a:moveTo>
+                  <a:pt x="403574" y="667988"/>
+                </a:moveTo>
+                <a:cubicBezTo>
+                  <a:pt x="257556" y="667988"/>
+                  <a:pt x="139160" y="549593"/>
+                  <a:pt x="139160" y="403574"/>
+                </a:cubicBezTo>
+                <a:cubicBezTo>
+                  <a:pt x="139160" y="257556"/>
+                  <a:pt x="257556" y="139160"/>
+                  <a:pt x="403574" y="139160"/>
+                </a:cubicBezTo>
+                <a:cubicBezTo>
+                  <a:pt x="549593" y="139160"/>
+                  <a:pt x="667988" y="257556"/>
+                  <a:pt x="667988" y="403574"/>
+                </a:cubicBezTo>
+                <a:cubicBezTo>
+                  <a:pt x="667988" y="549593"/>
+                  <a:pt x="549593" y="667988"/>
+                  <a:pt x="403574" y="667988"/>
+                </a:cubicBezTo>
+                <a:close/>
+              </a:path>
+            </a:pathLst>
+          </a:custGeom>
+          <a:solidFill>
+            <a:schemeClr val="accent2">
+              <a:alpha val="30000"/>
+            </a:schemeClr>
+          </a:solidFill>
+          <a:ln w="28575">
+            <a:solidFill>
+              <a:schemeClr val="bg1"/>
+            </a:solidFill>
+          </a:ln>
         </p:spPr>
+        <p:style>
+          <a:lnRef idx="2">
+            <a:schemeClr val="accent1">
+              <a:shade val="50000"/>
+            </a:schemeClr>
+          </a:lnRef>
+          <a:fillRef idx="1">
+            <a:schemeClr val="accent1"/>
+          </a:fillRef>
+          <a:effectRef idx="0">
+            <a:schemeClr val="accent1"/>
+          </a:effectRef>
+          <a:fontRef idx="minor">
+            <a:schemeClr val="lt1"/>
+          </a:fontRef>
+        </p:style>
         <p:txBody>
-          <a:bodyPr>
-            <a:normAutofit/>
+          <a:bodyPr rot="0" spcFirstLastPara="0" vertOverflow="overflow" horzOverflow="overflow" vert="horz" wrap="square" lIns="91440" tIns="45720" rIns="91440" bIns="45720" numCol="1" spcCol="0" rtlCol="0" fromWordArt="0" anchor="ctr" anchorCtr="0" forceAA="0" compatLnSpc="1">
+            <a:prstTxWarp prst="textNoShape">
+              <a:avLst/>
+            </a:prstTxWarp>
+            <a:noAutofit/>
           </a:bodyPr>
           <a:lstStyle/>
           <a:p>
-            <a:endParaRPr lang="en-US" sz="1300">
+            <a:pPr algn="ctr"/>
+            <a:endParaRPr lang="en-US">
               <a:solidFill>
-                <a:srgbClr val="080808"/>
+                <a:schemeClr val="lt1"/>
               </a:solidFill>
             </a:endParaRPr>
-          </a:p>
-          <a:p>
-            <a:r>
-              <a:rPr lang="en-US" sz="1300" b="1">
-                <a:solidFill>
-                  <a:srgbClr val="080808"/>
-                </a:solidFill>
-                <a:latin typeface="Courier New" panose="02070309020205020404" pitchFamily="49" charset="0"/>
-              </a:rPr>
-              <a:t>Amit Saha</a:t>
-            </a:r>
-          </a:p>
-          <a:p>
-            <a:r>
-              <a:rPr lang="en-US" sz="1300" b="1">
-                <a:solidFill>
-                  <a:srgbClr val="080808"/>
-                </a:solidFill>
-                <a:latin typeface="Courier New" panose="02070309020205020404" pitchFamily="49" charset="0"/>
-                <a:hlinkClick r:id="rId3"/>
-              </a:rPr>
-              <a:t>https://echorand.me</a:t>
-            </a:r>
-            <a:r>
-              <a:rPr lang="en-US" sz="1300" b="1">
-                <a:solidFill>
-                  <a:srgbClr val="080808"/>
-                </a:solidFill>
-                <a:latin typeface="Courier New" panose="02070309020205020404" pitchFamily="49" charset="0"/>
-              </a:rPr>
-              <a:t> </a:t>
-            </a:r>
           </a:p>
         </p:txBody>
       </p:sp>
       <p:sp>
         <p:nvSpPr>
-          <p:cNvPr id="2" name="Title 1">
+          <p:cNvPr id="120" name="Oval 119">
             <a:extLst>
               <a:ext uri="{FF2B5EF4-FFF2-40B4-BE49-F238E27FC236}">
-                <a16:creationId xmlns:a16="http://schemas.microsoft.com/office/drawing/2014/main" id="{C5314FCA-B6E2-A640-9875-C1F986D0DB09}"/>
+                <a16:creationId xmlns:a16="http://schemas.microsoft.com/office/drawing/2014/main" id="{4D1A5E71-B6B6-486A-8CDC-C7ABD9B903F6}"/>
+              </a:ext>
+              <a:ext uri="{C183D7F6-B498-43B3-948B-1728B52AA6E4}">
+                <adec:decorative xmlns:adec="http://schemas.microsoft.com/office/drawing/2017/decorative" val="1"/>
               </a:ext>
             </a:extLst>
           </p:cNvPr>
           <p:cNvSpPr>
-            <a:spLocks noGrp="1"/>
+            <a:spLocks noGrp="1" noRot="1" noChangeAspect="1" noMove="1" noResize="1" noEditPoints="1" noAdjustHandles="1" noChangeArrowheads="1" noChangeShapeType="1" noTextEdit="1"/>
           </p:cNvSpPr>
           <p:nvPr>
-            <p:ph type="ctrTitle"/>
+            <p:extLst>
+              <p:ext uri="{386F3935-93C4-4BCD-93E2-E3B085C9AB24}">
+                <p16:designElem xmlns:p16="http://schemas.microsoft.com/office/powerpoint/2015/main" val="1"/>
+              </p:ext>
+            </p:extLst>
           </p:nvPr>
         </p:nvSpPr>
         <p:spPr>
           <a:xfrm>
-            <a:off x="6826981" y="2452526"/>
-            <a:ext cx="4248318" cy="1952947"/>
+            <a:off x="1075340" y="5287341"/>
+            <a:ext cx="319941" cy="319941"/>
           </a:xfrm>
-          <a:noFill/>
+          <a:prstGeom prst="ellipse">
+            <a:avLst/>
+          </a:prstGeom>
+          <a:solidFill>
+            <a:srgbClr val="FFFFFF"/>
+          </a:solidFill>
+          <a:ln w="28575">
+            <a:solidFill>
+              <a:schemeClr val="tx1"/>
+            </a:solidFill>
+          </a:ln>
         </p:spPr>
+        <p:style>
+          <a:lnRef idx="2">
+            <a:schemeClr val="accent1">
+              <a:shade val="50000"/>
+            </a:schemeClr>
+          </a:lnRef>
+          <a:fillRef idx="1">
+            <a:schemeClr val="accent1"/>
+          </a:fillRef>
+          <a:effectRef idx="0">
+            <a:schemeClr val="accent1"/>
+          </a:effectRef>
+          <a:fontRef idx="minor">
+            <a:schemeClr val="lt1"/>
+          </a:fontRef>
+        </p:style>
         <p:txBody>
-          <a:bodyPr anchor="ctr">
-            <a:normAutofit/>
+          <a:bodyPr rot="0" spcFirstLastPara="0" vertOverflow="overflow" horzOverflow="overflow" vert="horz" wrap="square" lIns="91440" tIns="45720" rIns="91440" bIns="45720" numCol="1" spcCol="0" rtlCol="0" fromWordArt="0" anchor="ctr" anchorCtr="0" forceAA="0" compatLnSpc="1">
+            <a:prstTxWarp prst="textNoShape">
+              <a:avLst/>
+            </a:prstTxWarp>
+            <a:noAutofit/>
           </a:bodyPr>
           <a:lstStyle/>
           <a:p>
-            <a:r>
-              <a:rPr lang="en-US" sz="3600">
-                <a:solidFill>
-                  <a:srgbClr val="080808"/>
-                </a:solidFill>
-                <a:latin typeface="Century" panose="02040604050505020304" pitchFamily="18" charset="0"/>
-              </a:rPr>
-              <a:t>static website + go:embed =&gt;</a:t>
-            </a:r>
-            <a:br>
-              <a:rPr lang="en-US" sz="3600">
-                <a:solidFill>
-                  <a:srgbClr val="080808"/>
-                </a:solidFill>
-                <a:latin typeface="Century" panose="02040604050505020304" pitchFamily="18" charset="0"/>
-              </a:rPr>
-            </a:br>
-            <a:r>
-              <a:rPr lang="en-US" sz="3600">
-                <a:solidFill>
-                  <a:srgbClr val="080808"/>
-                </a:solidFill>
-                <a:latin typeface="Century" panose="02040604050505020304" pitchFamily="18" charset="0"/>
-              </a:rPr>
-              <a:t>./website</a:t>
-            </a:r>
+            <a:pPr algn="ctr"/>
+            <a:endParaRPr lang="en-US"/>
           </a:p>
         </p:txBody>
       </p:sp>
+      <p:sp>
+        <p:nvSpPr>
+          <p:cNvPr id="122" name="Oval 121">
+            <a:extLst>
+              <a:ext uri="{FF2B5EF4-FFF2-40B4-BE49-F238E27FC236}">
+                <a16:creationId xmlns:a16="http://schemas.microsoft.com/office/drawing/2014/main" id="{E32B36D4-0C87-4882-A12C-18A91DBAE28D}"/>
+              </a:ext>
+              <a:ext uri="{C183D7F6-B498-43B3-948B-1728B52AA6E4}">
+                <adec:decorative xmlns:adec="http://schemas.microsoft.com/office/drawing/2017/decorative" val="1"/>
+              </a:ext>
+            </a:extLst>
+          </p:cNvPr>
+          <p:cNvSpPr>
+            <a:spLocks noGrp="1" noRot="1" noChangeAspect="1" noMove="1" noResize="1" noEditPoints="1" noAdjustHandles="1" noChangeArrowheads="1" noChangeShapeType="1" noTextEdit="1"/>
+          </p:cNvSpPr>
+          <p:nvPr>
+            <p:extLst>
+              <p:ext uri="{386F3935-93C4-4BCD-93E2-E3B085C9AB24}">
+                <p16:designElem xmlns:p16="http://schemas.microsoft.com/office/powerpoint/2015/main" val="1"/>
+              </p:ext>
+            </p:extLst>
+          </p:nvPr>
+        </p:nvSpPr>
+        <p:spPr>
+          <a:xfrm>
+            <a:off x="1075340" y="5287341"/>
+            <a:ext cx="319941" cy="319941"/>
+          </a:xfrm>
+          <a:prstGeom prst="ellipse">
+            <a:avLst/>
+          </a:prstGeom>
+          <a:solidFill>
+            <a:schemeClr val="accent6">
+              <a:alpha val="30000"/>
+            </a:schemeClr>
+          </a:solidFill>
+          <a:ln w="28575">
+            <a:solidFill>
+              <a:schemeClr val="bg1"/>
+            </a:solidFill>
+          </a:ln>
+        </p:spPr>
+        <p:style>
+          <a:lnRef idx="2">
+            <a:schemeClr val="accent1">
+              <a:shade val="50000"/>
+            </a:schemeClr>
+          </a:lnRef>
+          <a:fillRef idx="1">
+            <a:schemeClr val="accent1"/>
+          </a:fillRef>
+          <a:effectRef idx="0">
+            <a:schemeClr val="accent1"/>
+          </a:effectRef>
+          <a:fontRef idx="minor">
+            <a:schemeClr val="lt1"/>
+          </a:fontRef>
+        </p:style>
+        <p:txBody>
+          <a:bodyPr rot="0" spcFirstLastPara="0" vertOverflow="overflow" horzOverflow="overflow" vert="horz" wrap="square" lIns="91440" tIns="45720" rIns="91440" bIns="45720" numCol="1" spcCol="0" rtlCol="0" fromWordArt="0" anchor="ctr" anchorCtr="0" forceAA="0" compatLnSpc="1">
+            <a:prstTxWarp prst="textNoShape">
+              <a:avLst/>
+            </a:prstTxWarp>
+            <a:noAutofit/>
+          </a:bodyPr>
+          <a:lstStyle/>
+          <a:p>
+            <a:pPr algn="ctr"/>
+            <a:endParaRPr lang="en-US"/>
+          </a:p>
+        </p:txBody>
+      </p:sp>
+      <p:grpSp>
+        <p:nvGrpSpPr>
+          <p:cNvPr id="124" name="Graphic 185">
+            <a:extLst>
+              <a:ext uri="{FF2B5EF4-FFF2-40B4-BE49-F238E27FC236}">
+                <a16:creationId xmlns:a16="http://schemas.microsoft.com/office/drawing/2014/main" id="{FB9739EB-7F66-433D-841F-AB3CD18700B7}"/>
+              </a:ext>
+              <a:ext uri="{C183D7F6-B498-43B3-948B-1728B52AA6E4}">
+                <adec:decorative xmlns:adec="http://schemas.microsoft.com/office/drawing/2017/decorative" val="1"/>
+              </a:ext>
+            </a:extLst>
+          </p:cNvPr>
+          <p:cNvGrpSpPr>
+            <a:grpSpLocks noGrp="1" noUngrp="1" noRot="1" noChangeAspect="1" noMove="1" noResize="1"/>
+          </p:cNvGrpSpPr>
+          <p:nvPr>
+            <p:extLst>
+              <p:ext uri="{386F3935-93C4-4BCD-93E2-E3B085C9AB24}">
+                <p16:designElem xmlns:p16="http://schemas.microsoft.com/office/powerpoint/2015/main" val="1"/>
+              </p:ext>
+            </p:extLst>
+          </p:nvPr>
+        </p:nvGrpSpPr>
+        <p:grpSpPr>
+          <a:xfrm>
+            <a:off x="10428634" y="5987064"/>
+            <a:ext cx="1054466" cy="469689"/>
+            <a:chOff x="9841624" y="4115729"/>
+            <a:chExt cx="602169" cy="268223"/>
+          </a:xfrm>
+          <a:solidFill>
+            <a:schemeClr val="bg1"/>
+          </a:solidFill>
+        </p:grpSpPr>
+        <p:sp>
+          <p:nvSpPr>
+            <p:cNvPr id="125" name="Freeform: Shape 124">
+              <a:extLst>
+                <a:ext uri="{FF2B5EF4-FFF2-40B4-BE49-F238E27FC236}">
+                  <a16:creationId xmlns:a16="http://schemas.microsoft.com/office/drawing/2014/main" id="{104F2BBD-A005-4DCB-9566-F2351050BEE6}"/>
+                </a:ext>
+                <a:ext uri="{C183D7F6-B498-43B3-948B-1728B52AA6E4}">
+                  <adec:decorative xmlns:adec="http://schemas.microsoft.com/office/drawing/2017/decorative" val="1"/>
+                </a:ext>
+              </a:extLst>
+            </p:cNvPr>
+            <p:cNvSpPr/>
+            <p:nvPr>
+              <p:extLst>
+                <p:ext uri="{386F3935-93C4-4BCD-93E2-E3B085C9AB24}">
+                  <p16:designElem xmlns:p16="http://schemas.microsoft.com/office/powerpoint/2015/main" val="1"/>
+                </p:ext>
+              </p:extLst>
+            </p:nvPr>
+          </p:nvSpPr>
+          <p:spPr>
+            <a:xfrm>
+              <a:off x="9841624" y="4115729"/>
+              <a:ext cx="202882" cy="268223"/>
+            </a:xfrm>
+            <a:custGeom>
+              <a:avLst/>
+              <a:gdLst>
+                <a:gd name="connsiteX0" fmla="*/ 20765 w 202882"/>
+                <a:gd name="connsiteY0" fmla="*/ 268224 h 268223"/>
+                <a:gd name="connsiteX1" fmla="*/ 0 w 202882"/>
+                <a:gd name="connsiteY1" fmla="*/ 268224 h 268223"/>
+                <a:gd name="connsiteX2" fmla="*/ 182118 w 202882"/>
+                <a:gd name="connsiteY2" fmla="*/ 0 h 268223"/>
+                <a:gd name="connsiteX3" fmla="*/ 202883 w 202882"/>
+                <a:gd name="connsiteY3" fmla="*/ 0 h 268223"/>
+              </a:gdLst>
+              <a:ahLst/>
+              <a:cxnLst>
+                <a:cxn ang="0">
+                  <a:pos x="connsiteX0" y="connsiteY0"/>
+                </a:cxn>
+                <a:cxn ang="0">
+                  <a:pos x="connsiteX1" y="connsiteY1"/>
+                </a:cxn>
+                <a:cxn ang="0">
+                  <a:pos x="connsiteX2" y="connsiteY2"/>
+                </a:cxn>
+                <a:cxn ang="0">
+                  <a:pos x="connsiteX3" y="connsiteY3"/>
+                </a:cxn>
+              </a:cxnLst>
+              <a:rect l="l" t="t" r="r" b="b"/>
+              <a:pathLst>
+                <a:path w="202882" h="268223">
+                  <a:moveTo>
+                    <a:pt x="20765" y="268224"/>
+                  </a:moveTo>
+                  <a:lnTo>
+                    <a:pt x="0" y="268224"/>
+                  </a:lnTo>
+                  <a:lnTo>
+                    <a:pt x="182118" y="0"/>
+                  </a:lnTo>
+                  <a:lnTo>
+                    <a:pt x="202883" y="0"/>
+                  </a:lnTo>
+                  <a:close/>
+                </a:path>
+              </a:pathLst>
+            </a:custGeom>
+            <a:grpFill/>
+            <a:ln w="9525" cap="flat">
+              <a:noFill/>
+              <a:prstDash val="solid"/>
+              <a:miter/>
+            </a:ln>
+          </p:spPr>
+          <p:txBody>
+            <a:bodyPr rtlCol="0" anchor="ctr"/>
+            <a:lstStyle/>
+            <a:p>
+              <a:endParaRPr lang="en-US"/>
+            </a:p>
+          </p:txBody>
+        </p:sp>
+        <p:sp>
+          <p:nvSpPr>
+            <p:cNvPr id="126" name="Freeform: Shape 125">
+              <a:extLst>
+                <a:ext uri="{FF2B5EF4-FFF2-40B4-BE49-F238E27FC236}">
+                  <a16:creationId xmlns:a16="http://schemas.microsoft.com/office/drawing/2014/main" id="{8B00DEC7-198B-49D1-98FD-018F3ECFCF4C}"/>
+                </a:ext>
+                <a:ext uri="{C183D7F6-B498-43B3-948B-1728B52AA6E4}">
+                  <adec:decorative xmlns:adec="http://schemas.microsoft.com/office/drawing/2017/decorative" val="1"/>
+                </a:ext>
+              </a:extLst>
+            </p:cNvPr>
+            <p:cNvSpPr/>
+            <p:nvPr>
+              <p:extLst>
+                <p:ext uri="{386F3935-93C4-4BCD-93E2-E3B085C9AB24}">
+                  <p16:designElem xmlns:p16="http://schemas.microsoft.com/office/powerpoint/2015/main" val="1"/>
+                </p:ext>
+              </p:extLst>
+            </p:nvPr>
+          </p:nvSpPr>
+          <p:spPr>
+            <a:xfrm>
+              <a:off x="9941445" y="4115729"/>
+              <a:ext cx="202882" cy="268223"/>
+            </a:xfrm>
+            <a:custGeom>
+              <a:avLst/>
+              <a:gdLst>
+                <a:gd name="connsiteX0" fmla="*/ 20765 w 202882"/>
+                <a:gd name="connsiteY0" fmla="*/ 268224 h 268223"/>
+                <a:gd name="connsiteX1" fmla="*/ 0 w 202882"/>
+                <a:gd name="connsiteY1" fmla="*/ 268224 h 268223"/>
+                <a:gd name="connsiteX2" fmla="*/ 182118 w 202882"/>
+                <a:gd name="connsiteY2" fmla="*/ 0 h 268223"/>
+                <a:gd name="connsiteX3" fmla="*/ 202883 w 202882"/>
+                <a:gd name="connsiteY3" fmla="*/ 0 h 268223"/>
+              </a:gdLst>
+              <a:ahLst/>
+              <a:cxnLst>
+                <a:cxn ang="0">
+                  <a:pos x="connsiteX0" y="connsiteY0"/>
+                </a:cxn>
+                <a:cxn ang="0">
+                  <a:pos x="connsiteX1" y="connsiteY1"/>
+                </a:cxn>
+                <a:cxn ang="0">
+                  <a:pos x="connsiteX2" y="connsiteY2"/>
+                </a:cxn>
+                <a:cxn ang="0">
+                  <a:pos x="connsiteX3" y="connsiteY3"/>
+                </a:cxn>
+              </a:cxnLst>
+              <a:rect l="l" t="t" r="r" b="b"/>
+              <a:pathLst>
+                <a:path w="202882" h="268223">
+                  <a:moveTo>
+                    <a:pt x="20765" y="268224"/>
+                  </a:moveTo>
+                  <a:lnTo>
+                    <a:pt x="0" y="268224"/>
+                  </a:lnTo>
+                  <a:lnTo>
+                    <a:pt x="182118" y="0"/>
+                  </a:lnTo>
+                  <a:lnTo>
+                    <a:pt x="202883" y="0"/>
+                  </a:lnTo>
+                  <a:close/>
+                </a:path>
+              </a:pathLst>
+            </a:custGeom>
+            <a:grpFill/>
+            <a:ln w="9525" cap="flat">
+              <a:noFill/>
+              <a:prstDash val="solid"/>
+              <a:miter/>
+            </a:ln>
+          </p:spPr>
+          <p:txBody>
+            <a:bodyPr rtlCol="0" anchor="ctr"/>
+            <a:lstStyle/>
+            <a:p>
+              <a:endParaRPr lang="en-US"/>
+            </a:p>
+          </p:txBody>
+        </p:sp>
+        <p:sp>
+          <p:nvSpPr>
+            <p:cNvPr id="127" name="Freeform: Shape 126">
+              <a:extLst>
+                <a:ext uri="{FF2B5EF4-FFF2-40B4-BE49-F238E27FC236}">
+                  <a16:creationId xmlns:a16="http://schemas.microsoft.com/office/drawing/2014/main" id="{F14DFC82-B3B3-468E-91B3-1302CFC68468}"/>
+                </a:ext>
+                <a:ext uri="{C183D7F6-B498-43B3-948B-1728B52AA6E4}">
+                  <adec:decorative xmlns:adec="http://schemas.microsoft.com/office/drawing/2017/decorative" val="1"/>
+                </a:ext>
+              </a:extLst>
+            </p:cNvPr>
+            <p:cNvSpPr/>
+            <p:nvPr>
+              <p:extLst>
+                <p:ext uri="{386F3935-93C4-4BCD-93E2-E3B085C9AB24}">
+                  <p16:designElem xmlns:p16="http://schemas.microsoft.com/office/powerpoint/2015/main" val="1"/>
+                </p:ext>
+              </p:extLst>
+            </p:nvPr>
+          </p:nvSpPr>
+          <p:spPr>
+            <a:xfrm>
+              <a:off x="10041267" y="4115729"/>
+              <a:ext cx="202882" cy="268223"/>
+            </a:xfrm>
+            <a:custGeom>
+              <a:avLst/>
+              <a:gdLst>
+                <a:gd name="connsiteX0" fmla="*/ 20669 w 202882"/>
+                <a:gd name="connsiteY0" fmla="*/ 268224 h 268223"/>
+                <a:gd name="connsiteX1" fmla="*/ 0 w 202882"/>
+                <a:gd name="connsiteY1" fmla="*/ 268224 h 268223"/>
+                <a:gd name="connsiteX2" fmla="*/ 182118 w 202882"/>
+                <a:gd name="connsiteY2" fmla="*/ 0 h 268223"/>
+                <a:gd name="connsiteX3" fmla="*/ 202883 w 202882"/>
+                <a:gd name="connsiteY3" fmla="*/ 0 h 268223"/>
+              </a:gdLst>
+              <a:ahLst/>
+              <a:cxnLst>
+                <a:cxn ang="0">
+                  <a:pos x="connsiteX0" y="connsiteY0"/>
+                </a:cxn>
+                <a:cxn ang="0">
+                  <a:pos x="connsiteX1" y="connsiteY1"/>
+                </a:cxn>
+                <a:cxn ang="0">
+                  <a:pos x="connsiteX2" y="connsiteY2"/>
+                </a:cxn>
+                <a:cxn ang="0">
+                  <a:pos x="connsiteX3" y="connsiteY3"/>
+                </a:cxn>
+              </a:cxnLst>
+              <a:rect l="l" t="t" r="r" b="b"/>
+              <a:pathLst>
+                <a:path w="202882" h="268223">
+                  <a:moveTo>
+                    <a:pt x="20669" y="268224"/>
+                  </a:moveTo>
+                  <a:lnTo>
+                    <a:pt x="0" y="268224"/>
+                  </a:lnTo>
+                  <a:lnTo>
+                    <a:pt x="182118" y="0"/>
+                  </a:lnTo>
+                  <a:lnTo>
+                    <a:pt x="202883" y="0"/>
+                  </a:lnTo>
+                  <a:close/>
+                </a:path>
+              </a:pathLst>
+            </a:custGeom>
+            <a:grpFill/>
+            <a:ln w="9525" cap="flat">
+              <a:noFill/>
+              <a:prstDash val="solid"/>
+              <a:miter/>
+            </a:ln>
+          </p:spPr>
+          <p:txBody>
+            <a:bodyPr rtlCol="0" anchor="ctr"/>
+            <a:lstStyle/>
+            <a:p>
+              <a:endParaRPr lang="en-US"/>
+            </a:p>
+          </p:txBody>
+        </p:sp>
+        <p:sp>
+          <p:nvSpPr>
+            <p:cNvPr id="128" name="Freeform: Shape 127">
+              <a:extLst>
+                <a:ext uri="{FF2B5EF4-FFF2-40B4-BE49-F238E27FC236}">
+                  <a16:creationId xmlns:a16="http://schemas.microsoft.com/office/drawing/2014/main" id="{D3250EFE-214E-4B8E-AF96-036A514FFB2D}"/>
+                </a:ext>
+                <a:ext uri="{C183D7F6-B498-43B3-948B-1728B52AA6E4}">
+                  <adec:decorative xmlns:adec="http://schemas.microsoft.com/office/drawing/2017/decorative" val="1"/>
+                </a:ext>
+              </a:extLst>
+            </p:cNvPr>
+            <p:cNvSpPr/>
+            <p:nvPr>
+              <p:extLst>
+                <p:ext uri="{386F3935-93C4-4BCD-93E2-E3B085C9AB24}">
+                  <p16:designElem xmlns:p16="http://schemas.microsoft.com/office/powerpoint/2015/main" val="1"/>
+                </p:ext>
+              </p:extLst>
+            </p:nvPr>
+          </p:nvSpPr>
+          <p:spPr>
+            <a:xfrm>
+              <a:off x="10141090" y="4115729"/>
+              <a:ext cx="202882" cy="268223"/>
+            </a:xfrm>
+            <a:custGeom>
+              <a:avLst/>
+              <a:gdLst>
+                <a:gd name="connsiteX0" fmla="*/ 20669 w 202882"/>
+                <a:gd name="connsiteY0" fmla="*/ 268224 h 268223"/>
+                <a:gd name="connsiteX1" fmla="*/ 0 w 202882"/>
+                <a:gd name="connsiteY1" fmla="*/ 268224 h 268223"/>
+                <a:gd name="connsiteX2" fmla="*/ 182118 w 202882"/>
+                <a:gd name="connsiteY2" fmla="*/ 0 h 268223"/>
+                <a:gd name="connsiteX3" fmla="*/ 202883 w 202882"/>
+                <a:gd name="connsiteY3" fmla="*/ 0 h 268223"/>
+              </a:gdLst>
+              <a:ahLst/>
+              <a:cxnLst>
+                <a:cxn ang="0">
+                  <a:pos x="connsiteX0" y="connsiteY0"/>
+                </a:cxn>
+                <a:cxn ang="0">
+                  <a:pos x="connsiteX1" y="connsiteY1"/>
+                </a:cxn>
+                <a:cxn ang="0">
+                  <a:pos x="connsiteX2" y="connsiteY2"/>
+                </a:cxn>
+                <a:cxn ang="0">
+                  <a:pos x="connsiteX3" y="connsiteY3"/>
+                </a:cxn>
+              </a:cxnLst>
+              <a:rect l="l" t="t" r="r" b="b"/>
+              <a:pathLst>
+                <a:path w="202882" h="268223">
+                  <a:moveTo>
+                    <a:pt x="20669" y="268224"/>
+                  </a:moveTo>
+                  <a:lnTo>
+                    <a:pt x="0" y="268224"/>
+                  </a:lnTo>
+                  <a:lnTo>
+                    <a:pt x="182118" y="0"/>
+                  </a:lnTo>
+                  <a:lnTo>
+                    <a:pt x="202883" y="0"/>
+                  </a:lnTo>
+                  <a:close/>
+                </a:path>
+              </a:pathLst>
+            </a:custGeom>
+            <a:grpFill/>
+            <a:ln w="9525" cap="flat">
+              <a:noFill/>
+              <a:prstDash val="solid"/>
+              <a:miter/>
+            </a:ln>
+          </p:spPr>
+          <p:txBody>
+            <a:bodyPr rtlCol="0" anchor="ctr"/>
+            <a:lstStyle/>
+            <a:p>
+              <a:endParaRPr lang="en-US"/>
+            </a:p>
+          </p:txBody>
+        </p:sp>
+        <p:sp>
+          <p:nvSpPr>
+            <p:cNvPr id="129" name="Freeform: Shape 128">
+              <a:extLst>
+                <a:ext uri="{FF2B5EF4-FFF2-40B4-BE49-F238E27FC236}">
+                  <a16:creationId xmlns:a16="http://schemas.microsoft.com/office/drawing/2014/main" id="{AD058EBE-D4A5-4C43-B170-6A451F87A7B2}"/>
+                </a:ext>
+                <a:ext uri="{C183D7F6-B498-43B3-948B-1728B52AA6E4}">
+                  <adec:decorative xmlns:adec="http://schemas.microsoft.com/office/drawing/2017/decorative" val="1"/>
+                </a:ext>
+              </a:extLst>
+            </p:cNvPr>
+            <p:cNvSpPr/>
+            <p:nvPr>
+              <p:extLst>
+                <p:ext uri="{386F3935-93C4-4BCD-93E2-E3B085C9AB24}">
+                  <p16:designElem xmlns:p16="http://schemas.microsoft.com/office/powerpoint/2015/main" val="1"/>
+                </p:ext>
+              </p:extLst>
+            </p:nvPr>
+          </p:nvSpPr>
+          <p:spPr>
+            <a:xfrm>
+              <a:off x="10240911" y="4115729"/>
+              <a:ext cx="202882" cy="268223"/>
+            </a:xfrm>
+            <a:custGeom>
+              <a:avLst/>
+              <a:gdLst>
+                <a:gd name="connsiteX0" fmla="*/ 20669 w 202882"/>
+                <a:gd name="connsiteY0" fmla="*/ 268224 h 268223"/>
+                <a:gd name="connsiteX1" fmla="*/ 0 w 202882"/>
+                <a:gd name="connsiteY1" fmla="*/ 268224 h 268223"/>
+                <a:gd name="connsiteX2" fmla="*/ 182118 w 202882"/>
+                <a:gd name="connsiteY2" fmla="*/ 0 h 268223"/>
+                <a:gd name="connsiteX3" fmla="*/ 202883 w 202882"/>
+                <a:gd name="connsiteY3" fmla="*/ 0 h 268223"/>
+              </a:gdLst>
+              <a:ahLst/>
+              <a:cxnLst>
+                <a:cxn ang="0">
+                  <a:pos x="connsiteX0" y="connsiteY0"/>
+                </a:cxn>
+                <a:cxn ang="0">
+                  <a:pos x="connsiteX1" y="connsiteY1"/>
+                </a:cxn>
+                <a:cxn ang="0">
+                  <a:pos x="connsiteX2" y="connsiteY2"/>
+                </a:cxn>
+                <a:cxn ang="0">
+                  <a:pos x="connsiteX3" y="connsiteY3"/>
+                </a:cxn>
+              </a:cxnLst>
+              <a:rect l="l" t="t" r="r" b="b"/>
+              <a:pathLst>
+                <a:path w="202882" h="268223">
+                  <a:moveTo>
+                    <a:pt x="20669" y="268224"/>
+                  </a:moveTo>
+                  <a:lnTo>
+                    <a:pt x="0" y="268224"/>
+                  </a:lnTo>
+                  <a:lnTo>
+                    <a:pt x="182118" y="0"/>
+                  </a:lnTo>
+                  <a:lnTo>
+                    <a:pt x="202883" y="0"/>
+                  </a:lnTo>
+                  <a:close/>
+                </a:path>
+              </a:pathLst>
+            </a:custGeom>
+            <a:grpFill/>
+            <a:ln w="9525" cap="flat">
+              <a:noFill/>
+              <a:prstDash val="solid"/>
+              <a:miter/>
+            </a:ln>
+          </p:spPr>
+          <p:txBody>
+            <a:bodyPr rtlCol="0" anchor="ctr"/>
+            <a:lstStyle/>
+            <a:p>
+              <a:endParaRPr lang="en-US"/>
+            </a:p>
+          </p:txBody>
+        </p:sp>
+      </p:grpSp>
     </p:spTree>
     <p:extLst>
       <p:ext uri="{BB962C8B-B14F-4D97-AF65-F5344CB8AC3E}">
@@ -9795,8 +11112,8 @@
       </p:par>
     </p:tnLst>
     <p:bldLst>
+      <p:bldP spid="2" grpId="0"/>
       <p:bldP spid="3" grpId="0" build="p"/>
-      <p:bldP spid="2" grpId="0"/>
     </p:bldLst>
   </p:timing>
 </p:sld>
@@ -9879,7 +11196,7 @@
       </p:pic>
       <p:pic>
         <p:nvPicPr>
-          <p:cNvPr id="9" name="Picture 8" descr="Graphical user interface, text, application&#10;&#10;Description automatically generated">
+          <p:cNvPr id="9" name="Picture 8" descr="If you are on a different operating system and/or architecture when you are building the server, be mindful to use GOOS and GOARCH environment variables.">
             <a:extLst>
               <a:ext uri="{FF2B5EF4-FFF2-40B4-BE49-F238E27FC236}">
                 <a16:creationId xmlns:a16="http://schemas.microsoft.com/office/drawing/2014/main" id="{DBD73C30-0AD5-494C-B5FD-21E019A71634}"/>
@@ -9971,7 +11288,7 @@
       </p:sp>
       <p:pic>
         <p:nvPicPr>
-          <p:cNvPr id="5" name="Picture 4" descr="Text&#10;&#10;Description automatically generated">
+          <p:cNvPr id="5" name="Picture 4" descr="This shows the systemd service for running the website binary that we created. ">
             <a:extLst>
               <a:ext uri="{FF2B5EF4-FFF2-40B4-BE49-F238E27FC236}">
                 <a16:creationId xmlns:a16="http://schemas.microsoft.com/office/drawing/2014/main" id="{DC80A0C7-90D6-4949-97C5-C3BE0FF8C77D}"/>
@@ -10034,6 +11351,92 @@
           <p:cNvPr id="2" name="Title 1">
             <a:extLst>
               <a:ext uri="{FF2B5EF4-FFF2-40B4-BE49-F238E27FC236}">
+                <a16:creationId xmlns:a16="http://schemas.microsoft.com/office/drawing/2014/main" id="{B850F3A4-E251-F640-A490-A6F21B71B9C1}"/>
+              </a:ext>
+            </a:extLst>
+          </p:cNvPr>
+          <p:cNvSpPr>
+            <a:spLocks noGrp="1"/>
+          </p:cNvSpPr>
+          <p:nvPr>
+            <p:ph type="title"/>
+          </p:nvPr>
+        </p:nvSpPr>
+        <p:spPr/>
+        <p:txBody>
+          <a:bodyPr/>
+          <a:lstStyle/>
+          <a:p>
+            <a:r>
+              <a:rPr lang="en-US" dirty="0"/>
+              <a:t>DNS and IP address</a:t>
+            </a:r>
+          </a:p>
+        </p:txBody>
+      </p:sp>
+      <p:sp>
+        <p:nvSpPr>
+          <p:cNvPr id="3" name="Content Placeholder 2">
+            <a:extLst>
+              <a:ext uri="{FF2B5EF4-FFF2-40B4-BE49-F238E27FC236}">
+                <a16:creationId xmlns:a16="http://schemas.microsoft.com/office/drawing/2014/main" id="{00F39C55-DFD2-9248-8B64-1A8EBAD46B7D}"/>
+              </a:ext>
+            </a:extLst>
+          </p:cNvPr>
+          <p:cNvSpPr>
+            <a:spLocks noGrp="1"/>
+          </p:cNvSpPr>
+          <p:nvPr>
+            <p:ph idx="1"/>
+          </p:nvPr>
+        </p:nvSpPr>
+        <p:spPr/>
+        <p:txBody>
+          <a:bodyPr/>
+          <a:lstStyle/>
+          <a:p>
+            <a:r>
+              <a:rPr lang="en-US" dirty="0"/>
+              <a:t>Created a DNS record and pointed it to the public IP of my virtual machine</a:t>
+            </a:r>
+          </a:p>
+        </p:txBody>
+      </p:sp>
+    </p:spTree>
+    <p:extLst>
+      <p:ext uri="{BB962C8B-B14F-4D97-AF65-F5344CB8AC3E}">
+        <p14:creationId xmlns:p14="http://schemas.microsoft.com/office/powerpoint/2010/main" val="4002006271"/>
+      </p:ext>
+    </p:extLst>
+  </p:cSld>
+  <p:clrMapOvr>
+    <a:masterClrMapping/>
+  </p:clrMapOvr>
+</p:sld>
+</file>
+
+<file path=ppt/slides/slide13.xml><?xml version="1.0" encoding="utf-8"?>
+<p:sld xmlns:a="http://schemas.openxmlformats.org/drawingml/2006/main" xmlns:r="http://schemas.openxmlformats.org/officeDocument/2006/relationships" xmlns:p="http://schemas.openxmlformats.org/presentationml/2006/main">
+  <p:cSld>
+    <p:spTree>
+      <p:nvGrpSpPr>
+        <p:cNvPr id="1" name=""/>
+        <p:cNvGrpSpPr/>
+        <p:nvPr/>
+      </p:nvGrpSpPr>
+      <p:grpSpPr>
+        <a:xfrm>
+          <a:off x="0" y="0"/>
+          <a:ext cx="0" cy="0"/>
+          <a:chOff x="0" y="0"/>
+          <a:chExt cx="0" cy="0"/>
+        </a:xfrm>
+      </p:grpSpPr>
+      <p:sp>
+        <p:nvSpPr>
+          <p:cNvPr id="2" name="Title 1">
+            <a:extLst>
+              <a:ext uri="{FF2B5EF4-FFF2-40B4-BE49-F238E27FC236}">
                 <a16:creationId xmlns:a16="http://schemas.microsoft.com/office/drawing/2014/main" id="{E465CBAC-A4CD-034D-A0D2-E90D762166BF}"/>
               </a:ext>
             </a:extLst>
@@ -10118,7 +11521,7 @@
       </p:sp>
       <p:pic>
         <p:nvPicPr>
-          <p:cNvPr id="9" name="Picture 8" descr="Text&#10;&#10;Description automatically generated">
+          <p:cNvPr id="9" name="Picture 8" descr="This shows the Caddyfile used to forward traffic for domain practicalgobook.net to the server running on localhost:8080">
             <a:extLst>
               <a:ext uri="{FF2B5EF4-FFF2-40B4-BE49-F238E27FC236}">
                 <a16:creationId xmlns:a16="http://schemas.microsoft.com/office/drawing/2014/main" id="{3621C96F-19FA-E740-AE2D-6019D6FBB07E}"/>
@@ -10148,7 +11551,7 @@
       </p:pic>
       <p:pic>
         <p:nvPicPr>
-          <p:cNvPr id="11" name="Picture 10" descr="Graphical user interface, text&#10;&#10;Description automatically generated">
+          <p:cNvPr id="11" name="Picture 10" descr="Caddy has successfully obtained a TLS certificate from Letsencrypt.org">
             <a:extLst>
               <a:ext uri="{FF2B5EF4-FFF2-40B4-BE49-F238E27FC236}">
                 <a16:creationId xmlns:a16="http://schemas.microsoft.com/office/drawing/2014/main" id="{0FDACC77-64A5-2F43-9401-FEA8BED434EA}"/>
@@ -10189,7 +11592,172 @@
 </p:sld>
 </file>
 
-<file path=ppt/slides/slide13.xml><?xml version="1.0" encoding="utf-8"?>
+<file path=ppt/slides/slide14.xml><?xml version="1.0" encoding="utf-8"?>
+<p:sld xmlns:a="http://schemas.openxmlformats.org/drawingml/2006/main" xmlns:r="http://schemas.openxmlformats.org/officeDocument/2006/relationships" xmlns:p="http://schemas.openxmlformats.org/presentationml/2006/main">
+  <p:cSld>
+    <p:spTree>
+      <p:nvGrpSpPr>
+        <p:cNvPr id="1" name=""/>
+        <p:cNvGrpSpPr/>
+        <p:nvPr/>
+      </p:nvGrpSpPr>
+      <p:grpSpPr>
+        <a:xfrm>
+          <a:off x="0" y="0"/>
+          <a:ext cx="0" cy="0"/>
+          <a:chOff x="0" y="0"/>
+          <a:chExt cx="0" cy="0"/>
+        </a:xfrm>
+      </p:grpSpPr>
+      <p:sp>
+        <p:nvSpPr>
+          <p:cNvPr id="5" name="Title 4">
+            <a:extLst>
+              <a:ext uri="{FF2B5EF4-FFF2-40B4-BE49-F238E27FC236}">
+                <a16:creationId xmlns:a16="http://schemas.microsoft.com/office/drawing/2014/main" id="{FB46B4BF-3DB8-7A46-BC12-9CFFB7373406}"/>
+              </a:ext>
+            </a:extLst>
+          </p:cNvPr>
+          <p:cNvSpPr>
+            <a:spLocks noGrp="1"/>
+          </p:cNvSpPr>
+          <p:nvPr>
+            <p:ph type="title"/>
+          </p:nvPr>
+        </p:nvSpPr>
+        <p:spPr/>
+        <p:txBody>
+          <a:bodyPr/>
+          <a:lstStyle/>
+          <a:p>
+            <a:r>
+              <a:rPr lang="en-US" dirty="0"/>
+              <a:t>Result - my new book’s website!</a:t>
+            </a:r>
+          </a:p>
+        </p:txBody>
+      </p:sp>
+      <p:sp>
+        <p:nvSpPr>
+          <p:cNvPr id="10" name="TextBox 9">
+            <a:extLst>
+              <a:ext uri="{FF2B5EF4-FFF2-40B4-BE49-F238E27FC236}">
+                <a16:creationId xmlns:a16="http://schemas.microsoft.com/office/drawing/2014/main" id="{30002973-8AE0-5D44-990B-33BFB2E56D4A}"/>
+              </a:ext>
+            </a:extLst>
+          </p:cNvPr>
+          <p:cNvSpPr txBox="1"/>
+          <p:nvPr/>
+        </p:nvSpPr>
+        <p:spPr>
+          <a:xfrm>
+            <a:off x="6816418" y="1398300"/>
+            <a:ext cx="5717789" cy="584775"/>
+          </a:xfrm>
+          <a:prstGeom prst="rect">
+            <a:avLst/>
+          </a:prstGeom>
+          <a:noFill/>
+        </p:spPr>
+        <p:txBody>
+          <a:bodyPr wrap="square">
+            <a:spAutoFit/>
+          </a:bodyPr>
+          <a:lstStyle/>
+          <a:p>
+            <a:r>
+              <a:rPr lang="en-US" sz="3200" dirty="0">
+                <a:hlinkClick r:id="rId2">
+                  <a:extLst>
+                    <a:ext uri="{A12FA001-AC4F-418D-AE19-62706E023703}">
+                      <ahyp:hlinkClr xmlns:ahyp="http://schemas.microsoft.com/office/drawing/2018/hyperlinkcolor" val="tx"/>
+                    </a:ext>
+                  </a:extLst>
+                </a:hlinkClick>
+              </a:rPr>
+              <a:t>https://practicalgobook.net</a:t>
+            </a:r>
+            <a:r>
+              <a:rPr lang="en-US" sz="3200" dirty="0"/>
+              <a:t> </a:t>
+            </a:r>
+          </a:p>
+        </p:txBody>
+      </p:sp>
+      <p:pic>
+        <p:nvPicPr>
+          <p:cNvPr id="3" name="Picture 2">
+            <a:extLst>
+              <a:ext uri="{FF2B5EF4-FFF2-40B4-BE49-F238E27FC236}">
+                <a16:creationId xmlns:a16="http://schemas.microsoft.com/office/drawing/2014/main" id="{0633F335-ADA1-6B41-9DFE-83F8BB342CCC}"/>
+              </a:ext>
+            </a:extLst>
+          </p:cNvPr>
+          <p:cNvPicPr>
+            <a:picLocks noChangeAspect="1"/>
+          </p:cNvPicPr>
+          <p:nvPr/>
+        </p:nvPicPr>
+        <p:blipFill>
+          <a:blip r:embed="rId3"/>
+          <a:stretch>
+            <a:fillRect/>
+          </a:stretch>
+        </p:blipFill>
+        <p:spPr>
+          <a:xfrm>
+            <a:off x="403445" y="1825625"/>
+            <a:ext cx="6115424" cy="3822140"/>
+          </a:xfrm>
+          <a:prstGeom prst="rect">
+            <a:avLst/>
+          </a:prstGeom>
+        </p:spPr>
+      </p:pic>
+      <p:pic>
+        <p:nvPicPr>
+          <p:cNvPr id="6" name="Picture 5" descr="Graphical user interface, text, application, chat or text message&#10;&#10;Description automatically generated">
+            <a:extLst>
+              <a:ext uri="{FF2B5EF4-FFF2-40B4-BE49-F238E27FC236}">
+                <a16:creationId xmlns:a16="http://schemas.microsoft.com/office/drawing/2014/main" id="{CD2F521B-C909-FB4B-AD5D-5B0ED3951C2B}"/>
+              </a:ext>
+            </a:extLst>
+          </p:cNvPr>
+          <p:cNvPicPr>
+            <a:picLocks noChangeAspect="1"/>
+          </p:cNvPicPr>
+          <p:nvPr/>
+        </p:nvPicPr>
+        <p:blipFill>
+          <a:blip r:embed="rId4"/>
+          <a:stretch>
+            <a:fillRect/>
+          </a:stretch>
+        </p:blipFill>
+        <p:spPr>
+          <a:xfrm>
+            <a:off x="6816418" y="2159514"/>
+            <a:ext cx="6172200" cy="4800600"/>
+          </a:xfrm>
+          <a:prstGeom prst="rect">
+            <a:avLst/>
+          </a:prstGeom>
+        </p:spPr>
+      </p:pic>
+    </p:spTree>
+    <p:extLst>
+      <p:ext uri="{BB962C8B-B14F-4D97-AF65-F5344CB8AC3E}">
+        <p14:creationId xmlns:p14="http://schemas.microsoft.com/office/powerpoint/2010/main" val="3561263241"/>
+      </p:ext>
+    </p:extLst>
+  </p:cSld>
+  <p:clrMapOvr>
+    <a:masterClrMapping/>
+  </p:clrMapOvr>
+</p:sld>
+</file>
+
+<file path=ppt/slides/slide15.xml><?xml version="1.0" encoding="utf-8"?>
 <p:sld xmlns:a="http://schemas.openxmlformats.org/drawingml/2006/main" xmlns:r="http://schemas.openxmlformats.org/officeDocument/2006/relationships" xmlns:p="http://schemas.openxmlformats.org/presentationml/2006/main">
   <p:cSld>
     <p:bg>
@@ -10421,50 +11989,6 @@
       </p:sp>
       <p:sp>
         <p:nvSpPr>
-          <p:cNvPr id="3" name="Content Placeholder 2">
-            <a:extLst>
-              <a:ext uri="{FF2B5EF4-FFF2-40B4-BE49-F238E27FC236}">
-                <a16:creationId xmlns:a16="http://schemas.microsoft.com/office/drawing/2014/main" id="{B62D89C4-A8EC-0A46-8C18-EF95BA66C210}"/>
-              </a:ext>
-            </a:extLst>
-          </p:cNvPr>
-          <p:cNvSpPr>
-            <a:spLocks noGrp="1"/>
-          </p:cNvSpPr>
-          <p:nvPr>
-            <p:ph idx="1"/>
-          </p:nvPr>
-        </p:nvSpPr>
-        <p:spPr>
-          <a:xfrm>
-            <a:off x="477980" y="4872922"/>
-            <a:ext cx="5030722" cy="624971"/>
-          </a:xfrm>
-        </p:spPr>
-        <p:txBody>
-          <a:bodyPr vert="horz" lIns="91440" tIns="45720" rIns="91440" bIns="45720" rtlCol="0">
-            <a:normAutofit/>
-          </a:bodyPr>
-          <a:lstStyle/>
-          <a:p>
-            <a:pPr marL="0" indent="0">
-              <a:buNone/>
-            </a:pPr>
-            <a:r>
-              <a:rPr lang="en-US" sz="2000" dirty="0">
-                <a:hlinkClick r:id="rId3"/>
-              </a:rPr>
-              <a:t>https://github.com/amitsaha/website2bin</a:t>
-            </a:r>
-            <a:r>
-              <a:rPr lang="en-US" sz="2000" dirty="0"/>
-              <a:t> </a:t>
-            </a:r>
-          </a:p>
-        </p:txBody>
-      </p:sp>
-      <p:sp>
-        <p:nvSpPr>
           <p:cNvPr id="20" name="Rectangle 19">
             <a:extLst>
               <a:ext uri="{FF2B5EF4-FFF2-40B4-BE49-F238E27FC236}">
@@ -10637,7 +12161,7 @@
 </p:sld>
 </file>
 
-<file path=ppt/slides/slide14.xml><?xml version="1.0" encoding="utf-8"?>
+<file path=ppt/slides/slide16.xml><?xml version="1.0" encoding="utf-8"?>
 <p:sld xmlns:a="http://schemas.openxmlformats.org/drawingml/2006/main" xmlns:r="http://schemas.openxmlformats.org/officeDocument/2006/relationships" xmlns:p="http://schemas.openxmlformats.org/presentationml/2006/main">
   <p:cSld>
     <p:bg>
@@ -10753,13 +12277,13 @@
         </p:spPr>
         <p:txBody>
           <a:bodyPr vert="horz" lIns="91440" tIns="45720" rIns="91440" bIns="45720" rtlCol="0" anchor="ctr">
-            <a:normAutofit/>
+            <a:normAutofit fontScale="90000"/>
           </a:bodyPr>
           <a:lstStyle/>
           <a:p>
             <a:pPr algn="ctr"/>
             <a:r>
-              <a:rPr lang="en-US" sz="3600" kern="1200">
+              <a:rPr lang="en-US" sz="3600" kern="1200" dirty="0">
                 <a:solidFill>
                   <a:srgbClr val="FFFFFF"/>
                 </a:solidFill>
@@ -10769,12 +12293,40 @@
               </a:rPr>
               <a:t>Automate the server creation</a:t>
             </a:r>
+            <a:br>
+              <a:rPr lang="en-US" sz="3600" kern="1200" dirty="0">
+                <a:solidFill>
+                  <a:srgbClr val="FFFFFF"/>
+                </a:solidFill>
+                <a:latin typeface="+mj-lt"/>
+                <a:ea typeface="+mj-ea"/>
+                <a:cs typeface="+mj-cs"/>
+              </a:rPr>
+            </a:br>
+            <a:br>
+              <a:rPr lang="en-US" sz="3600" kern="1200" dirty="0">
+                <a:solidFill>
+                  <a:srgbClr val="FFFFFF"/>
+                </a:solidFill>
+                <a:latin typeface="+mj-lt"/>
+                <a:ea typeface="+mj-ea"/>
+                <a:cs typeface="+mj-cs"/>
+              </a:rPr>
+            </a:br>
+            <a:endParaRPr lang="en-US" sz="3600" kern="1200" dirty="0">
+              <a:solidFill>
+                <a:srgbClr val="FFFFFF"/>
+              </a:solidFill>
+              <a:latin typeface="+mj-lt"/>
+              <a:ea typeface="+mj-ea"/>
+              <a:cs typeface="+mj-cs"/>
+            </a:endParaRPr>
           </a:p>
         </p:txBody>
       </p:sp>
       <p:pic>
         <p:nvPicPr>
-          <p:cNvPr id="5" name="Picture 4" descr="Text&#10;&#10;Description automatically generated">
+          <p:cNvPr id="5" name="Picture 4" descr="Using the program, website2bin, the server.go and go.mod is generated for you. You can then go ahead and run go build.">
             <a:extLst>
               <a:ext uri="{FF2B5EF4-FFF2-40B4-BE49-F238E27FC236}">
                 <a16:creationId xmlns:a16="http://schemas.microsoft.com/office/drawing/2014/main" id="{1CC999AC-5DC4-F640-884D-77A6BA7A5F22}"/>
@@ -10794,7 +12346,7 @@
         </p:blipFill>
         <p:spPr>
           <a:xfrm>
-            <a:off x="4777316" y="1393625"/>
+            <a:off x="4391121" y="1394790"/>
             <a:ext cx="6780700" cy="4068420"/>
           </a:xfrm>
           <a:prstGeom prst="rect">
@@ -10802,6 +12354,56 @@
           </a:prstGeom>
         </p:spPr>
       </p:pic>
+      <p:sp>
+        <p:nvSpPr>
+          <p:cNvPr id="6" name="Content Placeholder 2">
+            <a:extLst>
+              <a:ext uri="{FF2B5EF4-FFF2-40B4-BE49-F238E27FC236}">
+                <a16:creationId xmlns:a16="http://schemas.microsoft.com/office/drawing/2014/main" id="{BF353F67-3F03-5C4B-B735-BC1FA7DE0C96}"/>
+              </a:ext>
+            </a:extLst>
+          </p:cNvPr>
+          <p:cNvSpPr>
+            <a:spLocks noGrp="1"/>
+          </p:cNvSpPr>
+          <p:nvPr>
+            <p:ph idx="1"/>
+          </p:nvPr>
+        </p:nvSpPr>
+        <p:spPr>
+          <a:xfrm>
+            <a:off x="5266110" y="1574019"/>
+            <a:ext cx="5030722" cy="624971"/>
+          </a:xfrm>
+        </p:spPr>
+        <p:txBody>
+          <a:bodyPr vert="horz" lIns="91440" tIns="45720" rIns="91440" bIns="45720" rtlCol="0">
+            <a:normAutofit/>
+          </a:bodyPr>
+          <a:lstStyle/>
+          <a:p>
+            <a:pPr marL="0" indent="0">
+              <a:buNone/>
+            </a:pPr>
+            <a:r>
+              <a:rPr lang="en-US" sz="2000" dirty="0">
+                <a:hlinkClick r:id="rId3">
+                  <a:extLst>
+                    <a:ext uri="{A12FA001-AC4F-418D-AE19-62706E023703}">
+                      <ahyp:hlinkClr xmlns:ahyp="http://schemas.microsoft.com/office/drawing/2018/hyperlinkcolor" val="tx"/>
+                    </a:ext>
+                  </a:extLst>
+                </a:hlinkClick>
+              </a:rPr>
+              <a:t>https://github.com/amitsaha/website2bin</a:t>
+            </a:r>
+            <a:r>
+              <a:rPr lang="en-US" sz="2000" dirty="0"/>
+              <a:t> </a:t>
+            </a:r>
+          </a:p>
+        </p:txBody>
+      </p:sp>
     </p:spTree>
     <p:extLst>
       <p:ext uri="{BB962C8B-B14F-4D97-AF65-F5344CB8AC3E}">
@@ -10815,520 +12417,7 @@
 </p:sld>
 </file>
 
-<file path=ppt/slides/slide15.xml><?xml version="1.0" encoding="utf-8"?>
-<p:sld xmlns:a="http://schemas.openxmlformats.org/drawingml/2006/main" xmlns:r="http://schemas.openxmlformats.org/officeDocument/2006/relationships" xmlns:p="http://schemas.openxmlformats.org/presentationml/2006/main">
-  <p:cSld>
-    <p:bg>
-      <p:bgPr>
-        <a:solidFill>
-          <a:schemeClr val="bg1"/>
-        </a:solidFill>
-        <a:effectLst/>
-      </p:bgPr>
-    </p:bg>
-    <p:spTree>
-      <p:nvGrpSpPr>
-        <p:cNvPr id="1" name=""/>
-        <p:cNvGrpSpPr/>
-        <p:nvPr/>
-      </p:nvGrpSpPr>
-      <p:grpSpPr>
-        <a:xfrm>
-          <a:off x="0" y="0"/>
-          <a:ext cx="0" cy="0"/>
-          <a:chOff x="0" y="0"/>
-          <a:chExt cx="0" cy="0"/>
-        </a:xfrm>
-      </p:grpSpPr>
-      <p:sp useBgFill="1">
-        <p:nvSpPr>
-          <p:cNvPr id="8" name="Rectangle 7">
-            <a:extLst>
-              <a:ext uri="{FF2B5EF4-FFF2-40B4-BE49-F238E27FC236}">
-                <a16:creationId xmlns:a16="http://schemas.microsoft.com/office/drawing/2014/main" id="{943CAA20-3569-4189-9E48-239A229A86CA}"/>
-              </a:ext>
-              <a:ext uri="{C183D7F6-B498-43B3-948B-1728B52AA6E4}">
-                <adec:decorative xmlns:adec="http://schemas.microsoft.com/office/drawing/2017/decorative" val="1"/>
-              </a:ext>
-            </a:extLst>
-          </p:cNvPr>
-          <p:cNvSpPr>
-            <a:spLocks noGrp="1" noRot="1" noChangeAspect="1" noMove="1" noResize="1" noEditPoints="1" noAdjustHandles="1" noChangeArrowheads="1" noChangeShapeType="1" noTextEdit="1"/>
-          </p:cNvSpPr>
-          <p:nvPr>
-            <p:extLst>
-              <p:ext uri="{386F3935-93C4-4BCD-93E2-E3B085C9AB24}">
-                <p16:designElem xmlns:p16="http://schemas.microsoft.com/office/powerpoint/2015/main" val="1"/>
-              </p:ext>
-            </p:extLst>
-          </p:nvPr>
-        </p:nvSpPr>
-        <p:spPr>
-          <a:xfrm>
-            <a:off x="0" y="0"/>
-            <a:ext cx="12188952" cy="6858000"/>
-          </a:xfrm>
-          <a:prstGeom prst="rect">
-            <a:avLst/>
-          </a:prstGeom>
-          <a:ln>
-            <a:noFill/>
-          </a:ln>
-        </p:spPr>
-        <p:style>
-          <a:lnRef idx="2">
-            <a:schemeClr val="accent1">
-              <a:shade val="50000"/>
-            </a:schemeClr>
-          </a:lnRef>
-          <a:fillRef idx="1">
-            <a:schemeClr val="accent1"/>
-          </a:fillRef>
-          <a:effectRef idx="0">
-            <a:schemeClr val="accent1"/>
-          </a:effectRef>
-          <a:fontRef idx="minor">
-            <a:schemeClr val="lt1"/>
-          </a:fontRef>
-        </p:style>
-        <p:txBody>
-          <a:bodyPr rtlCol="0" anchor="ctr"/>
-          <a:lstStyle/>
-          <a:p>
-            <a:pPr algn="ctr"/>
-            <a:endParaRPr lang="en-US"/>
-          </a:p>
-        </p:txBody>
-      </p:sp>
-      <p:sp>
-        <p:nvSpPr>
-          <p:cNvPr id="2" name="Title 1">
-            <a:extLst>
-              <a:ext uri="{FF2B5EF4-FFF2-40B4-BE49-F238E27FC236}">
-                <a16:creationId xmlns:a16="http://schemas.microsoft.com/office/drawing/2014/main" id="{41FA3CB2-9586-C746-A647-94BCAAB6460C}"/>
-              </a:ext>
-            </a:extLst>
-          </p:cNvPr>
-          <p:cNvSpPr>
-            <a:spLocks noGrp="1"/>
-          </p:cNvSpPr>
-          <p:nvPr>
-            <p:ph type="title"/>
-          </p:nvPr>
-        </p:nvSpPr>
-        <p:spPr>
-          <a:xfrm>
-            <a:off x="838200" y="451381"/>
-            <a:ext cx="10512552" cy="4066540"/>
-          </a:xfrm>
-        </p:spPr>
-        <p:txBody>
-          <a:bodyPr vert="horz" lIns="91440" tIns="45720" rIns="91440" bIns="45720" rtlCol="0" anchor="b">
-            <a:normAutofit/>
-          </a:bodyPr>
-          <a:lstStyle/>
-          <a:p>
-            <a:r>
-              <a:rPr lang="en-US" sz="6600" kern="1200" dirty="0">
-                <a:solidFill>
-                  <a:schemeClr val="tx1"/>
-                </a:solidFill>
-                <a:latin typeface="+mj-lt"/>
-                <a:ea typeface="+mj-ea"/>
-                <a:cs typeface="+mj-cs"/>
-              </a:rPr>
-              <a:t>Result</a:t>
-            </a:r>
-          </a:p>
-        </p:txBody>
-      </p:sp>
-      <p:sp>
-        <p:nvSpPr>
-          <p:cNvPr id="10" name="sketch line">
-            <a:extLst>
-              <a:ext uri="{FF2B5EF4-FFF2-40B4-BE49-F238E27FC236}">
-                <a16:creationId xmlns:a16="http://schemas.microsoft.com/office/drawing/2014/main" id="{DA542B6D-E775-4832-91DC-2D20F857813A}"/>
-              </a:ext>
-              <a:ext uri="{C183D7F6-B498-43B3-948B-1728B52AA6E4}">
-                <adec:decorative xmlns:adec="http://schemas.microsoft.com/office/drawing/2017/decorative" val="1"/>
-              </a:ext>
-            </a:extLst>
-          </p:cNvPr>
-          <p:cNvSpPr>
-            <a:spLocks noGrp="1" noRot="1" noChangeAspect="1" noMove="1" noResize="1" noEditPoints="1" noAdjustHandles="1" noChangeArrowheads="1" noChangeShapeType="1" noTextEdit="1"/>
-          </p:cNvSpPr>
-          <p:nvPr>
-            <p:extLst>
-              <p:ext uri="{386F3935-93C4-4BCD-93E2-E3B085C9AB24}">
-                <p16:designElem xmlns:p16="http://schemas.microsoft.com/office/powerpoint/2015/main" val="1"/>
-              </p:ext>
-            </p:extLst>
-          </p:nvPr>
-        </p:nvSpPr>
-        <p:spPr>
-          <a:xfrm>
-            <a:off x="838200" y="4718595"/>
-            <a:ext cx="5410200" cy="18288"/>
-          </a:xfrm>
-          <a:custGeom>
-            <a:avLst/>
-            <a:gdLst>
-              <a:gd name="connsiteX0" fmla="*/ 0 w 5410200"/>
-              <a:gd name="connsiteY0" fmla="*/ 0 h 18288"/>
-              <a:gd name="connsiteX1" fmla="*/ 568071 w 5410200"/>
-              <a:gd name="connsiteY1" fmla="*/ 0 h 18288"/>
-              <a:gd name="connsiteX2" fmla="*/ 1298448 w 5410200"/>
-              <a:gd name="connsiteY2" fmla="*/ 0 h 18288"/>
-              <a:gd name="connsiteX3" fmla="*/ 1920621 w 5410200"/>
-              <a:gd name="connsiteY3" fmla="*/ 0 h 18288"/>
-              <a:gd name="connsiteX4" fmla="*/ 2488692 w 5410200"/>
-              <a:gd name="connsiteY4" fmla="*/ 0 h 18288"/>
-              <a:gd name="connsiteX5" fmla="*/ 3219069 w 5410200"/>
-              <a:gd name="connsiteY5" fmla="*/ 0 h 18288"/>
-              <a:gd name="connsiteX6" fmla="*/ 3895344 w 5410200"/>
-              <a:gd name="connsiteY6" fmla="*/ 0 h 18288"/>
-              <a:gd name="connsiteX7" fmla="*/ 4571619 w 5410200"/>
-              <a:gd name="connsiteY7" fmla="*/ 0 h 18288"/>
-              <a:gd name="connsiteX8" fmla="*/ 5410200 w 5410200"/>
-              <a:gd name="connsiteY8" fmla="*/ 0 h 18288"/>
-              <a:gd name="connsiteX9" fmla="*/ 5410200 w 5410200"/>
-              <a:gd name="connsiteY9" fmla="*/ 18288 h 18288"/>
-              <a:gd name="connsiteX10" fmla="*/ 4842129 w 5410200"/>
-              <a:gd name="connsiteY10" fmla="*/ 18288 h 18288"/>
-              <a:gd name="connsiteX11" fmla="*/ 4328160 w 5410200"/>
-              <a:gd name="connsiteY11" fmla="*/ 18288 h 18288"/>
-              <a:gd name="connsiteX12" fmla="*/ 3597783 w 5410200"/>
-              <a:gd name="connsiteY12" fmla="*/ 18288 h 18288"/>
-              <a:gd name="connsiteX13" fmla="*/ 3029712 w 5410200"/>
-              <a:gd name="connsiteY13" fmla="*/ 18288 h 18288"/>
-              <a:gd name="connsiteX14" fmla="*/ 2299335 w 5410200"/>
-              <a:gd name="connsiteY14" fmla="*/ 18288 h 18288"/>
-              <a:gd name="connsiteX15" fmla="*/ 1514856 w 5410200"/>
-              <a:gd name="connsiteY15" fmla="*/ 18288 h 18288"/>
-              <a:gd name="connsiteX16" fmla="*/ 892683 w 5410200"/>
-              <a:gd name="connsiteY16" fmla="*/ 18288 h 18288"/>
-              <a:gd name="connsiteX17" fmla="*/ 0 w 5410200"/>
-              <a:gd name="connsiteY17" fmla="*/ 18288 h 18288"/>
-              <a:gd name="connsiteX18" fmla="*/ 0 w 5410200"/>
-              <a:gd name="connsiteY18" fmla="*/ 0 h 18288"/>
-            </a:gdLst>
-            <a:ahLst/>
-            <a:cxnLst>
-              <a:cxn ang="0">
-                <a:pos x="connsiteX0" y="connsiteY0"/>
-              </a:cxn>
-              <a:cxn ang="0">
-                <a:pos x="connsiteX1" y="connsiteY1"/>
-              </a:cxn>
-              <a:cxn ang="0">
-                <a:pos x="connsiteX2" y="connsiteY2"/>
-              </a:cxn>
-              <a:cxn ang="0">
-                <a:pos x="connsiteX3" y="connsiteY3"/>
-              </a:cxn>
-              <a:cxn ang="0">
-                <a:pos x="connsiteX4" y="connsiteY4"/>
-              </a:cxn>
-              <a:cxn ang="0">
-                <a:pos x="connsiteX5" y="connsiteY5"/>
-              </a:cxn>
-              <a:cxn ang="0">
-                <a:pos x="connsiteX6" y="connsiteY6"/>
-              </a:cxn>
-              <a:cxn ang="0">
-                <a:pos x="connsiteX7" y="connsiteY7"/>
-              </a:cxn>
-              <a:cxn ang="0">
-                <a:pos x="connsiteX8" y="connsiteY8"/>
-              </a:cxn>
-              <a:cxn ang="0">
-                <a:pos x="connsiteX9" y="connsiteY9"/>
-              </a:cxn>
-              <a:cxn ang="0">
-                <a:pos x="connsiteX10" y="connsiteY10"/>
-              </a:cxn>
-              <a:cxn ang="0">
-                <a:pos x="connsiteX11" y="connsiteY11"/>
-              </a:cxn>
-              <a:cxn ang="0">
-                <a:pos x="connsiteX12" y="connsiteY12"/>
-              </a:cxn>
-              <a:cxn ang="0">
-                <a:pos x="connsiteX13" y="connsiteY13"/>
-              </a:cxn>
-              <a:cxn ang="0">
-                <a:pos x="connsiteX14" y="connsiteY14"/>
-              </a:cxn>
-              <a:cxn ang="0">
-                <a:pos x="connsiteX15" y="connsiteY15"/>
-              </a:cxn>
-              <a:cxn ang="0">
-                <a:pos x="connsiteX16" y="connsiteY16"/>
-              </a:cxn>
-              <a:cxn ang="0">
-                <a:pos x="connsiteX17" y="connsiteY17"/>
-              </a:cxn>
-              <a:cxn ang="0">
-                <a:pos x="connsiteX18" y="connsiteY18"/>
-              </a:cxn>
-            </a:cxnLst>
-            <a:rect l="l" t="t" r="r" b="b"/>
-            <a:pathLst>
-              <a:path w="5410200" h="18288" fill="none" extrusionOk="0">
-                <a:moveTo>
-                  <a:pt x="0" y="0"/>
-                </a:moveTo>
-                <a:cubicBezTo>
-                  <a:pt x="163050" y="-18707"/>
-                  <a:pt x="319321" y="-16364"/>
-                  <a:pt x="568071" y="0"/>
-                </a:cubicBezTo>
-                <a:cubicBezTo>
-                  <a:pt x="816821" y="16364"/>
-                  <a:pt x="1013224" y="-7268"/>
-                  <a:pt x="1298448" y="0"/>
-                </a:cubicBezTo>
-                <a:cubicBezTo>
-                  <a:pt x="1583672" y="7268"/>
-                  <a:pt x="1631711" y="-3367"/>
-                  <a:pt x="1920621" y="0"/>
-                </a:cubicBezTo>
-                <a:cubicBezTo>
-                  <a:pt x="2209531" y="3367"/>
-                  <a:pt x="2364420" y="-19184"/>
-                  <a:pt x="2488692" y="0"/>
-                </a:cubicBezTo>
-                <a:cubicBezTo>
-                  <a:pt x="2612964" y="19184"/>
-                  <a:pt x="3023298" y="-34627"/>
-                  <a:pt x="3219069" y="0"/>
-                </a:cubicBezTo>
-                <a:cubicBezTo>
-                  <a:pt x="3414840" y="34627"/>
-                  <a:pt x="3656810" y="24043"/>
-                  <a:pt x="3895344" y="0"/>
-                </a:cubicBezTo>
-                <a:cubicBezTo>
-                  <a:pt x="4133879" y="-24043"/>
-                  <a:pt x="4393984" y="-19577"/>
-                  <a:pt x="4571619" y="0"/>
-                </a:cubicBezTo>
-                <a:cubicBezTo>
-                  <a:pt x="4749255" y="19577"/>
-                  <a:pt x="5179928" y="-6281"/>
-                  <a:pt x="5410200" y="0"/>
-                </a:cubicBezTo>
-                <a:cubicBezTo>
-                  <a:pt x="5410730" y="6954"/>
-                  <a:pt x="5410934" y="12839"/>
-                  <a:pt x="5410200" y="18288"/>
-                </a:cubicBezTo>
-                <a:cubicBezTo>
-                  <a:pt x="5139060" y="6751"/>
-                  <a:pt x="5121593" y="31035"/>
-                  <a:pt x="4842129" y="18288"/>
-                </a:cubicBezTo>
-                <a:cubicBezTo>
-                  <a:pt x="4562665" y="5541"/>
-                  <a:pt x="4448273" y="9487"/>
-                  <a:pt x="4328160" y="18288"/>
-                </a:cubicBezTo>
-                <a:cubicBezTo>
-                  <a:pt x="4208047" y="27089"/>
-                  <a:pt x="3760936" y="22567"/>
-                  <a:pt x="3597783" y="18288"/>
-                </a:cubicBezTo>
-                <a:cubicBezTo>
-                  <a:pt x="3434630" y="14009"/>
-                  <a:pt x="3299718" y="33213"/>
-                  <a:pt x="3029712" y="18288"/>
-                </a:cubicBezTo>
-                <a:cubicBezTo>
-                  <a:pt x="2759706" y="3363"/>
-                  <a:pt x="2640159" y="27394"/>
-                  <a:pt x="2299335" y="18288"/>
-                </a:cubicBezTo>
-                <a:cubicBezTo>
-                  <a:pt x="1958511" y="9182"/>
-                  <a:pt x="1801186" y="28985"/>
-                  <a:pt x="1514856" y="18288"/>
-                </a:cubicBezTo>
-                <a:cubicBezTo>
-                  <a:pt x="1228526" y="7591"/>
-                  <a:pt x="1063509" y="-5305"/>
-                  <a:pt x="892683" y="18288"/>
-                </a:cubicBezTo>
-                <a:cubicBezTo>
-                  <a:pt x="721857" y="41881"/>
-                  <a:pt x="186945" y="-20897"/>
-                  <a:pt x="0" y="18288"/>
-                </a:cubicBezTo>
-                <a:cubicBezTo>
-                  <a:pt x="-570" y="9279"/>
-                  <a:pt x="132" y="5100"/>
-                  <a:pt x="0" y="0"/>
-                </a:cubicBezTo>
-                <a:close/>
-              </a:path>
-              <a:path w="5410200" h="18288" stroke="0" extrusionOk="0">
-                <a:moveTo>
-                  <a:pt x="0" y="0"/>
-                </a:moveTo>
-                <a:cubicBezTo>
-                  <a:pt x="285096" y="-4925"/>
-                  <a:pt x="376456" y="22268"/>
-                  <a:pt x="622173" y="0"/>
-                </a:cubicBezTo>
-                <a:cubicBezTo>
-                  <a:pt x="867890" y="-22268"/>
-                  <a:pt x="1031392" y="7228"/>
-                  <a:pt x="1136142" y="0"/>
-                </a:cubicBezTo>
-                <a:cubicBezTo>
-                  <a:pt x="1240892" y="-7228"/>
-                  <a:pt x="1561853" y="9877"/>
-                  <a:pt x="1920621" y="0"/>
-                </a:cubicBezTo>
-                <a:cubicBezTo>
-                  <a:pt x="2279389" y="-9877"/>
-                  <a:pt x="2367255" y="19546"/>
-                  <a:pt x="2542794" y="0"/>
-                </a:cubicBezTo>
-                <a:cubicBezTo>
-                  <a:pt x="2718333" y="-19546"/>
-                  <a:pt x="2866732" y="-22226"/>
-                  <a:pt x="3164967" y="0"/>
-                </a:cubicBezTo>
-                <a:cubicBezTo>
-                  <a:pt x="3463202" y="22226"/>
-                  <a:pt x="3568055" y="-2765"/>
-                  <a:pt x="3949446" y="0"/>
-                </a:cubicBezTo>
-                <a:cubicBezTo>
-                  <a:pt x="4330837" y="2765"/>
-                  <a:pt x="4287895" y="10557"/>
-                  <a:pt x="4517517" y="0"/>
-                </a:cubicBezTo>
-                <a:cubicBezTo>
-                  <a:pt x="4747139" y="-10557"/>
-                  <a:pt x="5149588" y="8716"/>
-                  <a:pt x="5410200" y="0"/>
-                </a:cubicBezTo>
-                <a:cubicBezTo>
-                  <a:pt x="5409517" y="5414"/>
-                  <a:pt x="5409480" y="12510"/>
-                  <a:pt x="5410200" y="18288"/>
-                </a:cubicBezTo>
-                <a:cubicBezTo>
-                  <a:pt x="5163327" y="41494"/>
-                  <a:pt x="5008749" y="10693"/>
-                  <a:pt x="4842129" y="18288"/>
-                </a:cubicBezTo>
-                <a:cubicBezTo>
-                  <a:pt x="4675509" y="25883"/>
-                  <a:pt x="4433401" y="-615"/>
-                  <a:pt x="4165854" y="18288"/>
-                </a:cubicBezTo>
-                <a:cubicBezTo>
-                  <a:pt x="3898308" y="37191"/>
-                  <a:pt x="3809032" y="-8710"/>
-                  <a:pt x="3543681" y="18288"/>
-                </a:cubicBezTo>
-                <a:cubicBezTo>
-                  <a:pt x="3278330" y="45286"/>
-                  <a:pt x="3073876" y="-15917"/>
-                  <a:pt x="2759202" y="18288"/>
-                </a:cubicBezTo>
-                <a:cubicBezTo>
-                  <a:pt x="2444528" y="52493"/>
-                  <a:pt x="2204144" y="3372"/>
-                  <a:pt x="1974723" y="18288"/>
-                </a:cubicBezTo>
-                <a:cubicBezTo>
-                  <a:pt x="1745302" y="33204"/>
-                  <a:pt x="1602335" y="31490"/>
-                  <a:pt x="1406652" y="18288"/>
-                </a:cubicBezTo>
-                <a:cubicBezTo>
-                  <a:pt x="1210969" y="5086"/>
-                  <a:pt x="923948" y="3161"/>
-                  <a:pt x="730377" y="18288"/>
-                </a:cubicBezTo>
-                <a:cubicBezTo>
-                  <a:pt x="536806" y="33415"/>
-                  <a:pt x="336496" y="-141"/>
-                  <a:pt x="0" y="18288"/>
-                </a:cubicBezTo>
-                <a:cubicBezTo>
-                  <a:pt x="-306" y="11061"/>
-                  <a:pt x="-655" y="7751"/>
-                  <a:pt x="0" y="0"/>
-                </a:cubicBezTo>
-                <a:close/>
-              </a:path>
-            </a:pathLst>
-          </a:custGeom>
-          <a:solidFill>
-            <a:schemeClr val="accent2"/>
-          </a:solidFill>
-          <a:ln w="41275" cap="rnd">
-            <a:solidFill>
-              <a:schemeClr val="accent2"/>
-            </a:solidFill>
-            <a:round/>
-            <a:extLst>
-              <a:ext uri="{C807C97D-BFC1-408E-A445-0C87EB9F89A2}">
-                <ask:lineSketchStyleProps xmlns:ask="http://schemas.microsoft.com/office/drawing/2018/sketchyshapes" sd="1219033472">
-                  <a:prstGeom prst="rect">
-                    <a:avLst/>
-                  </a:prstGeom>
-                  <ask:type>
-                    <ask:lineSketchFreehand/>
-                  </ask:type>
-                </ask:lineSketchStyleProps>
-              </a:ext>
-            </a:extLst>
-          </a:ln>
-        </p:spPr>
-        <p:style>
-          <a:lnRef idx="2">
-            <a:schemeClr val="accent1">
-              <a:shade val="50000"/>
-            </a:schemeClr>
-          </a:lnRef>
-          <a:fillRef idx="1">
-            <a:schemeClr val="accent1"/>
-          </a:fillRef>
-          <a:effectRef idx="0">
-            <a:schemeClr val="accent1"/>
-          </a:effectRef>
-          <a:fontRef idx="minor">
-            <a:schemeClr val="lt1"/>
-          </a:fontRef>
-        </p:style>
-        <p:txBody>
-          <a:bodyPr rtlCol="0" anchor="ctr"/>
-          <a:lstStyle/>
-          <a:p>
-            <a:pPr algn="ctr"/>
-            <a:endParaRPr lang="en-US"/>
-          </a:p>
-        </p:txBody>
-      </p:sp>
-    </p:spTree>
-    <p:extLst>
-      <p:ext uri="{BB962C8B-B14F-4D97-AF65-F5344CB8AC3E}">
-        <p14:creationId xmlns:p14="http://schemas.microsoft.com/office/powerpoint/2010/main" val="316630033"/>
-      </p:ext>
-    </p:extLst>
-  </p:cSld>
-  <p:clrMapOvr>
-    <a:masterClrMapping/>
-  </p:clrMapOvr>
-</p:sld>
-</file>
-
-<file path=ppt/slides/slide16.xml><?xml version="1.0" encoding="utf-8"?>
+<file path=ppt/slides/slide17.xml><?xml version="1.0" encoding="utf-8"?>
 <p:sld xmlns:a="http://schemas.openxmlformats.org/drawingml/2006/main" xmlns:r="http://schemas.openxmlformats.org/officeDocument/2006/relationships" xmlns:p="http://schemas.openxmlformats.org/presentationml/2006/main">
   <p:cSld>
     <p:spTree>
@@ -11347,10 +12436,10 @@
       </p:grpSpPr>
       <p:sp>
         <p:nvSpPr>
-          <p:cNvPr id="5" name="Title 4">
+          <p:cNvPr id="2" name="Title 1">
             <a:extLst>
               <a:ext uri="{FF2B5EF4-FFF2-40B4-BE49-F238E27FC236}">
-                <a16:creationId xmlns:a16="http://schemas.microsoft.com/office/drawing/2014/main" id="{FB46B4BF-3DB8-7A46-BC12-9CFFB7373406}"/>
+                <a16:creationId xmlns:a16="http://schemas.microsoft.com/office/drawing/2014/main" id="{544FA7A7-06BC-4C47-9639-DD3C03586AFA}"/>
               </a:ext>
             </a:extLst>
           </p:cNvPr>
@@ -11368,105 +12457,46 @@
           <a:p>
             <a:r>
               <a:rPr lang="en-US" dirty="0"/>
-              <a:t>My new book’s website!</a:t>
+              <a:t>More “problems” to solve</a:t>
             </a:r>
           </a:p>
         </p:txBody>
       </p:sp>
-      <p:pic>
-        <p:nvPicPr>
-          <p:cNvPr id="2050" name="Picture 2">
+      <p:sp>
+        <p:nvSpPr>
+          <p:cNvPr id="3" name="Content Placeholder 2">
             <a:extLst>
               <a:ext uri="{FF2B5EF4-FFF2-40B4-BE49-F238E27FC236}">
-                <a16:creationId xmlns:a16="http://schemas.microsoft.com/office/drawing/2014/main" id="{54D898D4-D30D-BF48-A2A1-C805A1C33DF7}"/>
+                <a16:creationId xmlns:a16="http://schemas.microsoft.com/office/drawing/2014/main" id="{2A80D9A7-5C9F-C84B-BA03-3008A07EBA26}"/>
               </a:ext>
             </a:extLst>
           </p:cNvPr>
-          <p:cNvPicPr>
-            <a:picLocks noGrp="1" noChangeAspect="1" noChangeArrowheads="1"/>
-          </p:cNvPicPr>
+          <p:cNvSpPr>
+            <a:spLocks noGrp="1"/>
+          </p:cNvSpPr>
           <p:nvPr>
             <p:ph idx="1"/>
           </p:nvPr>
-        </p:nvPicPr>
-        <p:blipFill>
-          <a:blip r:embed="rId2">
-            <a:extLst>
-              <a:ext uri="{28A0092B-C50C-407E-A947-70E740481C1C}">
-                <a14:useLocalDpi xmlns:a14="http://schemas.microsoft.com/office/drawing/2010/main" val="0"/>
-              </a:ext>
-            </a:extLst>
-          </a:blip>
-          <a:srcRect/>
-          <a:stretch>
-            <a:fillRect/>
-          </a:stretch>
-        </p:blipFill>
-        <p:spPr bwMode="auto">
-          <a:xfrm>
-            <a:off x="1181996" y="1769869"/>
-            <a:ext cx="2531360" cy="3172638"/>
-          </a:xfrm>
-          <a:prstGeom prst="rect">
-            <a:avLst/>
-          </a:prstGeom>
-          <a:noFill/>
-          <a:extLst>
-            <a:ext uri="{909E8E84-426E-40DD-AFC4-6F175D3DCCD1}">
-              <a14:hiddenFill xmlns:a14="http://schemas.microsoft.com/office/drawing/2010/main">
-                <a:solidFill>
-                  <a:srgbClr val="FFFFFF"/>
-                </a:solidFill>
-              </a14:hiddenFill>
-            </a:ext>
-          </a:extLst>
-        </p:spPr>
-      </p:pic>
-      <p:sp>
-        <p:nvSpPr>
-          <p:cNvPr id="10" name="TextBox 9">
-            <a:extLst>
-              <a:ext uri="{FF2B5EF4-FFF2-40B4-BE49-F238E27FC236}">
-                <a16:creationId xmlns:a16="http://schemas.microsoft.com/office/drawing/2014/main" id="{30002973-8AE0-5D44-990B-33BFB2E56D4A}"/>
-              </a:ext>
-            </a:extLst>
-          </p:cNvPr>
-          <p:cNvSpPr txBox="1"/>
-          <p:nvPr/>
         </p:nvSpPr>
-        <p:spPr>
-          <a:xfrm>
-            <a:off x="5636011" y="2399506"/>
-            <a:ext cx="5717789" cy="584775"/>
-          </a:xfrm>
-          <a:prstGeom prst="rect">
-            <a:avLst/>
-          </a:prstGeom>
-          <a:noFill/>
-        </p:spPr>
+        <p:spPr/>
         <p:txBody>
-          <a:bodyPr wrap="square">
-            <a:spAutoFit/>
-          </a:bodyPr>
+          <a:bodyPr/>
           <a:lstStyle/>
           <a:p>
             <a:r>
-              <a:rPr lang="en-US" sz="3200" dirty="0">
-                <a:hlinkClick r:id="rId3"/>
-              </a:rPr>
-              <a:t>https://practicalgobook.net</a:t>
+              <a:rPr lang="en-US" dirty="0"/>
+              <a:t>The update/deployment story isn’t great</a:t>
             </a:r>
-            <a:r>
-              <a:rPr lang="en-US" sz="3200" dirty="0"/>
-              <a:t> </a:t>
-            </a:r>
+          </a:p>
+          <a:p>
+            <a:endParaRPr lang="en-US" dirty="0"/>
           </a:p>
         </p:txBody>
       </p:sp>
     </p:spTree>
     <p:extLst>
       <p:ext uri="{BB962C8B-B14F-4D97-AF65-F5344CB8AC3E}">
-        <p14:creationId xmlns:p14="http://schemas.microsoft.com/office/powerpoint/2010/main" val="4264061493"/>
+        <p14:creationId xmlns:p14="http://schemas.microsoft.com/office/powerpoint/2010/main" val="3798106223"/>
       </p:ext>
     </p:extLst>
   </p:cSld>
@@ -11476,7 +12506,7 @@
 </p:sld>
 </file>
 
-<file path=ppt/slides/slide17.xml><?xml version="1.0" encoding="utf-8"?>
+<file path=ppt/slides/slide18.xml><?xml version="1.0" encoding="utf-8"?>
 <p:sld xmlns:a="http://schemas.openxmlformats.org/drawingml/2006/main" xmlns:r="http://schemas.openxmlformats.org/officeDocument/2006/relationships" xmlns:p="http://schemas.openxmlformats.org/presentationml/2006/main">
   <p:cSld>
     <p:spTree>
@@ -11709,7 +12739,7 @@
       </p:sp>
       <p:graphicFrame>
         <p:nvGraphicFramePr>
-          <p:cNvPr id="5" name="Content Placeholder 2">
+          <p:cNvPr id="5" name="Content Placeholder 2" descr="There was no problem to solve&#10;&#13;&#10;I wanted to host my new static website in the cloud on a virtual machine">
             <a:extLst>
               <a:ext uri="{FF2B5EF4-FFF2-40B4-BE49-F238E27FC236}">
                 <a16:creationId xmlns:a16="http://schemas.microsoft.com/office/drawing/2014/main" id="{DB3E91FA-FCC8-4E1C-B718-B71106A13180}"/>
@@ -11723,7 +12753,7 @@
             <p:ph idx="1"/>
             <p:extLst>
               <p:ext uri="{D42A27DB-BD31-4B8C-83A1-F6EECF244321}">
-                <p14:modId xmlns:p14="http://schemas.microsoft.com/office/powerpoint/2010/main" val="627162102"/>
+                <p14:modId xmlns:p14="http://schemas.microsoft.com/office/powerpoint/2010/main" val="2091473362"/>
               </p:ext>
             </p:extLst>
           </p:nvPr>
@@ -11789,13 +12819,16 @@
           <a:bodyPr/>
           <a:lstStyle/>
           <a:p>
-            <a:endParaRPr lang="en-US" dirty="0"/>
+            <a:r>
+              <a:rPr lang="en-US" dirty="0"/>
+              <a:t>Thinking about the solution</a:t>
+            </a:r>
           </a:p>
         </p:txBody>
       </p:sp>
       <p:graphicFrame>
         <p:nvGraphicFramePr>
-          <p:cNvPr id="13" name="Content Placeholder 2">
+          <p:cNvPr id="13" name="Content Placeholder 2" descr="Initially,">
             <a:extLst>
               <a:ext uri="{FF2B5EF4-FFF2-40B4-BE49-F238E27FC236}">
                 <a16:creationId xmlns:a16="http://schemas.microsoft.com/office/drawing/2014/main" id="{2E865795-8125-4406-8522-EE72760E8101}"/>
@@ -11807,6 +12840,11 @@
           </p:cNvGraphicFramePr>
           <p:nvPr>
             <p:ph idx="1"/>
+            <p:extLst>
+              <p:ext uri="{D42A27DB-BD31-4B8C-83A1-F6EECF244321}">
+                <p14:modId xmlns:p14="http://schemas.microsoft.com/office/powerpoint/2010/main" val="3337409636"/>
+              </p:ext>
+            </p:extLst>
           </p:nvPr>
         </p:nvGraphicFramePr>
         <p:xfrm>
@@ -11972,13 +13010,13 @@
           <p:nvPr/>
         </p:nvPicPr>
         <p:blipFill>
-          <a:blip r:embed="rId2">
+          <a:blip r:embed="rId3">
             <a:extLst>
               <a:ext uri="{28A0092B-C50C-407E-A947-70E740481C1C}">
                 <a14:useLocalDpi xmlns:a14="http://schemas.microsoft.com/office/drawing/2010/main" val="0"/>
               </a:ext>
               <a:ext uri="{96DAC541-7B7A-43D3-8B79-37D633B846F1}">
-                <asvg:svgBlip xmlns:asvg="http://schemas.microsoft.com/office/drawing/2016/SVG/main" r:embed="rId3"/>
+                <asvg:svgBlip xmlns:asvg="http://schemas.microsoft.com/office/drawing/2016/SVG/main" r:embed="rId4"/>
               </a:ext>
             </a:extLst>
           </a:blip>
@@ -12636,7 +13674,7 @@
         <p:spPr>
           <a:xfrm>
             <a:off x="0" y="1430532"/>
-            <a:ext cx="8240751" cy="5237898"/>
+            <a:ext cx="7755775" cy="4929643"/>
           </a:xfrm>
           <a:prstGeom prst="rect">
             <a:avLst/>
@@ -12724,7 +13762,7 @@
           <p:nvPr/>
         </p:nvSpPr>
         <p:spPr bwMode="auto">
-          <a:xfrm>
+          <a:xfrm rot="5400000">
             <a:off x="5943600" y="3276600"/>
             <a:ext cx="304800" cy="304800"/>
           </a:xfrm>
@@ -12801,13 +13839,10 @@
       </p:sp>
       <p:pic>
         <p:nvPicPr>
-          <p:cNvPr id="9" name="Picture 8" descr="This shows the go:embed directives that i created manually.">
+          <p:cNvPr id="6" name="Picture 5" descr="This shows the go:embed directives that i created manually.&#10;&#10;I specified each of the directories and files in multiple //go:embed directives. I could have had it all in one line, but i decided to split them&#10; over multiple lines">
             <a:extLst>
               <a:ext uri="{FF2B5EF4-FFF2-40B4-BE49-F238E27FC236}">
-                <a16:creationId xmlns:a16="http://schemas.microsoft.com/office/drawing/2014/main" id="{6EB9A4BB-7AA2-9A47-A4D4-4A05C0A1F017}"/>
-              </a:ext>
-              <a:ext uri="{C183D7F6-B498-43B3-948B-1728B52AA6E4}">
-                <adec:decorative xmlns:adec="http://schemas.microsoft.com/office/drawing/2017/decorative" val="0"/>
+                <a16:creationId xmlns:a16="http://schemas.microsoft.com/office/drawing/2014/main" id="{C2668ABA-0BA6-0642-8E15-84D38333DE8B}"/>
               </a:ext>
             </a:extLst>
           </p:cNvPr>
@@ -12824,8 +13859,8 @@
         </p:blipFill>
         <p:spPr>
           <a:xfrm>
-            <a:off x="940188" y="1478047"/>
-            <a:ext cx="8114602" cy="4713745"/>
+            <a:off x="1321110" y="1860550"/>
+            <a:ext cx="6616700" cy="3441700"/>
           </a:xfrm>
           <a:prstGeom prst="rect">
             <a:avLst/>
@@ -13192,4 +14227,299 @@
     </a:ext>
   </a:extLst>
 </a:theme>
+</file>
+
+<file path=ppt/theme/theme2.xml><?xml version="1.0" encoding="utf-8"?>
+<a:theme xmlns:a="http://schemas.openxmlformats.org/drawingml/2006/main" name="Office Theme">
+  <a:themeElements>
+    <a:clrScheme name="Office">
+      <a:dk1>
+        <a:sysClr val="windowText" lastClr="000000"/>
+      </a:dk1>
+      <a:lt1>
+        <a:sysClr val="window" lastClr="FFFFFF"/>
+      </a:lt1>
+      <a:dk2>
+        <a:srgbClr val="44546A"/>
+      </a:dk2>
+      <a:lt2>
+        <a:srgbClr val="E7E6E6"/>
+      </a:lt2>
+      <a:accent1>
+        <a:srgbClr val="4472C4"/>
+      </a:accent1>
+      <a:accent2>
+        <a:srgbClr val="ED7D31"/>
+      </a:accent2>
+      <a:accent3>
+        <a:srgbClr val="A5A5A5"/>
+      </a:accent3>
+      <a:accent4>
+        <a:srgbClr val="FFC000"/>
+      </a:accent4>
+      <a:accent5>
+        <a:srgbClr val="5B9BD5"/>
+      </a:accent5>
+      <a:accent6>
+        <a:srgbClr val="70AD47"/>
+      </a:accent6>
+      <a:hlink>
+        <a:srgbClr val="0563C1"/>
+      </a:hlink>
+      <a:folHlink>
+        <a:srgbClr val="954F72"/>
+      </a:folHlink>
+    </a:clrScheme>
+    <a:fontScheme name="Office">
+      <a:majorFont>
+        <a:latin typeface="Calibri Light" panose="020F0302020204030204"/>
+        <a:ea typeface=""/>
+        <a:cs typeface=""/>
+        <a:font script="Jpan" typeface="游ゴシック Light"/>
+        <a:font script="Hang" typeface="맑은 고딕"/>
+        <a:font script="Hans" typeface="等线 Light"/>
+        <a:font script="Hant" typeface="新細明體"/>
+        <a:font script="Arab" typeface="Times New Roman"/>
+        <a:font script="Hebr" typeface="Times New Roman"/>
+        <a:font script="Thai" typeface="Angsana New"/>
+        <a:font script="Ethi" typeface="Nyala"/>
+        <a:font script="Beng" typeface="Vrinda"/>
+        <a:font script="Gujr" typeface="Shruti"/>
+        <a:font script="Khmr" typeface="MoolBoran"/>
+        <a:font script="Knda" typeface="Tunga"/>
+        <a:font script="Guru" typeface="Raavi"/>
+        <a:font script="Cans" typeface="Euphemia"/>
+        <a:font script="Cher" typeface="Plantagenet Cherokee"/>
+        <a:font script="Yiii" typeface="Microsoft Yi Baiti"/>
+        <a:font script="Tibt" typeface="Microsoft Himalaya"/>
+        <a:font script="Thaa" typeface="MV Boli"/>
+        <a:font script="Deva" typeface="Mangal"/>
+        <a:font script="Telu" typeface="Gautami"/>
+        <a:font script="Taml" typeface="Latha"/>
+        <a:font script="Syrc" typeface="Estrangelo Edessa"/>
+        <a:font script="Orya" typeface="Kalinga"/>
+        <a:font script="Mlym" typeface="Kartika"/>
+        <a:font script="Laoo" typeface="DokChampa"/>
+        <a:font script="Sinh" typeface="Iskoola Pota"/>
+        <a:font script="Mong" typeface="Mongolian Baiti"/>
+        <a:font script="Viet" typeface="Times New Roman"/>
+        <a:font script="Uigh" typeface="Microsoft Uighur"/>
+        <a:font script="Geor" typeface="Sylfaen"/>
+        <a:font script="Armn" typeface="Arial"/>
+        <a:font script="Bugi" typeface="Leelawadee UI"/>
+        <a:font script="Bopo" typeface="Microsoft JhengHei"/>
+        <a:font script="Java" typeface="Javanese Text"/>
+        <a:font script="Lisu" typeface="Segoe UI"/>
+        <a:font script="Mymr" typeface="Myanmar Text"/>
+        <a:font script="Nkoo" typeface="Ebrima"/>
+        <a:font script="Olck" typeface="Nirmala UI"/>
+        <a:font script="Osma" typeface="Ebrima"/>
+        <a:font script="Phag" typeface="Phagspa"/>
+        <a:font script="Syrn" typeface="Estrangelo Edessa"/>
+        <a:font script="Syrj" typeface="Estrangelo Edessa"/>
+        <a:font script="Syre" typeface="Estrangelo Edessa"/>
+        <a:font script="Sora" typeface="Nirmala UI"/>
+        <a:font script="Tale" typeface="Microsoft Tai Le"/>
+        <a:font script="Talu" typeface="Microsoft New Tai Lue"/>
+        <a:font script="Tfng" typeface="Ebrima"/>
+      </a:majorFont>
+      <a:minorFont>
+        <a:latin typeface="Calibri" panose="020F0502020204030204"/>
+        <a:ea typeface=""/>
+        <a:cs typeface=""/>
+        <a:font script="Jpan" typeface="游ゴシック"/>
+        <a:font script="Hang" typeface="맑은 고딕"/>
+        <a:font script="Hans" typeface="等线"/>
+        <a:font script="Hant" typeface="新細明體"/>
+        <a:font script="Arab" typeface="Arial"/>
+        <a:font script="Hebr" typeface="Arial"/>
+        <a:font script="Thai" typeface="Cordia New"/>
+        <a:font script="Ethi" typeface="Nyala"/>
+        <a:font script="Beng" typeface="Vrinda"/>
+        <a:font script="Gujr" typeface="Shruti"/>
+        <a:font script="Khmr" typeface="DaunPenh"/>
+        <a:font script="Knda" typeface="Tunga"/>
+        <a:font script="Guru" typeface="Raavi"/>
+        <a:font script="Cans" typeface="Euphemia"/>
+        <a:font script="Cher" typeface="Plantagenet Cherokee"/>
+        <a:font script="Yiii" typeface="Microsoft Yi Baiti"/>
+        <a:font script="Tibt" typeface="Microsoft Himalaya"/>
+        <a:font script="Thaa" typeface="MV Boli"/>
+        <a:font script="Deva" typeface="Mangal"/>
+        <a:font script="Telu" typeface="Gautami"/>
+        <a:font script="Taml" typeface="Latha"/>
+        <a:font script="Syrc" typeface="Estrangelo Edessa"/>
+        <a:font script="Orya" typeface="Kalinga"/>
+        <a:font script="Mlym" typeface="Kartika"/>
+        <a:font script="Laoo" typeface="DokChampa"/>
+        <a:font script="Sinh" typeface="Iskoola Pota"/>
+        <a:font script="Mong" typeface="Mongolian Baiti"/>
+        <a:font script="Viet" typeface="Arial"/>
+        <a:font script="Uigh" typeface="Microsoft Uighur"/>
+        <a:font script="Geor" typeface="Sylfaen"/>
+        <a:font script="Armn" typeface="Arial"/>
+        <a:font script="Bugi" typeface="Leelawadee UI"/>
+        <a:font script="Bopo" typeface="Microsoft JhengHei"/>
+        <a:font script="Java" typeface="Javanese Text"/>
+        <a:font script="Lisu" typeface="Segoe UI"/>
+        <a:font script="Mymr" typeface="Myanmar Text"/>
+        <a:font script="Nkoo" typeface="Ebrima"/>
+        <a:font script="Olck" typeface="Nirmala UI"/>
+        <a:font script="Osma" typeface="Ebrima"/>
+        <a:font script="Phag" typeface="Phagspa"/>
+        <a:font script="Syrn" typeface="Estrangelo Edessa"/>
+        <a:font script="Syrj" typeface="Estrangelo Edessa"/>
+        <a:font script="Syre" typeface="Estrangelo Edessa"/>
+        <a:font script="Sora" typeface="Nirmala UI"/>
+        <a:font script="Tale" typeface="Microsoft Tai Le"/>
+        <a:font script="Talu" typeface="Microsoft New Tai Lue"/>
+        <a:font script="Tfng" typeface="Ebrima"/>
+      </a:minorFont>
+    </a:fontScheme>
+    <a:fmtScheme name="Office">
+      <a:fillStyleLst>
+        <a:solidFill>
+          <a:schemeClr val="phClr"/>
+        </a:solidFill>
+        <a:gradFill rotWithShape="1">
+          <a:gsLst>
+            <a:gs pos="0">
+              <a:schemeClr val="phClr">
+                <a:lumMod val="110000"/>
+                <a:satMod val="105000"/>
+                <a:tint val="67000"/>
+              </a:schemeClr>
+            </a:gs>
+            <a:gs pos="50000">
+              <a:schemeClr val="phClr">
+                <a:lumMod val="105000"/>
+                <a:satMod val="103000"/>
+                <a:tint val="73000"/>
+              </a:schemeClr>
+            </a:gs>
+            <a:gs pos="100000">
+              <a:schemeClr val="phClr">
+                <a:lumMod val="105000"/>
+                <a:satMod val="109000"/>
+                <a:tint val="81000"/>
+              </a:schemeClr>
+            </a:gs>
+          </a:gsLst>
+          <a:lin ang="5400000" scaled="0"/>
+        </a:gradFill>
+        <a:gradFill rotWithShape="1">
+          <a:gsLst>
+            <a:gs pos="0">
+              <a:schemeClr val="phClr">
+                <a:satMod val="103000"/>
+                <a:lumMod val="102000"/>
+                <a:tint val="94000"/>
+              </a:schemeClr>
+            </a:gs>
+            <a:gs pos="50000">
+              <a:schemeClr val="phClr">
+                <a:satMod val="110000"/>
+                <a:lumMod val="100000"/>
+                <a:shade val="100000"/>
+              </a:schemeClr>
+            </a:gs>
+            <a:gs pos="100000">
+              <a:schemeClr val="phClr">
+                <a:lumMod val="99000"/>
+                <a:satMod val="120000"/>
+                <a:shade val="78000"/>
+              </a:schemeClr>
+            </a:gs>
+          </a:gsLst>
+          <a:lin ang="5400000" scaled="0"/>
+        </a:gradFill>
+      </a:fillStyleLst>
+      <a:lnStyleLst>
+        <a:ln w="6350" cap="flat" cmpd="sng" algn="ctr">
+          <a:solidFill>
+            <a:schemeClr val="phClr"/>
+          </a:solidFill>
+          <a:prstDash val="solid"/>
+          <a:miter lim="800000"/>
+        </a:ln>
+        <a:ln w="12700" cap="flat" cmpd="sng" algn="ctr">
+          <a:solidFill>
+            <a:schemeClr val="phClr"/>
+          </a:solidFill>
+          <a:prstDash val="solid"/>
+          <a:miter lim="800000"/>
+        </a:ln>
+        <a:ln w="19050" cap="flat" cmpd="sng" algn="ctr">
+          <a:solidFill>
+            <a:schemeClr val="phClr"/>
+          </a:solidFill>
+          <a:prstDash val="solid"/>
+          <a:miter lim="800000"/>
+        </a:ln>
+      </a:lnStyleLst>
+      <a:effectStyleLst>
+        <a:effectStyle>
+          <a:effectLst/>
+        </a:effectStyle>
+        <a:effectStyle>
+          <a:effectLst/>
+        </a:effectStyle>
+        <a:effectStyle>
+          <a:effectLst>
+            <a:outerShdw blurRad="57150" dist="19050" dir="5400000" algn="ctr" rotWithShape="0">
+              <a:srgbClr val="000000">
+                <a:alpha val="63000"/>
+              </a:srgbClr>
+            </a:outerShdw>
+          </a:effectLst>
+        </a:effectStyle>
+      </a:effectStyleLst>
+      <a:bgFillStyleLst>
+        <a:solidFill>
+          <a:schemeClr val="phClr"/>
+        </a:solidFill>
+        <a:solidFill>
+          <a:schemeClr val="phClr">
+            <a:tint val="95000"/>
+            <a:satMod val="170000"/>
+          </a:schemeClr>
+        </a:solidFill>
+        <a:gradFill rotWithShape="1">
+          <a:gsLst>
+            <a:gs pos="0">
+              <a:schemeClr val="phClr">
+                <a:tint val="93000"/>
+                <a:satMod val="150000"/>
+                <a:shade val="98000"/>
+                <a:lumMod val="102000"/>
+              </a:schemeClr>
+            </a:gs>
+            <a:gs pos="50000">
+              <a:schemeClr val="phClr">
+                <a:tint val="98000"/>
+                <a:satMod val="130000"/>
+                <a:shade val="90000"/>
+                <a:lumMod val="103000"/>
+              </a:schemeClr>
+            </a:gs>
+            <a:gs pos="100000">
+              <a:schemeClr val="phClr">
+                <a:shade val="63000"/>
+                <a:satMod val="120000"/>
+              </a:schemeClr>
+            </a:gs>
+          </a:gsLst>
+          <a:lin ang="5400000" scaled="0"/>
+        </a:gradFill>
+      </a:bgFillStyleLst>
+    </a:fmtScheme>
+  </a:themeElements>
+  <a:objectDefaults/>
+  <a:extraClrSchemeLst/>
+  <a:extLst>
+    <a:ext uri="{05A4C25C-085E-4340-85A3-A5531E510DB2}">
+      <thm15:themeFamily xmlns:thm15="http://schemas.microsoft.com/office/thememl/2012/main" name="Office Theme" id="{62F939B6-93AF-4DB8-9C6B-D6C7DFDC589F}" vid="{4A3C46E8-61CC-4603-A589-7422A47A8E4A}"/>
+    </a:ext>
+  </a:extLst>
+</a:theme>
 </file>
</xml_diff>